<commit_message>
2020_12_07 정기권 UI 구현
</commit_message>
<xml_diff>
--- a/작업한 내용/기차 예매 프로그램(기획).pptx
+++ b/작업한 내용/기차 예매 프로그램(기획).pptx
@@ -28,24 +28,24 @@
   <p:notesSz cx="9926638" cy="6797675"/>
   <p:embeddedFontLst>
     <p:embeddedFont>
-      <p:font typeface="나눔스퀘어" pitchFamily="50" charset="-127"/>
+      <p:font typeface="Century Gothic" pitchFamily="34" charset="0"/>
       <p:regular r:id="rId20"/>
+      <p:bold r:id="rId21"/>
+      <p:italic r:id="rId22"/>
+      <p:boldItalic r:id="rId23"/>
+    </p:embeddedFont>
+    <p:embeddedFont>
+      <p:font typeface="맑은 고딕" pitchFamily="50" charset="-127"/>
+      <p:regular r:id="rId24"/>
+      <p:bold r:id="rId25"/>
     </p:embeddedFont>
     <p:embeddedFont>
       <p:font typeface="나눔스퀘어 Bold" pitchFamily="50" charset="-127"/>
-      <p:bold r:id="rId21"/>
+      <p:bold r:id="rId26"/>
     </p:embeddedFont>
     <p:embeddedFont>
-      <p:font typeface="Century Gothic" pitchFamily="34" charset="0"/>
-      <p:regular r:id="rId22"/>
-      <p:bold r:id="rId23"/>
-      <p:italic r:id="rId24"/>
-      <p:boldItalic r:id="rId25"/>
-    </p:embeddedFont>
-    <p:embeddedFont>
-      <p:font typeface="맑은 고딕" pitchFamily="50" charset="-127"/>
-      <p:regular r:id="rId26"/>
-      <p:bold r:id="rId27"/>
+      <p:font typeface="나눔스퀘어" pitchFamily="50" charset="-127"/>
+      <p:regular r:id="rId27"/>
     </p:embeddedFont>
   </p:embeddedFontLst>
   <p:defaultTextStyle>
@@ -145,7 +145,7 @@
   </p:defaultTextStyle>
   <p:extLst>
     <p:ext uri="{EFAFB233-063F-42B5-8137-9DF3F51BA10A}">
-      <p15:sldGuideLst xmlns:p15="http://schemas.microsoft.com/office/powerpoint/2012/main" xmlns=""/>
+      <p15:sldGuideLst xmlns="" xmlns:p15="http://schemas.microsoft.com/office/powerpoint/2012/main"/>
     </p:ext>
   </p:extLst>
 </p:presentation>
@@ -156,7 +156,7 @@
   <p:cmAuthor id="1" name="김 호렬" initials="김호" lastIdx="1" clrIdx="0">
     <p:extLst>
       <p:ext uri="{19B8F6BF-5375-455C-9EA6-DF929625EA0E}">
-        <p15:presenceInfo xmlns:p15="http://schemas.microsoft.com/office/powerpoint/2012/main" xmlns="" userId="3c9bd017cffa3155" providerId="Windows Live"/>
+        <p15:presenceInfo xmlns="" xmlns:p15="http://schemas.microsoft.com/office/powerpoint/2012/main" userId="3c9bd017cffa3155" providerId="Windows Live"/>
       </p:ext>
     </p:extLst>
   </p:cmAuthor>
@@ -333,7 +333,7 @@
           <a:p>
             <a:fld id="{48A87A34-81AB-432B-8DAE-1953F412C126}" type="datetimeFigureOut">
               <a:rPr lang="en-US" smtClean="0"/>
-              <a:t>12/3/2020</a:t>
+              <a:t>12/7/2020</a:t>
             </a:fld>
             <a:endParaRPr lang="en-US" dirty="0"/>
           </a:p>
@@ -600,7 +600,7 @@
           <a:p>
             <a:fld id="{48A87A34-81AB-432B-8DAE-1953F412C126}" type="datetimeFigureOut">
               <a:rPr lang="en-US" smtClean="0"/>
-              <a:t>12/3/2020</a:t>
+              <a:t>12/7/2020</a:t>
             </a:fld>
             <a:endParaRPr lang="en-US" dirty="0"/>
           </a:p>
@@ -832,7 +832,7 @@
             <a:fld id="{48A87A34-81AB-432B-8DAE-1953F412C126}" type="datetimeFigureOut">
               <a:rPr lang="en-US" smtClean="0"/>
               <a:pPr/>
-              <a:t>12/3/2020</a:t>
+              <a:t>12/7/2020</a:t>
             </a:fld>
             <a:endParaRPr lang="en-US" dirty="0"/>
           </a:p>
@@ -1143,7 +1143,7 @@
             <a:fld id="{48A87A34-81AB-432B-8DAE-1953F412C126}" type="datetimeFigureOut">
               <a:rPr lang="en-US" smtClean="0"/>
               <a:pPr/>
-              <a:t>12/3/2020</a:t>
+              <a:t>12/7/2020</a:t>
             </a:fld>
             <a:endParaRPr lang="en-US" dirty="0"/>
           </a:p>
@@ -1617,7 +1617,7 @@
             <a:fld id="{48A87A34-81AB-432B-8DAE-1953F412C126}" type="datetimeFigureOut">
               <a:rPr lang="en-US" smtClean="0"/>
               <a:pPr/>
-              <a:t>12/3/2020</a:t>
+              <a:t>12/7/2020</a:t>
             </a:fld>
             <a:endParaRPr lang="en-US" dirty="0"/>
           </a:p>
@@ -2164,7 +2164,7 @@
           <a:p>
             <a:fld id="{48A87A34-81AB-432B-8DAE-1953F412C126}" type="datetimeFigureOut">
               <a:rPr lang="en-US" smtClean="0"/>
-              <a:t>12/3/2020</a:t>
+              <a:t>12/7/2020</a:t>
             </a:fld>
             <a:endParaRPr lang="en-US" dirty="0"/>
           </a:p>
@@ -2938,7 +2938,7 @@
           <a:p>
             <a:fld id="{48A87A34-81AB-432B-8DAE-1953F412C126}" type="datetimeFigureOut">
               <a:rPr lang="en-US" smtClean="0"/>
-              <a:t>12/3/2020</a:t>
+              <a:t>12/7/2020</a:t>
             </a:fld>
             <a:endParaRPr lang="en-US" dirty="0"/>
           </a:p>
@@ -3113,7 +3113,7 @@
           <a:p>
             <a:fld id="{48A87A34-81AB-432B-8DAE-1953F412C126}" type="datetimeFigureOut">
               <a:rPr lang="en-US" smtClean="0"/>
-              <a:t>12/3/2020</a:t>
+              <a:t>12/7/2020</a:t>
             </a:fld>
             <a:endParaRPr lang="en-US" dirty="0"/>
           </a:p>
@@ -3337,7 +3337,7 @@
             <a:fld id="{48A87A34-81AB-432B-8DAE-1953F412C126}" type="datetimeFigureOut">
               <a:rPr lang="en-US" smtClean="0"/>
               <a:pPr/>
-              <a:t>12/3/2020</a:t>
+              <a:t>12/7/2020</a:t>
             </a:fld>
             <a:endParaRPr lang="en-US" dirty="0"/>
           </a:p>
@@ -3517,7 +3517,7 @@
           <a:p>
             <a:fld id="{48A87A34-81AB-432B-8DAE-1953F412C126}" type="datetimeFigureOut">
               <a:rPr lang="en-US" smtClean="0"/>
-              <a:t>12/3/2020</a:t>
+              <a:t>12/7/2020</a:t>
             </a:fld>
             <a:endParaRPr lang="en-US" dirty="0"/>
           </a:p>
@@ -3807,7 +3807,7 @@
             <a:fld id="{48A87A34-81AB-432B-8DAE-1953F412C126}" type="datetimeFigureOut">
               <a:rPr lang="en-US" smtClean="0"/>
               <a:pPr/>
-              <a:t>12/3/2020</a:t>
+              <a:t>12/7/2020</a:t>
             </a:fld>
             <a:endParaRPr lang="en-US" dirty="0"/>
           </a:p>
@@ -4049,7 +4049,7 @@
           <a:p>
             <a:fld id="{48A87A34-81AB-432B-8DAE-1953F412C126}" type="datetimeFigureOut">
               <a:rPr lang="en-US" smtClean="0"/>
-              <a:t>12/3/2020</a:t>
+              <a:t>12/7/2020</a:t>
             </a:fld>
             <a:endParaRPr lang="en-US" dirty="0"/>
           </a:p>
@@ -4428,7 +4428,7 @@
           <a:p>
             <a:fld id="{48A87A34-81AB-432B-8DAE-1953F412C126}" type="datetimeFigureOut">
               <a:rPr lang="en-US" smtClean="0"/>
-              <a:t>12/3/2020</a:t>
+              <a:t>12/7/2020</a:t>
             </a:fld>
             <a:endParaRPr lang="en-US" dirty="0"/>
           </a:p>
@@ -4546,7 +4546,7 @@
           <a:p>
             <a:fld id="{48A87A34-81AB-432B-8DAE-1953F412C126}" type="datetimeFigureOut">
               <a:rPr lang="en-US" smtClean="0"/>
-              <a:t>12/3/2020</a:t>
+              <a:t>12/7/2020</a:t>
             </a:fld>
             <a:endParaRPr lang="en-US" dirty="0"/>
           </a:p>
@@ -4641,7 +4641,7 @@
           <a:p>
             <a:fld id="{48A87A34-81AB-432B-8DAE-1953F412C126}" type="datetimeFigureOut">
               <a:rPr lang="en-US" smtClean="0"/>
-              <a:t>12/3/2020</a:t>
+              <a:t>12/7/2020</a:t>
             </a:fld>
             <a:endParaRPr lang="en-US" dirty="0"/>
           </a:p>
@@ -4890,7 +4890,7 @@
           <a:p>
             <a:fld id="{48A87A34-81AB-432B-8DAE-1953F412C126}" type="datetimeFigureOut">
               <a:rPr lang="en-US" smtClean="0"/>
-              <a:t>12/3/2020</a:t>
+              <a:t>12/7/2020</a:t>
             </a:fld>
             <a:endParaRPr lang="en-US" dirty="0"/>
           </a:p>
@@ -5147,7 +5147,7 @@
           <a:p>
             <a:fld id="{48A87A34-81AB-432B-8DAE-1953F412C126}" type="datetimeFigureOut">
               <a:rPr lang="en-US" smtClean="0"/>
-              <a:t>12/3/2020</a:t>
+              <a:t>12/7/2020</a:t>
             </a:fld>
             <a:endParaRPr lang="en-US" dirty="0"/>
           </a:p>
@@ -5391,7 +5391,7 @@
             <a:fld id="{48A87A34-81AB-432B-8DAE-1953F412C126}" type="datetimeFigureOut">
               <a:rPr lang="en-US" smtClean="0"/>
               <a:pPr/>
-              <a:t>12/3/2020</a:t>
+              <a:t>12/7/2020</a:t>
             </a:fld>
             <a:endParaRPr lang="en-US" dirty="0"/>
           </a:p>
@@ -5808,7 +5808,7 @@
           <p:cNvPr id="2" name="제목 1">
             <a:extLst>
               <a:ext uri="{FF2B5EF4-FFF2-40B4-BE49-F238E27FC236}">
-                <a16:creationId xmlns:a16="http://schemas.microsoft.com/office/drawing/2014/main" xmlns="" id="{D40C6CE3-F724-47F8-89B5-E4B379394AB1}"/>
+                <a16:creationId xmlns="" xmlns:a16="http://schemas.microsoft.com/office/drawing/2014/main" id="{D40C6CE3-F724-47F8-89B5-E4B379394AB1}"/>
               </a:ext>
             </a:extLst>
           </p:cNvPr>
@@ -5836,7 +5836,7 @@
           <p:cNvPr id="3" name="부제목 2">
             <a:extLst>
               <a:ext uri="{FF2B5EF4-FFF2-40B4-BE49-F238E27FC236}">
-                <a16:creationId xmlns:a16="http://schemas.microsoft.com/office/drawing/2014/main" xmlns="" id="{E008D253-F6DC-4039-A6A5-957CF1CA268C}"/>
+                <a16:creationId xmlns="" xmlns:a16="http://schemas.microsoft.com/office/drawing/2014/main" id="{E008D253-F6DC-4039-A6A5-957CF1CA268C}"/>
               </a:ext>
             </a:extLst>
           </p:cNvPr>
@@ -5917,7 +5917,7 @@
           <p:cNvPr id="18" name="표 3">
             <a:extLst>
               <a:ext uri="{FF2B5EF4-FFF2-40B4-BE49-F238E27FC236}">
-                <a16:creationId xmlns:a16="http://schemas.microsoft.com/office/drawing/2014/main" xmlns="" id="{EFEB3244-74E4-4B7C-AC5E-22CAA8C8C3F1}"/>
+                <a16:creationId xmlns="" xmlns:a16="http://schemas.microsoft.com/office/drawing/2014/main" id="{EFEB3244-74E4-4B7C-AC5E-22CAA8C8C3F1}"/>
               </a:ext>
             </a:extLst>
           </p:cNvPr>
@@ -5946,42 +5946,42 @@
                 <a:gridCol w="711060">
                   <a:extLst>
                     <a:ext uri="{9D8B030D-6E8A-4147-A177-3AD203B41FA5}">
-                      <a16:colId xmlns:a16="http://schemas.microsoft.com/office/drawing/2014/main" xmlns="" val="1372607456"/>
+                      <a16:colId xmlns="" xmlns:a16="http://schemas.microsoft.com/office/drawing/2014/main" val="1372607456"/>
                     </a:ext>
                   </a:extLst>
                 </a:gridCol>
                 <a:gridCol w="693173">
                   <a:extLst>
                     <a:ext uri="{9D8B030D-6E8A-4147-A177-3AD203B41FA5}">
-                      <a16:colId xmlns:a16="http://schemas.microsoft.com/office/drawing/2014/main" xmlns="" val="1380570509"/>
+                      <a16:colId xmlns="" xmlns:a16="http://schemas.microsoft.com/office/drawing/2014/main" val="1380570509"/>
                     </a:ext>
                   </a:extLst>
                 </a:gridCol>
                 <a:gridCol w="1404000">
                   <a:extLst>
                     <a:ext uri="{9D8B030D-6E8A-4147-A177-3AD203B41FA5}">
-                      <a16:colId xmlns:a16="http://schemas.microsoft.com/office/drawing/2014/main" xmlns="" val="3851764536"/>
+                      <a16:colId xmlns="" xmlns:a16="http://schemas.microsoft.com/office/drawing/2014/main" val="3851764536"/>
                     </a:ext>
                   </a:extLst>
                 </a:gridCol>
                 <a:gridCol w="1404233">
                   <a:extLst>
                     <a:ext uri="{9D8B030D-6E8A-4147-A177-3AD203B41FA5}">
-                      <a16:colId xmlns:a16="http://schemas.microsoft.com/office/drawing/2014/main" xmlns="" val="1175216800"/>
+                      <a16:colId xmlns="" xmlns:a16="http://schemas.microsoft.com/office/drawing/2014/main" val="1175216800"/>
                     </a:ext>
                   </a:extLst>
                 </a:gridCol>
                 <a:gridCol w="651634">
                   <a:extLst>
                     <a:ext uri="{9D8B030D-6E8A-4147-A177-3AD203B41FA5}">
-                      <a16:colId xmlns:a16="http://schemas.microsoft.com/office/drawing/2014/main" xmlns="" val="1828614880"/>
+                      <a16:colId xmlns="" xmlns:a16="http://schemas.microsoft.com/office/drawing/2014/main" val="1828614880"/>
                     </a:ext>
                   </a:extLst>
                 </a:gridCol>
                 <a:gridCol w="752366">
                   <a:extLst>
                     <a:ext uri="{9D8B030D-6E8A-4147-A177-3AD203B41FA5}">
-                      <a16:colId xmlns:a16="http://schemas.microsoft.com/office/drawing/2014/main" xmlns="" val="432903075"/>
+                      <a16:colId xmlns="" xmlns:a16="http://schemas.microsoft.com/office/drawing/2014/main" val="432903075"/>
                     </a:ext>
                   </a:extLst>
                 </a:gridCol>
@@ -6204,7 +6204,7 @@
                 </a:tc>
                 <a:extLst>
                   <a:ext uri="{0D108BD9-81ED-4DB2-BD59-A6C34878D82A}">
-                    <a16:rowId xmlns:a16="http://schemas.microsoft.com/office/drawing/2014/main" xmlns="" val="2317486986"/>
+                    <a16:rowId xmlns="" xmlns:a16="http://schemas.microsoft.com/office/drawing/2014/main" val="2317486986"/>
                   </a:ext>
                 </a:extLst>
               </a:tr>
@@ -6392,7 +6392,7 @@
                 </a:tc>
                 <a:extLst>
                   <a:ext uri="{0D108BD9-81ED-4DB2-BD59-A6C34878D82A}">
-                    <a16:rowId xmlns:a16="http://schemas.microsoft.com/office/drawing/2014/main" xmlns="" val="2025722290"/>
+                    <a16:rowId xmlns="" xmlns:a16="http://schemas.microsoft.com/office/drawing/2014/main" val="2025722290"/>
                   </a:ext>
                 </a:extLst>
               </a:tr>
@@ -6757,7 +6757,7 @@
                 </a:tc>
                 <a:extLst>
                   <a:ext uri="{0D108BD9-81ED-4DB2-BD59-A6C34878D82A}">
-                    <a16:rowId xmlns:a16="http://schemas.microsoft.com/office/drawing/2014/main" xmlns="" val="3542402808"/>
+                    <a16:rowId xmlns="" xmlns:a16="http://schemas.microsoft.com/office/drawing/2014/main" val="3542402808"/>
                   </a:ext>
                 </a:extLst>
               </a:tr>
@@ -6951,7 +6951,7 @@
                 </a:tc>
                 <a:extLst>
                   <a:ext uri="{0D108BD9-81ED-4DB2-BD59-A6C34878D82A}">
-                    <a16:rowId xmlns:a16="http://schemas.microsoft.com/office/drawing/2014/main" xmlns="" val="2532936412"/>
+                    <a16:rowId xmlns="" xmlns:a16="http://schemas.microsoft.com/office/drawing/2014/main" val="2532936412"/>
                   </a:ext>
                 </a:extLst>
               </a:tr>
@@ -7312,7 +7312,7 @@
                 </a:tc>
                 <a:extLst>
                   <a:ext uri="{0D108BD9-81ED-4DB2-BD59-A6C34878D82A}">
-                    <a16:rowId xmlns:a16="http://schemas.microsoft.com/office/drawing/2014/main" xmlns="" val="4225065987"/>
+                    <a16:rowId xmlns="" xmlns:a16="http://schemas.microsoft.com/office/drawing/2014/main" val="4225065987"/>
                   </a:ext>
                 </a:extLst>
               </a:tr>
@@ -7733,7 +7733,7 @@
                 </a:tc>
                 <a:extLst>
                   <a:ext uri="{0D108BD9-81ED-4DB2-BD59-A6C34878D82A}">
-                    <a16:rowId xmlns:a16="http://schemas.microsoft.com/office/drawing/2014/main" xmlns="" val="192872345"/>
+                    <a16:rowId xmlns="" xmlns:a16="http://schemas.microsoft.com/office/drawing/2014/main" val="192872345"/>
                   </a:ext>
                 </a:extLst>
               </a:tr>
@@ -8163,7 +8163,7 @@
                 </a:tc>
                 <a:extLst>
                   <a:ext uri="{0D108BD9-81ED-4DB2-BD59-A6C34878D82A}">
-                    <a16:rowId xmlns:a16="http://schemas.microsoft.com/office/drawing/2014/main" xmlns="" val="2602478176"/>
+                    <a16:rowId xmlns="" xmlns:a16="http://schemas.microsoft.com/office/drawing/2014/main" val="2602478176"/>
                   </a:ext>
                 </a:extLst>
               </a:tr>
@@ -8584,7 +8584,7 @@
                 </a:tc>
                 <a:extLst>
                   <a:ext uri="{0D108BD9-81ED-4DB2-BD59-A6C34878D82A}">
-                    <a16:rowId xmlns:a16="http://schemas.microsoft.com/office/drawing/2014/main" xmlns="" val="4028391644"/>
+                    <a16:rowId xmlns="" xmlns:a16="http://schemas.microsoft.com/office/drawing/2014/main" val="4028391644"/>
                   </a:ext>
                 </a:extLst>
               </a:tr>
@@ -8998,7 +8998,7 @@
                 </a:tc>
                 <a:extLst>
                   <a:ext uri="{0D108BD9-81ED-4DB2-BD59-A6C34878D82A}">
-                    <a16:rowId xmlns:a16="http://schemas.microsoft.com/office/drawing/2014/main" xmlns="" val="1378805028"/>
+                    <a16:rowId xmlns="" xmlns:a16="http://schemas.microsoft.com/office/drawing/2014/main" val="1378805028"/>
                   </a:ext>
                 </a:extLst>
               </a:tr>
@@ -9419,7 +9419,7 @@
                 </a:tc>
                 <a:extLst>
                   <a:ext uri="{0D108BD9-81ED-4DB2-BD59-A6C34878D82A}">
-                    <a16:rowId xmlns:a16="http://schemas.microsoft.com/office/drawing/2014/main" xmlns="" val="3039267408"/>
+                    <a16:rowId xmlns="" xmlns:a16="http://schemas.microsoft.com/office/drawing/2014/main" val="3039267408"/>
                   </a:ext>
                 </a:extLst>
               </a:tr>
@@ -9625,7 +9625,7 @@
                 </a:tc>
                 <a:extLst>
                   <a:ext uri="{0D108BD9-81ED-4DB2-BD59-A6C34878D82A}">
-                    <a16:rowId xmlns:a16="http://schemas.microsoft.com/office/drawing/2014/main" xmlns="" val="1568849452"/>
+                    <a16:rowId xmlns="" xmlns:a16="http://schemas.microsoft.com/office/drawing/2014/main" val="1568849452"/>
                   </a:ext>
                 </a:extLst>
               </a:tr>
@@ -9638,7 +9638,7 @@
           <p:cNvPr id="2" name="제목 1">
             <a:extLst>
               <a:ext uri="{FF2B5EF4-FFF2-40B4-BE49-F238E27FC236}">
-                <a16:creationId xmlns:a16="http://schemas.microsoft.com/office/drawing/2014/main" xmlns="" id="{36E46BD5-9BF8-4A36-B399-C907B8D17343}"/>
+                <a16:creationId xmlns="" xmlns:a16="http://schemas.microsoft.com/office/drawing/2014/main" id="{36E46BD5-9BF8-4A36-B399-C907B8D17343}"/>
               </a:ext>
             </a:extLst>
           </p:cNvPr>
@@ -9678,7 +9678,7 @@
           <p:cNvPr id="37" name="내용 개체 틀 2">
             <a:extLst>
               <a:ext uri="{FF2B5EF4-FFF2-40B4-BE49-F238E27FC236}">
-                <a16:creationId xmlns:a16="http://schemas.microsoft.com/office/drawing/2014/main" xmlns="" id="{5B46A43F-CED7-4526-81B5-2A8AAB741294}"/>
+                <a16:creationId xmlns="" xmlns:a16="http://schemas.microsoft.com/office/drawing/2014/main" id="{5B46A43F-CED7-4526-81B5-2A8AAB741294}"/>
               </a:ext>
             </a:extLst>
           </p:cNvPr>
@@ -9729,7 +9729,7 @@
           <p:cNvPr id="10" name="사각형: 둥근 모서리 9">
             <a:extLst>
               <a:ext uri="{FF2B5EF4-FFF2-40B4-BE49-F238E27FC236}">
-                <a16:creationId xmlns:a16="http://schemas.microsoft.com/office/drawing/2014/main" xmlns="" id="{B91D69BA-2D35-4056-BBF1-4D6664EC4F4E}"/>
+                <a16:creationId xmlns="" xmlns:a16="http://schemas.microsoft.com/office/drawing/2014/main" id="{B91D69BA-2D35-4056-BBF1-4D6664EC4F4E}"/>
               </a:ext>
             </a:extLst>
           </p:cNvPr>
@@ -9779,7 +9779,7 @@
           <p:cNvPr id="11" name="사각형: 둥근 모서리 10">
             <a:extLst>
               <a:ext uri="{FF2B5EF4-FFF2-40B4-BE49-F238E27FC236}">
-                <a16:creationId xmlns:a16="http://schemas.microsoft.com/office/drawing/2014/main" xmlns="" id="{137F656A-CC89-4D71-B5D3-2A9A767E4C65}"/>
+                <a16:creationId xmlns="" xmlns:a16="http://schemas.microsoft.com/office/drawing/2014/main" id="{137F656A-CC89-4D71-B5D3-2A9A767E4C65}"/>
               </a:ext>
             </a:extLst>
           </p:cNvPr>
@@ -9829,7 +9829,7 @@
           <p:cNvPr id="13" name="표 10">
             <a:extLst>
               <a:ext uri="{FF2B5EF4-FFF2-40B4-BE49-F238E27FC236}">
-                <a16:creationId xmlns:a16="http://schemas.microsoft.com/office/drawing/2014/main" xmlns="" id="{0A3149E0-1410-4427-9E54-BDCD604753F5}"/>
+                <a16:creationId xmlns="" xmlns:a16="http://schemas.microsoft.com/office/drawing/2014/main" id="{0A3149E0-1410-4427-9E54-BDCD604753F5}"/>
               </a:ext>
             </a:extLst>
           </p:cNvPr>
@@ -9858,14 +9858,14 @@
                 <a:gridCol w="829862">
                   <a:extLst>
                     <a:ext uri="{9D8B030D-6E8A-4147-A177-3AD203B41FA5}">
-                      <a16:colId xmlns:a16="http://schemas.microsoft.com/office/drawing/2014/main" xmlns="" val="1237496162"/>
+                      <a16:colId xmlns="" xmlns:a16="http://schemas.microsoft.com/office/drawing/2014/main" val="1237496162"/>
                     </a:ext>
                   </a:extLst>
                 </a:gridCol>
                 <a:gridCol w="313137">
                   <a:extLst>
                     <a:ext uri="{9D8B030D-6E8A-4147-A177-3AD203B41FA5}">
-                      <a16:colId xmlns:a16="http://schemas.microsoft.com/office/drawing/2014/main" xmlns="" val="2799200606"/>
+                      <a16:colId xmlns="" xmlns:a16="http://schemas.microsoft.com/office/drawing/2014/main" val="2799200606"/>
                     </a:ext>
                   </a:extLst>
                 </a:gridCol>
@@ -9909,7 +9909,7 @@
                 </a:tc>
                 <a:extLst>
                   <a:ext uri="{0D108BD9-81ED-4DB2-BD59-A6C34878D82A}">
-                    <a16:rowId xmlns:a16="http://schemas.microsoft.com/office/drawing/2014/main" xmlns="" val="3721100454"/>
+                    <a16:rowId xmlns="" xmlns:a16="http://schemas.microsoft.com/office/drawing/2014/main" val="3721100454"/>
                   </a:ext>
                 </a:extLst>
               </a:tr>
@@ -9922,7 +9922,7 @@
           <p:cNvPr id="5" name="사각형: 둥근 모서리 4">
             <a:extLst>
               <a:ext uri="{FF2B5EF4-FFF2-40B4-BE49-F238E27FC236}">
-                <a16:creationId xmlns:a16="http://schemas.microsoft.com/office/drawing/2014/main" xmlns="" id="{8823398C-1D36-4C21-899F-7F53D945F610}"/>
+                <a16:creationId xmlns="" xmlns:a16="http://schemas.microsoft.com/office/drawing/2014/main" id="{8823398C-1D36-4C21-899F-7F53D945F610}"/>
               </a:ext>
             </a:extLst>
           </p:cNvPr>
@@ -9978,7 +9978,7 @@
           <p:cNvPr id="15" name="표 10">
             <a:extLst>
               <a:ext uri="{FF2B5EF4-FFF2-40B4-BE49-F238E27FC236}">
-                <a16:creationId xmlns:a16="http://schemas.microsoft.com/office/drawing/2014/main" xmlns="" id="{A623B9AC-D84F-442B-91AC-C6AF5E81FB63}"/>
+                <a16:creationId xmlns="" xmlns:a16="http://schemas.microsoft.com/office/drawing/2014/main" id="{A623B9AC-D84F-442B-91AC-C6AF5E81FB63}"/>
               </a:ext>
             </a:extLst>
           </p:cNvPr>
@@ -10007,14 +10007,14 @@
                 <a:gridCol w="829862">
                   <a:extLst>
                     <a:ext uri="{9D8B030D-6E8A-4147-A177-3AD203B41FA5}">
-                      <a16:colId xmlns:a16="http://schemas.microsoft.com/office/drawing/2014/main" xmlns="" val="1237496162"/>
+                      <a16:colId xmlns="" xmlns:a16="http://schemas.microsoft.com/office/drawing/2014/main" val="1237496162"/>
                     </a:ext>
                   </a:extLst>
                 </a:gridCol>
                 <a:gridCol w="313137">
                   <a:extLst>
                     <a:ext uri="{9D8B030D-6E8A-4147-A177-3AD203B41FA5}">
-                      <a16:colId xmlns:a16="http://schemas.microsoft.com/office/drawing/2014/main" xmlns="" val="2799200606"/>
+                      <a16:colId xmlns="" xmlns:a16="http://schemas.microsoft.com/office/drawing/2014/main" val="2799200606"/>
                     </a:ext>
                   </a:extLst>
                 </a:gridCol>
@@ -10058,7 +10058,7 @@
                 </a:tc>
                 <a:extLst>
                   <a:ext uri="{0D108BD9-81ED-4DB2-BD59-A6C34878D82A}">
-                    <a16:rowId xmlns:a16="http://schemas.microsoft.com/office/drawing/2014/main" xmlns="" val="3721100454"/>
+                    <a16:rowId xmlns="" xmlns:a16="http://schemas.microsoft.com/office/drawing/2014/main" val="3721100454"/>
                   </a:ext>
                 </a:extLst>
               </a:tr>
@@ -10099,7 +10099,7 @@
                 </a:tc>
                 <a:extLst>
                   <a:ext uri="{0D108BD9-81ED-4DB2-BD59-A6C34878D82A}">
-                    <a16:rowId xmlns:a16="http://schemas.microsoft.com/office/drawing/2014/main" xmlns="" val="3825850352"/>
+                    <a16:rowId xmlns="" xmlns:a16="http://schemas.microsoft.com/office/drawing/2014/main" val="3825850352"/>
                   </a:ext>
                 </a:extLst>
               </a:tr>
@@ -10135,7 +10135,7 @@
                 </a:tc>
                 <a:extLst>
                   <a:ext uri="{0D108BD9-81ED-4DB2-BD59-A6C34878D82A}">
-                    <a16:rowId xmlns:a16="http://schemas.microsoft.com/office/drawing/2014/main" xmlns="" val="3811300979"/>
+                    <a16:rowId xmlns="" xmlns:a16="http://schemas.microsoft.com/office/drawing/2014/main" val="3811300979"/>
                   </a:ext>
                 </a:extLst>
               </a:tr>
@@ -10171,7 +10171,7 @@
                 </a:tc>
                 <a:extLst>
                   <a:ext uri="{0D108BD9-81ED-4DB2-BD59-A6C34878D82A}">
-                    <a16:rowId xmlns:a16="http://schemas.microsoft.com/office/drawing/2014/main" xmlns="" val="841827210"/>
+                    <a16:rowId xmlns="" xmlns:a16="http://schemas.microsoft.com/office/drawing/2014/main" val="841827210"/>
                   </a:ext>
                 </a:extLst>
               </a:tr>
@@ -10207,7 +10207,7 @@
                 </a:tc>
                 <a:extLst>
                   <a:ext uri="{0D108BD9-81ED-4DB2-BD59-A6C34878D82A}">
-                    <a16:rowId xmlns:a16="http://schemas.microsoft.com/office/drawing/2014/main" xmlns="" val="3116628403"/>
+                    <a16:rowId xmlns="" xmlns:a16="http://schemas.microsoft.com/office/drawing/2014/main" val="3116628403"/>
                   </a:ext>
                 </a:extLst>
               </a:tr>
@@ -10244,7 +10244,7 @@
                 </a:tc>
                 <a:extLst>
                   <a:ext uri="{0D108BD9-81ED-4DB2-BD59-A6C34878D82A}">
-                    <a16:rowId xmlns:a16="http://schemas.microsoft.com/office/drawing/2014/main" xmlns="" val="1449583920"/>
+                    <a16:rowId xmlns="" xmlns:a16="http://schemas.microsoft.com/office/drawing/2014/main" val="1449583920"/>
                   </a:ext>
                 </a:extLst>
               </a:tr>
@@ -10257,7 +10257,7 @@
           <p:cNvPr id="14" name="연결선: 꺾임 13">
             <a:extLst>
               <a:ext uri="{FF2B5EF4-FFF2-40B4-BE49-F238E27FC236}">
-                <a16:creationId xmlns:a16="http://schemas.microsoft.com/office/drawing/2014/main" xmlns="" id="{5284A717-81BD-4052-9536-CCE582A603C0}"/>
+                <a16:creationId xmlns="" xmlns:a16="http://schemas.microsoft.com/office/drawing/2014/main" id="{5284A717-81BD-4052-9536-CCE582A603C0}"/>
               </a:ext>
             </a:extLst>
           </p:cNvPr>
@@ -10303,7 +10303,7 @@
           <p:cNvPr id="21" name="사각형: 둥근 모서리 20">
             <a:extLst>
               <a:ext uri="{FF2B5EF4-FFF2-40B4-BE49-F238E27FC236}">
-                <a16:creationId xmlns:a16="http://schemas.microsoft.com/office/drawing/2014/main" xmlns="" id="{37C03883-D205-4AFD-B82A-B9362BF09D6E}"/>
+                <a16:creationId xmlns="" xmlns:a16="http://schemas.microsoft.com/office/drawing/2014/main" id="{37C03883-D205-4AFD-B82A-B9362BF09D6E}"/>
               </a:ext>
             </a:extLst>
           </p:cNvPr>
@@ -10371,7 +10371,7 @@
           <p:cNvPr id="25" name="연결선: 꺾임 24">
             <a:extLst>
               <a:ext uri="{FF2B5EF4-FFF2-40B4-BE49-F238E27FC236}">
-                <a16:creationId xmlns:a16="http://schemas.microsoft.com/office/drawing/2014/main" xmlns="" id="{40DC4B4B-2F6E-4961-8153-C4AC4684CEB5}"/>
+                <a16:creationId xmlns="" xmlns:a16="http://schemas.microsoft.com/office/drawing/2014/main" id="{40DC4B4B-2F6E-4961-8153-C4AC4684CEB5}"/>
               </a:ext>
             </a:extLst>
           </p:cNvPr>
@@ -10445,7 +10445,7 @@
           <p:cNvPr id="2" name="제목 1">
             <a:extLst>
               <a:ext uri="{FF2B5EF4-FFF2-40B4-BE49-F238E27FC236}">
-                <a16:creationId xmlns:a16="http://schemas.microsoft.com/office/drawing/2014/main" xmlns="" id="{36E46BD5-9BF8-4A36-B399-C907B8D17343}"/>
+                <a16:creationId xmlns="" xmlns:a16="http://schemas.microsoft.com/office/drawing/2014/main" id="{36E46BD5-9BF8-4A36-B399-C907B8D17343}"/>
               </a:ext>
             </a:extLst>
           </p:cNvPr>
@@ -10485,7 +10485,7 @@
           <p:cNvPr id="37" name="내용 개체 틀 2">
             <a:extLst>
               <a:ext uri="{FF2B5EF4-FFF2-40B4-BE49-F238E27FC236}">
-                <a16:creationId xmlns:a16="http://schemas.microsoft.com/office/drawing/2014/main" xmlns="" id="{5B46A43F-CED7-4526-81B5-2A8AAB741294}"/>
+                <a16:creationId xmlns="" xmlns:a16="http://schemas.microsoft.com/office/drawing/2014/main" id="{5B46A43F-CED7-4526-81B5-2A8AAB741294}"/>
               </a:ext>
             </a:extLst>
           </p:cNvPr>
@@ -10560,7 +10560,7 @@
           <p:cNvPr id="16" name="표 3">
             <a:extLst>
               <a:ext uri="{FF2B5EF4-FFF2-40B4-BE49-F238E27FC236}">
-                <a16:creationId xmlns:a16="http://schemas.microsoft.com/office/drawing/2014/main" xmlns="" id="{38C9222A-1447-4863-BC8E-653D305308C7}"/>
+                <a16:creationId xmlns="" xmlns:a16="http://schemas.microsoft.com/office/drawing/2014/main" id="{38C9222A-1447-4863-BC8E-653D305308C7}"/>
               </a:ext>
             </a:extLst>
           </p:cNvPr>
@@ -10589,42 +10589,42 @@
                 <a:gridCol w="711060">
                   <a:extLst>
                     <a:ext uri="{9D8B030D-6E8A-4147-A177-3AD203B41FA5}">
-                      <a16:colId xmlns:a16="http://schemas.microsoft.com/office/drawing/2014/main" xmlns="" val="1372607456"/>
+                      <a16:colId xmlns="" xmlns:a16="http://schemas.microsoft.com/office/drawing/2014/main" val="1372607456"/>
                     </a:ext>
                   </a:extLst>
                 </a:gridCol>
                 <a:gridCol w="1161095">
                   <a:extLst>
                     <a:ext uri="{9D8B030D-6E8A-4147-A177-3AD203B41FA5}">
-                      <a16:colId xmlns:a16="http://schemas.microsoft.com/office/drawing/2014/main" xmlns="" val="1380570509"/>
+                      <a16:colId xmlns="" xmlns:a16="http://schemas.microsoft.com/office/drawing/2014/main" val="1380570509"/>
                     </a:ext>
                   </a:extLst>
                 </a:gridCol>
                 <a:gridCol w="936078">
                   <a:extLst>
                     <a:ext uri="{9D8B030D-6E8A-4147-A177-3AD203B41FA5}">
-                      <a16:colId xmlns:a16="http://schemas.microsoft.com/office/drawing/2014/main" xmlns="" val="2977900315"/>
+                      <a16:colId xmlns="" xmlns:a16="http://schemas.microsoft.com/office/drawing/2014/main" val="2977900315"/>
                     </a:ext>
                   </a:extLst>
                 </a:gridCol>
                 <a:gridCol w="936078">
                   <a:extLst>
                     <a:ext uri="{9D8B030D-6E8A-4147-A177-3AD203B41FA5}">
-                      <a16:colId xmlns:a16="http://schemas.microsoft.com/office/drawing/2014/main" xmlns="" val="1175216800"/>
+                      <a16:colId xmlns="" xmlns:a16="http://schemas.microsoft.com/office/drawing/2014/main" val="1175216800"/>
                     </a:ext>
                   </a:extLst>
                 </a:gridCol>
                 <a:gridCol w="1119789">
                   <a:extLst>
                     <a:ext uri="{9D8B030D-6E8A-4147-A177-3AD203B41FA5}">
-                      <a16:colId xmlns:a16="http://schemas.microsoft.com/office/drawing/2014/main" xmlns="" val="2560425116"/>
+                      <a16:colId xmlns="" xmlns:a16="http://schemas.microsoft.com/office/drawing/2014/main" val="2560425116"/>
                     </a:ext>
                   </a:extLst>
                 </a:gridCol>
                 <a:gridCol w="752366">
                   <a:extLst>
                     <a:ext uri="{9D8B030D-6E8A-4147-A177-3AD203B41FA5}">
-                      <a16:colId xmlns:a16="http://schemas.microsoft.com/office/drawing/2014/main" xmlns="" val="432903075"/>
+                      <a16:colId xmlns="" xmlns:a16="http://schemas.microsoft.com/office/drawing/2014/main" val="432903075"/>
                     </a:ext>
                   </a:extLst>
                 </a:gridCol>
@@ -10837,7 +10837,7 @@
                 </a:tc>
                 <a:extLst>
                   <a:ext uri="{0D108BD9-81ED-4DB2-BD59-A6C34878D82A}">
-                    <a16:rowId xmlns:a16="http://schemas.microsoft.com/office/drawing/2014/main" xmlns="" val="2317486986"/>
+                    <a16:rowId xmlns="" xmlns:a16="http://schemas.microsoft.com/office/drawing/2014/main" val="2317486986"/>
                   </a:ext>
                 </a:extLst>
               </a:tr>
@@ -11015,7 +11015,7 @@
                 </a:tc>
                 <a:extLst>
                   <a:ext uri="{0D108BD9-81ED-4DB2-BD59-A6C34878D82A}">
-                    <a16:rowId xmlns:a16="http://schemas.microsoft.com/office/drawing/2014/main" xmlns="" val="2025722290"/>
+                    <a16:rowId xmlns="" xmlns:a16="http://schemas.microsoft.com/office/drawing/2014/main" val="2025722290"/>
                   </a:ext>
                 </a:extLst>
               </a:tr>
@@ -11235,7 +11235,7 @@
                 </a:tc>
                 <a:extLst>
                   <a:ext uri="{0D108BD9-81ED-4DB2-BD59-A6C34878D82A}">
-                    <a16:rowId xmlns:a16="http://schemas.microsoft.com/office/drawing/2014/main" xmlns="" val="2532936412"/>
+                    <a16:rowId xmlns="" xmlns:a16="http://schemas.microsoft.com/office/drawing/2014/main" val="2532936412"/>
                   </a:ext>
                 </a:extLst>
               </a:tr>
@@ -11629,7 +11629,7 @@
                 </a:tc>
                 <a:extLst>
                   <a:ext uri="{0D108BD9-81ED-4DB2-BD59-A6C34878D82A}">
-                    <a16:rowId xmlns:a16="http://schemas.microsoft.com/office/drawing/2014/main" xmlns="" val="4225065987"/>
+                    <a16:rowId xmlns="" xmlns:a16="http://schemas.microsoft.com/office/drawing/2014/main" val="4225065987"/>
                   </a:ext>
                 </a:extLst>
               </a:tr>
@@ -11889,7 +11889,7 @@
                 </a:tc>
                 <a:extLst>
                   <a:ext uri="{0D108BD9-81ED-4DB2-BD59-A6C34878D82A}">
-                    <a16:rowId xmlns:a16="http://schemas.microsoft.com/office/drawing/2014/main" xmlns="" val="953435538"/>
+                    <a16:rowId xmlns="" xmlns:a16="http://schemas.microsoft.com/office/drawing/2014/main" val="953435538"/>
                   </a:ext>
                 </a:extLst>
               </a:tr>
@@ -12149,7 +12149,7 @@
                 </a:tc>
                 <a:extLst>
                   <a:ext uri="{0D108BD9-81ED-4DB2-BD59-A6C34878D82A}">
-                    <a16:rowId xmlns:a16="http://schemas.microsoft.com/office/drawing/2014/main" xmlns="" val="2523456806"/>
+                    <a16:rowId xmlns="" xmlns:a16="http://schemas.microsoft.com/office/drawing/2014/main" val="2523456806"/>
                   </a:ext>
                 </a:extLst>
               </a:tr>
@@ -12336,7 +12336,7 @@
                 </a:tc>
                 <a:extLst>
                   <a:ext uri="{0D108BD9-81ED-4DB2-BD59-A6C34878D82A}">
-                    <a16:rowId xmlns:a16="http://schemas.microsoft.com/office/drawing/2014/main" xmlns="" val="1568849452"/>
+                    <a16:rowId xmlns="" xmlns:a16="http://schemas.microsoft.com/office/drawing/2014/main" val="1568849452"/>
                   </a:ext>
                 </a:extLst>
               </a:tr>
@@ -12379,7 +12379,7 @@
           <p:cNvPr id="23" name="표 3">
             <a:extLst>
               <a:ext uri="{FF2B5EF4-FFF2-40B4-BE49-F238E27FC236}">
-                <a16:creationId xmlns:a16="http://schemas.microsoft.com/office/drawing/2014/main" xmlns="" id="{770EC27E-B593-4AC4-98DC-4BC9F711CDD1}"/>
+                <a16:creationId xmlns="" xmlns:a16="http://schemas.microsoft.com/office/drawing/2014/main" id="{770EC27E-B593-4AC4-98DC-4BC9F711CDD1}"/>
               </a:ext>
             </a:extLst>
           </p:cNvPr>
@@ -12408,28 +12408,28 @@
                 <a:gridCol w="711060">
                   <a:extLst>
                     <a:ext uri="{9D8B030D-6E8A-4147-A177-3AD203B41FA5}">
-                      <a16:colId xmlns:a16="http://schemas.microsoft.com/office/drawing/2014/main" xmlns="" val="1372607456"/>
+                      <a16:colId xmlns="" xmlns:a16="http://schemas.microsoft.com/office/drawing/2014/main" val="1372607456"/>
                     </a:ext>
                   </a:extLst>
                 </a:gridCol>
                 <a:gridCol w="2097173">
                   <a:extLst>
                     <a:ext uri="{9D8B030D-6E8A-4147-A177-3AD203B41FA5}">
-                      <a16:colId xmlns:a16="http://schemas.microsoft.com/office/drawing/2014/main" xmlns="" val="1380570509"/>
+                      <a16:colId xmlns="" xmlns:a16="http://schemas.microsoft.com/office/drawing/2014/main" val="1380570509"/>
                     </a:ext>
                   </a:extLst>
                 </a:gridCol>
                 <a:gridCol w="2055867">
                   <a:extLst>
                     <a:ext uri="{9D8B030D-6E8A-4147-A177-3AD203B41FA5}">
-                      <a16:colId xmlns:a16="http://schemas.microsoft.com/office/drawing/2014/main" xmlns="" val="1175216800"/>
+                      <a16:colId xmlns="" xmlns:a16="http://schemas.microsoft.com/office/drawing/2014/main" val="1175216800"/>
                     </a:ext>
                   </a:extLst>
                 </a:gridCol>
                 <a:gridCol w="752366">
                   <a:extLst>
                     <a:ext uri="{9D8B030D-6E8A-4147-A177-3AD203B41FA5}">
-                      <a16:colId xmlns:a16="http://schemas.microsoft.com/office/drawing/2014/main" xmlns="" val="432903075"/>
+                      <a16:colId xmlns="" xmlns:a16="http://schemas.microsoft.com/office/drawing/2014/main" val="432903075"/>
                     </a:ext>
                   </a:extLst>
                 </a:gridCol>
@@ -12620,7 +12620,7 @@
                 </a:tc>
                 <a:extLst>
                   <a:ext uri="{0D108BD9-81ED-4DB2-BD59-A6C34878D82A}">
-                    <a16:rowId xmlns:a16="http://schemas.microsoft.com/office/drawing/2014/main" xmlns="" val="2317486986"/>
+                    <a16:rowId xmlns="" xmlns:a16="http://schemas.microsoft.com/office/drawing/2014/main" val="2317486986"/>
                   </a:ext>
                 </a:extLst>
               </a:tr>
@@ -12776,7 +12776,7 @@
                 </a:tc>
                 <a:extLst>
                   <a:ext uri="{0D108BD9-81ED-4DB2-BD59-A6C34878D82A}">
-                    <a16:rowId xmlns:a16="http://schemas.microsoft.com/office/drawing/2014/main" xmlns="" val="2025722290"/>
+                    <a16:rowId xmlns="" xmlns:a16="http://schemas.microsoft.com/office/drawing/2014/main" val="2025722290"/>
                   </a:ext>
                 </a:extLst>
               </a:tr>
@@ -12976,7 +12976,7 @@
                 </a:tc>
                 <a:extLst>
                   <a:ext uri="{0D108BD9-81ED-4DB2-BD59-A6C34878D82A}">
-                    <a16:rowId xmlns:a16="http://schemas.microsoft.com/office/drawing/2014/main" xmlns="" val="2532936412"/>
+                    <a16:rowId xmlns="" xmlns:a16="http://schemas.microsoft.com/office/drawing/2014/main" val="2532936412"/>
                   </a:ext>
                 </a:extLst>
               </a:tr>
@@ -13272,7 +13272,7 @@
                 </a:tc>
                 <a:extLst>
                   <a:ext uri="{0D108BD9-81ED-4DB2-BD59-A6C34878D82A}">
-                    <a16:rowId xmlns:a16="http://schemas.microsoft.com/office/drawing/2014/main" xmlns="" val="4225065987"/>
+                    <a16:rowId xmlns="" xmlns:a16="http://schemas.microsoft.com/office/drawing/2014/main" val="4225065987"/>
                   </a:ext>
                 </a:extLst>
               </a:tr>
@@ -13398,7 +13398,7 @@
                 </a:tc>
                 <a:extLst>
                   <a:ext uri="{0D108BD9-81ED-4DB2-BD59-A6C34878D82A}">
-                    <a16:rowId xmlns:a16="http://schemas.microsoft.com/office/drawing/2014/main" xmlns="" val="953435538"/>
+                    <a16:rowId xmlns="" xmlns:a16="http://schemas.microsoft.com/office/drawing/2014/main" val="953435538"/>
                   </a:ext>
                 </a:extLst>
               </a:tr>
@@ -13545,7 +13545,7 @@
                 </a:tc>
                 <a:extLst>
                   <a:ext uri="{0D108BD9-81ED-4DB2-BD59-A6C34878D82A}">
-                    <a16:rowId xmlns:a16="http://schemas.microsoft.com/office/drawing/2014/main" xmlns="" val="1568849452"/>
+                    <a16:rowId xmlns="" xmlns:a16="http://schemas.microsoft.com/office/drawing/2014/main" val="1568849452"/>
                   </a:ext>
                 </a:extLst>
               </a:tr>
@@ -13558,7 +13558,7 @@
           <p:cNvPr id="2" name="제목 1">
             <a:extLst>
               <a:ext uri="{FF2B5EF4-FFF2-40B4-BE49-F238E27FC236}">
-                <a16:creationId xmlns:a16="http://schemas.microsoft.com/office/drawing/2014/main" xmlns="" id="{36E46BD5-9BF8-4A36-B399-C907B8D17343}"/>
+                <a16:creationId xmlns="" xmlns:a16="http://schemas.microsoft.com/office/drawing/2014/main" id="{36E46BD5-9BF8-4A36-B399-C907B8D17343}"/>
               </a:ext>
             </a:extLst>
           </p:cNvPr>
@@ -13598,7 +13598,7 @@
           <p:cNvPr id="37" name="내용 개체 틀 2">
             <a:extLst>
               <a:ext uri="{FF2B5EF4-FFF2-40B4-BE49-F238E27FC236}">
-                <a16:creationId xmlns:a16="http://schemas.microsoft.com/office/drawing/2014/main" xmlns="" id="{5B46A43F-CED7-4526-81B5-2A8AAB741294}"/>
+                <a16:creationId xmlns="" xmlns:a16="http://schemas.microsoft.com/office/drawing/2014/main" id="{5B46A43F-CED7-4526-81B5-2A8AAB741294}"/>
               </a:ext>
             </a:extLst>
           </p:cNvPr>
@@ -13673,7 +13673,7 @@
           <p:cNvPr id="5" name="사각형: 둥근 모서리 4">
             <a:extLst>
               <a:ext uri="{FF2B5EF4-FFF2-40B4-BE49-F238E27FC236}">
-                <a16:creationId xmlns:a16="http://schemas.microsoft.com/office/drawing/2014/main" xmlns="" id="{EBA3D73F-4799-48C6-9AF0-44E4BF75F072}"/>
+                <a16:creationId xmlns="" xmlns:a16="http://schemas.microsoft.com/office/drawing/2014/main" id="{EBA3D73F-4799-48C6-9AF0-44E4BF75F072}"/>
               </a:ext>
             </a:extLst>
           </p:cNvPr>
@@ -13727,7 +13727,7 @@
           <p:cNvPr id="6" name="사각형: 둥근 모서리 5">
             <a:extLst>
               <a:ext uri="{FF2B5EF4-FFF2-40B4-BE49-F238E27FC236}">
-                <a16:creationId xmlns:a16="http://schemas.microsoft.com/office/drawing/2014/main" xmlns="" id="{E9BA070E-1A3C-4413-AC9C-89DAEF339DF0}"/>
+                <a16:creationId xmlns="" xmlns:a16="http://schemas.microsoft.com/office/drawing/2014/main" id="{E9BA070E-1A3C-4413-AC9C-89DAEF339DF0}"/>
               </a:ext>
             </a:extLst>
           </p:cNvPr>
@@ -13781,7 +13781,7 @@
           <p:cNvPr id="7" name="사각형: 둥근 모서리 6">
             <a:extLst>
               <a:ext uri="{FF2B5EF4-FFF2-40B4-BE49-F238E27FC236}">
-                <a16:creationId xmlns:a16="http://schemas.microsoft.com/office/drawing/2014/main" xmlns="" id="{997F0BE7-45F0-4A53-85C0-BB5E5DB32BD8}"/>
+                <a16:creationId xmlns="" xmlns:a16="http://schemas.microsoft.com/office/drawing/2014/main" id="{997F0BE7-45F0-4A53-85C0-BB5E5DB32BD8}"/>
               </a:ext>
             </a:extLst>
           </p:cNvPr>
@@ -13835,7 +13835,7 @@
           <p:cNvPr id="8" name="사각형: 둥근 모서리 7">
             <a:extLst>
               <a:ext uri="{FF2B5EF4-FFF2-40B4-BE49-F238E27FC236}">
-                <a16:creationId xmlns:a16="http://schemas.microsoft.com/office/drawing/2014/main" xmlns="" id="{3E212AD5-71CA-48F5-B58F-9F261C0CF82D}"/>
+                <a16:creationId xmlns="" xmlns:a16="http://schemas.microsoft.com/office/drawing/2014/main" id="{3E212AD5-71CA-48F5-B58F-9F261C0CF82D}"/>
               </a:ext>
             </a:extLst>
           </p:cNvPr>
@@ -13889,7 +13889,7 @@
           <p:cNvPr id="9" name="사각형: 둥근 모서리 8">
             <a:extLst>
               <a:ext uri="{FF2B5EF4-FFF2-40B4-BE49-F238E27FC236}">
-                <a16:creationId xmlns:a16="http://schemas.microsoft.com/office/drawing/2014/main" xmlns="" id="{E20B7BB6-F4F0-45CF-8E60-F72A9B9E9B0C}"/>
+                <a16:creationId xmlns="" xmlns:a16="http://schemas.microsoft.com/office/drawing/2014/main" id="{E20B7BB6-F4F0-45CF-8E60-F72A9B9E9B0C}"/>
               </a:ext>
             </a:extLst>
           </p:cNvPr>
@@ -13943,7 +13943,7 @@
           <p:cNvPr id="10" name="사각형: 둥근 모서리 9">
             <a:extLst>
               <a:ext uri="{FF2B5EF4-FFF2-40B4-BE49-F238E27FC236}">
-                <a16:creationId xmlns:a16="http://schemas.microsoft.com/office/drawing/2014/main" xmlns="" id="{824D27A7-78F1-462D-85E3-C62D986557B2}"/>
+                <a16:creationId xmlns="" xmlns:a16="http://schemas.microsoft.com/office/drawing/2014/main" id="{824D27A7-78F1-462D-85E3-C62D986557B2}"/>
               </a:ext>
             </a:extLst>
           </p:cNvPr>
@@ -13997,7 +13997,7 @@
           <p:cNvPr id="11" name="사각형: 둥근 모서리 10">
             <a:extLst>
               <a:ext uri="{FF2B5EF4-FFF2-40B4-BE49-F238E27FC236}">
-                <a16:creationId xmlns:a16="http://schemas.microsoft.com/office/drawing/2014/main" xmlns="" id="{9EB0486B-AC20-4B9B-A17D-6C98BE4285A2}"/>
+                <a16:creationId xmlns="" xmlns:a16="http://schemas.microsoft.com/office/drawing/2014/main" id="{9EB0486B-AC20-4B9B-A17D-6C98BE4285A2}"/>
               </a:ext>
             </a:extLst>
           </p:cNvPr>
@@ -14051,7 +14051,7 @@
           <p:cNvPr id="12" name="사각형: 둥근 모서리 11">
             <a:extLst>
               <a:ext uri="{FF2B5EF4-FFF2-40B4-BE49-F238E27FC236}">
-                <a16:creationId xmlns:a16="http://schemas.microsoft.com/office/drawing/2014/main" xmlns="" id="{1A505EB4-8536-43B4-8878-7DBEA57DD66A}"/>
+                <a16:creationId xmlns="" xmlns:a16="http://schemas.microsoft.com/office/drawing/2014/main" id="{1A505EB4-8536-43B4-8878-7DBEA57DD66A}"/>
               </a:ext>
             </a:extLst>
           </p:cNvPr>
@@ -14105,7 +14105,7 @@
           <p:cNvPr id="13" name="사각형: 둥근 모서리 12">
             <a:extLst>
               <a:ext uri="{FF2B5EF4-FFF2-40B4-BE49-F238E27FC236}">
-                <a16:creationId xmlns:a16="http://schemas.microsoft.com/office/drawing/2014/main" xmlns="" id="{8679F78C-DA8B-462F-9C74-76506B0849FE}"/>
+                <a16:creationId xmlns="" xmlns:a16="http://schemas.microsoft.com/office/drawing/2014/main" id="{8679F78C-DA8B-462F-9C74-76506B0849FE}"/>
               </a:ext>
             </a:extLst>
           </p:cNvPr>
@@ -14159,7 +14159,7 @@
           <p:cNvPr id="14" name="사각형: 둥근 모서리 13">
             <a:extLst>
               <a:ext uri="{FF2B5EF4-FFF2-40B4-BE49-F238E27FC236}">
-                <a16:creationId xmlns:a16="http://schemas.microsoft.com/office/drawing/2014/main" xmlns="" id="{EB285716-56E7-4A88-B886-6CCB7687D4C8}"/>
+                <a16:creationId xmlns="" xmlns:a16="http://schemas.microsoft.com/office/drawing/2014/main" id="{EB285716-56E7-4A88-B886-6CCB7687D4C8}"/>
               </a:ext>
             </a:extLst>
           </p:cNvPr>
@@ -14213,7 +14213,7 @@
           <p:cNvPr id="15" name="사각형: 둥근 모서리 14">
             <a:extLst>
               <a:ext uri="{FF2B5EF4-FFF2-40B4-BE49-F238E27FC236}">
-                <a16:creationId xmlns:a16="http://schemas.microsoft.com/office/drawing/2014/main" xmlns="" id="{6567BDED-8651-4860-B29B-370E33293D85}"/>
+                <a16:creationId xmlns="" xmlns:a16="http://schemas.microsoft.com/office/drawing/2014/main" id="{6567BDED-8651-4860-B29B-370E33293D85}"/>
               </a:ext>
             </a:extLst>
           </p:cNvPr>
@@ -14267,7 +14267,7 @@
           <p:cNvPr id="17" name="사각형: 둥근 모서리 16">
             <a:extLst>
               <a:ext uri="{FF2B5EF4-FFF2-40B4-BE49-F238E27FC236}">
-                <a16:creationId xmlns:a16="http://schemas.microsoft.com/office/drawing/2014/main" xmlns="" id="{89F5126D-A9A9-4CA8-B641-3A5B9CA07258}"/>
+                <a16:creationId xmlns="" xmlns:a16="http://schemas.microsoft.com/office/drawing/2014/main" id="{89F5126D-A9A9-4CA8-B641-3A5B9CA07258}"/>
               </a:ext>
             </a:extLst>
           </p:cNvPr>
@@ -14321,7 +14321,7 @@
           <p:cNvPr id="18" name="사각형: 둥근 모서리 17">
             <a:extLst>
               <a:ext uri="{FF2B5EF4-FFF2-40B4-BE49-F238E27FC236}">
-                <a16:creationId xmlns:a16="http://schemas.microsoft.com/office/drawing/2014/main" xmlns="" id="{CA7152C7-C995-4246-AEC8-C8B59C822D93}"/>
+                <a16:creationId xmlns="" xmlns:a16="http://schemas.microsoft.com/office/drawing/2014/main" id="{CA7152C7-C995-4246-AEC8-C8B59C822D93}"/>
               </a:ext>
             </a:extLst>
           </p:cNvPr>
@@ -14375,7 +14375,7 @@
           <p:cNvPr id="19" name="사각형: 둥근 모서리 18">
             <a:extLst>
               <a:ext uri="{FF2B5EF4-FFF2-40B4-BE49-F238E27FC236}">
-                <a16:creationId xmlns:a16="http://schemas.microsoft.com/office/drawing/2014/main" xmlns="" id="{8F223857-3613-4213-9DDE-744278799050}"/>
+                <a16:creationId xmlns="" xmlns:a16="http://schemas.microsoft.com/office/drawing/2014/main" id="{8F223857-3613-4213-9DDE-744278799050}"/>
               </a:ext>
             </a:extLst>
           </p:cNvPr>
@@ -14429,7 +14429,7 @@
           <p:cNvPr id="20" name="사각형: 둥근 모서리 19">
             <a:extLst>
               <a:ext uri="{FF2B5EF4-FFF2-40B4-BE49-F238E27FC236}">
-                <a16:creationId xmlns:a16="http://schemas.microsoft.com/office/drawing/2014/main" xmlns="" id="{A2FEE913-5332-4880-81C2-5135D3652EED}"/>
+                <a16:creationId xmlns="" xmlns:a16="http://schemas.microsoft.com/office/drawing/2014/main" id="{A2FEE913-5332-4880-81C2-5135D3652EED}"/>
               </a:ext>
             </a:extLst>
           </p:cNvPr>
@@ -14483,7 +14483,7 @@
           <p:cNvPr id="21" name="사각형: 둥근 모서리 20">
             <a:extLst>
               <a:ext uri="{FF2B5EF4-FFF2-40B4-BE49-F238E27FC236}">
-                <a16:creationId xmlns:a16="http://schemas.microsoft.com/office/drawing/2014/main" xmlns="" id="{4B80A3B1-B279-4941-9529-C8D67064AA07}"/>
+                <a16:creationId xmlns="" xmlns:a16="http://schemas.microsoft.com/office/drawing/2014/main" id="{4B80A3B1-B279-4941-9529-C8D67064AA07}"/>
               </a:ext>
             </a:extLst>
           </p:cNvPr>
@@ -14567,7 +14567,7 @@
           <p:cNvPr id="2" name="제목 1">
             <a:extLst>
               <a:ext uri="{FF2B5EF4-FFF2-40B4-BE49-F238E27FC236}">
-                <a16:creationId xmlns:a16="http://schemas.microsoft.com/office/drawing/2014/main" xmlns="" id="{36E46BD5-9BF8-4A36-B399-C907B8D17343}"/>
+                <a16:creationId xmlns="" xmlns:a16="http://schemas.microsoft.com/office/drawing/2014/main" id="{36E46BD5-9BF8-4A36-B399-C907B8D17343}"/>
               </a:ext>
             </a:extLst>
           </p:cNvPr>
@@ -14607,7 +14607,7 @@
           <p:cNvPr id="19" name="내용 개체 틀 2">
             <a:extLst>
               <a:ext uri="{FF2B5EF4-FFF2-40B4-BE49-F238E27FC236}">
-                <a16:creationId xmlns:a16="http://schemas.microsoft.com/office/drawing/2014/main" xmlns="" id="{4D34D8F2-FF5E-4CA9-9059-0D0AB8A7FDCB}"/>
+                <a16:creationId xmlns="" xmlns:a16="http://schemas.microsoft.com/office/drawing/2014/main" id="{4D34D8F2-FF5E-4CA9-9059-0D0AB8A7FDCB}"/>
               </a:ext>
             </a:extLst>
           </p:cNvPr>
@@ -14675,7 +14675,7 @@
           <p:cNvPr id="15" name="직사각형 14">
             <a:extLst>
               <a:ext uri="{FF2B5EF4-FFF2-40B4-BE49-F238E27FC236}">
-                <a16:creationId xmlns:a16="http://schemas.microsoft.com/office/drawing/2014/main" xmlns="" id="{64025FA9-3FD3-4DF4-9CF9-B440B670827C}"/>
+                <a16:creationId xmlns="" xmlns:a16="http://schemas.microsoft.com/office/drawing/2014/main" id="{64025FA9-3FD3-4DF4-9CF9-B440B670827C}"/>
               </a:ext>
             </a:extLst>
           </p:cNvPr>
@@ -14830,7 +14830,7 @@
           <p:cNvPr id="22" name="직사각형 21">
             <a:extLst>
               <a:ext uri="{FF2B5EF4-FFF2-40B4-BE49-F238E27FC236}">
-                <a16:creationId xmlns:a16="http://schemas.microsoft.com/office/drawing/2014/main" xmlns="" id="{898D2BEA-877B-4AC6-9C36-790568180BCE}"/>
+                <a16:creationId xmlns="" xmlns:a16="http://schemas.microsoft.com/office/drawing/2014/main" id="{898D2BEA-877B-4AC6-9C36-790568180BCE}"/>
               </a:ext>
             </a:extLst>
           </p:cNvPr>
@@ -14982,7 +14982,7 @@
           <p:cNvPr id="10" name="사각형: 둥근 모서리 9">
             <a:extLst>
               <a:ext uri="{FF2B5EF4-FFF2-40B4-BE49-F238E27FC236}">
-                <a16:creationId xmlns:a16="http://schemas.microsoft.com/office/drawing/2014/main" xmlns="" id="{D85AFA7A-E00C-4C12-A923-542CD29A57EE}"/>
+                <a16:creationId xmlns="" xmlns:a16="http://schemas.microsoft.com/office/drawing/2014/main" id="{D85AFA7A-E00C-4C12-A923-542CD29A57EE}"/>
               </a:ext>
             </a:extLst>
           </p:cNvPr>
@@ -15036,7 +15036,7 @@
           <p:cNvPr id="11" name="사각형: 둥근 모서리 10">
             <a:extLst>
               <a:ext uri="{FF2B5EF4-FFF2-40B4-BE49-F238E27FC236}">
-                <a16:creationId xmlns:a16="http://schemas.microsoft.com/office/drawing/2014/main" xmlns="" id="{6A94ACD3-FE6C-4209-9943-FF32139CDD8F}"/>
+                <a16:creationId xmlns="" xmlns:a16="http://schemas.microsoft.com/office/drawing/2014/main" id="{6A94ACD3-FE6C-4209-9943-FF32139CDD8F}"/>
               </a:ext>
             </a:extLst>
           </p:cNvPr>
@@ -15090,7 +15090,7 @@
           <p:cNvPr id="12" name="사각형: 둥근 모서리 11">
             <a:extLst>
               <a:ext uri="{FF2B5EF4-FFF2-40B4-BE49-F238E27FC236}">
-                <a16:creationId xmlns:a16="http://schemas.microsoft.com/office/drawing/2014/main" xmlns="" id="{34569FDE-8440-4882-8285-4EE4220167FB}"/>
+                <a16:creationId xmlns="" xmlns:a16="http://schemas.microsoft.com/office/drawing/2014/main" id="{34569FDE-8440-4882-8285-4EE4220167FB}"/>
               </a:ext>
             </a:extLst>
           </p:cNvPr>
@@ -15144,7 +15144,7 @@
           <p:cNvPr id="13" name="사각형: 둥근 모서리 12">
             <a:extLst>
               <a:ext uri="{FF2B5EF4-FFF2-40B4-BE49-F238E27FC236}">
-                <a16:creationId xmlns:a16="http://schemas.microsoft.com/office/drawing/2014/main" xmlns="" id="{3E0C8282-F1D1-4F57-BFF6-ACF9CA6E0524}"/>
+                <a16:creationId xmlns="" xmlns:a16="http://schemas.microsoft.com/office/drawing/2014/main" id="{3E0C8282-F1D1-4F57-BFF6-ACF9CA6E0524}"/>
               </a:ext>
             </a:extLst>
           </p:cNvPr>
@@ -15228,7 +15228,7 @@
           <p:cNvPr id="2" name="제목 1">
             <a:extLst>
               <a:ext uri="{FF2B5EF4-FFF2-40B4-BE49-F238E27FC236}">
-                <a16:creationId xmlns:a16="http://schemas.microsoft.com/office/drawing/2014/main" xmlns="" id="{36E46BD5-9BF8-4A36-B399-C907B8D17343}"/>
+                <a16:creationId xmlns="" xmlns:a16="http://schemas.microsoft.com/office/drawing/2014/main" id="{36E46BD5-9BF8-4A36-B399-C907B8D17343}"/>
               </a:ext>
             </a:extLst>
           </p:cNvPr>
@@ -15268,7 +15268,7 @@
           <p:cNvPr id="12" name="내용 개체 틀 2">
             <a:extLst>
               <a:ext uri="{FF2B5EF4-FFF2-40B4-BE49-F238E27FC236}">
-                <a16:creationId xmlns:a16="http://schemas.microsoft.com/office/drawing/2014/main" xmlns="" id="{135DF031-1573-492B-A38B-1FB524DF4CD3}"/>
+                <a16:creationId xmlns="" xmlns:a16="http://schemas.microsoft.com/office/drawing/2014/main" id="{135DF031-1573-492B-A38B-1FB524DF4CD3}"/>
               </a:ext>
             </a:extLst>
           </p:cNvPr>
@@ -15319,7 +15319,7 @@
           <p:cNvPr id="33" name="TextBox 32">
             <a:extLst>
               <a:ext uri="{FF2B5EF4-FFF2-40B4-BE49-F238E27FC236}">
-                <a16:creationId xmlns:a16="http://schemas.microsoft.com/office/drawing/2014/main" xmlns="" id="{814F800B-9B1A-4561-8FEE-E6438369C215}"/>
+                <a16:creationId xmlns="" xmlns:a16="http://schemas.microsoft.com/office/drawing/2014/main" id="{814F800B-9B1A-4561-8FEE-E6438369C215}"/>
               </a:ext>
             </a:extLst>
           </p:cNvPr>
@@ -15362,7 +15362,7 @@
           <p:cNvPr id="34" name="표 7">
             <a:extLst>
               <a:ext uri="{FF2B5EF4-FFF2-40B4-BE49-F238E27FC236}">
-                <a16:creationId xmlns:a16="http://schemas.microsoft.com/office/drawing/2014/main" xmlns="" id="{F5DEFE4D-6BB4-4DAC-8BF2-8B2D17530214}"/>
+                <a16:creationId xmlns="" xmlns:a16="http://schemas.microsoft.com/office/drawing/2014/main" id="{F5DEFE4D-6BB4-4DAC-8BF2-8B2D17530214}"/>
               </a:ext>
             </a:extLst>
           </p:cNvPr>
@@ -15372,14 +15372,14 @@
           <p:nvPr>
             <p:extLst>
               <p:ext uri="{D42A27DB-BD31-4B8C-83A1-F6EECF244321}">
-                <p14:modId xmlns:p14="http://schemas.microsoft.com/office/powerpoint/2010/main" val="4021584634"/>
+                <p14:modId xmlns:p14="http://schemas.microsoft.com/office/powerpoint/2010/main" val="2952935456"/>
               </p:ext>
             </p:extLst>
           </p:nvPr>
         </p:nvGraphicFramePr>
         <p:xfrm>
           <a:off x="3181523" y="3263390"/>
-          <a:ext cx="4683763" cy="3342810"/>
+          <a:ext cx="4683763" cy="3175030"/>
         </p:xfrm>
         <a:graphic>
           <a:graphicData uri="http://schemas.openxmlformats.org/drawingml/2006/table">
@@ -15391,28 +15391,28 @@
                 <a:gridCol w="1561254">
                   <a:extLst>
                     <a:ext uri="{9D8B030D-6E8A-4147-A177-3AD203B41FA5}">
-                      <a16:colId xmlns:a16="http://schemas.microsoft.com/office/drawing/2014/main" xmlns="" val="107667662"/>
+                      <a16:colId xmlns="" xmlns:a16="http://schemas.microsoft.com/office/drawing/2014/main" val="107667662"/>
                     </a:ext>
                   </a:extLst>
                 </a:gridCol>
                 <a:gridCol w="780628">
                   <a:extLst>
                     <a:ext uri="{9D8B030D-6E8A-4147-A177-3AD203B41FA5}">
-                      <a16:colId xmlns:a16="http://schemas.microsoft.com/office/drawing/2014/main" xmlns="" val="3419335263"/>
+                      <a16:colId xmlns="" xmlns:a16="http://schemas.microsoft.com/office/drawing/2014/main" val="3419335263"/>
                     </a:ext>
                   </a:extLst>
                 </a:gridCol>
                 <a:gridCol w="780627">
                   <a:extLst>
                     <a:ext uri="{9D8B030D-6E8A-4147-A177-3AD203B41FA5}">
-                      <a16:colId xmlns:a16="http://schemas.microsoft.com/office/drawing/2014/main" xmlns="" val="1487680637"/>
+                      <a16:colId xmlns="" xmlns:a16="http://schemas.microsoft.com/office/drawing/2014/main" val="1487680637"/>
                     </a:ext>
                   </a:extLst>
                 </a:gridCol>
                 <a:gridCol w="1561254">
                   <a:extLst>
                     <a:ext uri="{9D8B030D-6E8A-4147-A177-3AD203B41FA5}">
-                      <a16:colId xmlns:a16="http://schemas.microsoft.com/office/drawing/2014/main" xmlns="" val="1993010660"/>
+                      <a16:colId xmlns="" xmlns:a16="http://schemas.microsoft.com/office/drawing/2014/main" val="1993010660"/>
                     </a:ext>
                   </a:extLst>
                 </a:gridCol>
@@ -15562,7 +15562,7 @@
                 </a:tc>
                 <a:extLst>
                   <a:ext uri="{0D108BD9-81ED-4DB2-BD59-A6C34878D82A}">
-                    <a16:rowId xmlns:a16="http://schemas.microsoft.com/office/drawing/2014/main" xmlns="" val="1720057414"/>
+                    <a16:rowId xmlns="" xmlns:a16="http://schemas.microsoft.com/office/drawing/2014/main" val="1720057414"/>
                   </a:ext>
                 </a:extLst>
               </a:tr>
@@ -15705,7 +15705,7 @@
                 </a:tc>
                 <a:extLst>
                   <a:ext uri="{0D108BD9-81ED-4DB2-BD59-A6C34878D82A}">
-                    <a16:rowId xmlns:a16="http://schemas.microsoft.com/office/drawing/2014/main" xmlns="" val="1903726510"/>
+                    <a16:rowId xmlns="" xmlns:a16="http://schemas.microsoft.com/office/drawing/2014/main" val="1903726510"/>
                   </a:ext>
                 </a:extLst>
               </a:tr>
@@ -15848,7 +15848,7 @@
                 </a:tc>
                 <a:extLst>
                   <a:ext uri="{0D108BD9-81ED-4DB2-BD59-A6C34878D82A}">
-                    <a16:rowId xmlns:a16="http://schemas.microsoft.com/office/drawing/2014/main" xmlns="" val="187047202"/>
+                    <a16:rowId xmlns="" xmlns:a16="http://schemas.microsoft.com/office/drawing/2014/main" val="187047202"/>
                   </a:ext>
                 </a:extLst>
               </a:tr>
@@ -16089,9 +16089,213 @@
                 </a:tc>
                 <a:extLst>
                   <a:ext uri="{0D108BD9-81ED-4DB2-BD59-A6C34878D82A}">
-                    <a16:rowId xmlns:a16="http://schemas.microsoft.com/office/drawing/2014/main" xmlns="" val="338824605"/>
+                    <a16:rowId xmlns="" xmlns:a16="http://schemas.microsoft.com/office/drawing/2014/main" val="338824605"/>
                   </a:ext>
                 </a:extLst>
+              </a:tr>
+              <a:tr h="441820">
+                <a:tc gridSpan="4">
+                  <a:txBody>
+                    <a:bodyPr/>
+                    <a:lstStyle/>
+                    <a:p>
+                      <a:pPr algn="ctr" latinLnBrk="1"/>
+                      <a:r>
+                        <a:rPr lang="ko-KR" altLang="en-US" sz="1600" smtClean="0">
+                          <a:solidFill>
+                            <a:schemeClr val="tx1"/>
+                          </a:solidFill>
+                          <a:latin typeface="나눔스퀘어" panose="020B0600000101010101" pitchFamily="50" charset="-127"/>
+                          <a:ea typeface="나눔스퀘어" panose="020B0600000101010101" pitchFamily="50" charset="-127"/>
+                        </a:rPr>
+                        <a:t>                                 </a:t>
+                      </a:r>
+                      <a:r>
+                        <a:rPr lang="ko-KR" altLang="en-US" sz="1600" dirty="0" smtClean="0">
+                          <a:solidFill>
+                            <a:schemeClr val="tx1"/>
+                          </a:solidFill>
+                          <a:latin typeface="나눔스퀘어" panose="020B0600000101010101" pitchFamily="50" charset="-127"/>
+                          <a:ea typeface="나눔스퀘어" panose="020B0600000101010101" pitchFamily="50" charset="-127"/>
+                        </a:rPr>
+                        <a:t>일 사용</a:t>
+                      </a:r>
+                      <a:endParaRPr lang="ko-KR" altLang="en-US" sz="1600" dirty="0">
+                        <a:solidFill>
+                          <a:schemeClr val="tx1"/>
+                        </a:solidFill>
+                        <a:latin typeface="나눔스퀘어" panose="020B0600000101010101" pitchFamily="50" charset="-127"/>
+                        <a:ea typeface="나눔스퀘어" panose="020B0600000101010101" pitchFamily="50" charset="-127"/>
+                      </a:endParaRPr>
+                    </a:p>
+                  </a:txBody>
+                  <a:tcPr anchor="ctr">
+                    <a:lnL w="28575" cap="flat" cmpd="sng" algn="ctr">
+                      <a:solidFill>
+                        <a:schemeClr val="tx1"/>
+                      </a:solidFill>
+                      <a:prstDash val="solid"/>
+                      <a:round/>
+                      <a:headEnd type="none" w="med" len="med"/>
+                      <a:tailEnd type="none" w="med" len="med"/>
+                    </a:lnL>
+                    <a:lnR w="28575" cap="flat" cmpd="sng" algn="ctr">
+                      <a:solidFill>
+                        <a:schemeClr val="tx1"/>
+                      </a:solidFill>
+                      <a:prstDash val="solid"/>
+                      <a:round/>
+                      <a:headEnd type="none" w="med" len="med"/>
+                      <a:tailEnd type="none" w="med" len="med"/>
+                    </a:lnR>
+                    <a:lnT w="12700" cap="flat" cmpd="sng" algn="ctr">
+                      <a:solidFill>
+                        <a:schemeClr val="tx1"/>
+                      </a:solidFill>
+                      <a:prstDash val="solid"/>
+                      <a:round/>
+                      <a:headEnd type="none" w="med" len="med"/>
+                      <a:tailEnd type="none" w="med" len="med"/>
+                    </a:lnT>
+                    <a:lnB w="12700" cap="flat" cmpd="sng" algn="ctr">
+                      <a:solidFill>
+                        <a:schemeClr val="tx1"/>
+                      </a:solidFill>
+                      <a:prstDash val="solid"/>
+                      <a:round/>
+                      <a:headEnd type="none" w="med" len="med"/>
+                      <a:tailEnd type="none" w="med" len="med"/>
+                    </a:lnB>
+                    <a:solidFill>
+                      <a:schemeClr val="bg1"/>
+                    </a:solidFill>
+                  </a:tcPr>
+                </a:tc>
+                <a:tc hMerge="1">
+                  <a:txBody>
+                    <a:bodyPr/>
+                    <a:lstStyle/>
+                    <a:p>
+                      <a:pPr algn="r" latinLnBrk="1"/>
+                      <a:endParaRPr lang="ko-KR" altLang="en-US" sz="1600" dirty="0">
+                        <a:solidFill>
+                          <a:schemeClr val="tx1"/>
+                        </a:solidFill>
+                        <a:latin typeface="나눔스퀘어" panose="020B0600000101010101" pitchFamily="50" charset="-127"/>
+                        <a:ea typeface="나눔스퀘어" panose="020B0600000101010101" pitchFamily="50" charset="-127"/>
+                      </a:endParaRPr>
+                    </a:p>
+                  </a:txBody>
+                  <a:tcPr anchor="ctr">
+                    <a:lnL w="12700" cap="flat" cmpd="sng" algn="ctr">
+                      <a:solidFill>
+                        <a:schemeClr val="tx1"/>
+                      </a:solidFill>
+                      <a:prstDash val="solid"/>
+                      <a:round/>
+                      <a:headEnd type="none" w="med" len="med"/>
+                      <a:tailEnd type="none" w="med" len="med"/>
+                    </a:lnL>
+                    <a:lnR w="12700" cap="flat" cmpd="sng" algn="ctr">
+                      <a:solidFill>
+                        <a:schemeClr val="tx1"/>
+                      </a:solidFill>
+                      <a:prstDash val="solid"/>
+                      <a:round/>
+                      <a:headEnd type="none" w="med" len="med"/>
+                      <a:tailEnd type="none" w="med" len="med"/>
+                    </a:lnR>
+                    <a:lnT w="12700" cap="flat" cmpd="sng" algn="ctr">
+                      <a:solidFill>
+                        <a:schemeClr val="tx1"/>
+                      </a:solidFill>
+                      <a:prstDash val="solid"/>
+                      <a:round/>
+                      <a:headEnd type="none" w="med" len="med"/>
+                      <a:tailEnd type="none" w="med" len="med"/>
+                    </a:lnT>
+                    <a:lnB w="12700" cap="flat" cmpd="sng" algn="ctr">
+                      <a:solidFill>
+                        <a:schemeClr val="tx1"/>
+                      </a:solidFill>
+                      <a:prstDash val="solid"/>
+                      <a:round/>
+                      <a:headEnd type="none" w="med" len="med"/>
+                      <a:tailEnd type="none" w="med" len="med"/>
+                    </a:lnB>
+                    <a:solidFill>
+                      <a:schemeClr val="bg1"/>
+                    </a:solidFill>
+                  </a:tcPr>
+                </a:tc>
+                <a:tc hMerge="1">
+                  <a:txBody>
+                    <a:bodyPr/>
+                    <a:lstStyle/>
+                    <a:p>
+                      <a:pPr latinLnBrk="1"/>
+                      <a:endParaRPr lang="ko-KR" altLang="en-US"/>
+                    </a:p>
+                  </a:txBody>
+                  <a:tcPr/>
+                </a:tc>
+                <a:tc hMerge="1">
+                  <a:txBody>
+                    <a:bodyPr/>
+                    <a:lstStyle/>
+                    <a:p>
+                      <a:pPr algn="r" latinLnBrk="1"/>
+                      <a:endParaRPr lang="ko-KR" altLang="en-US" sz="1600" dirty="0">
+                        <a:solidFill>
+                          <a:schemeClr val="tx1"/>
+                        </a:solidFill>
+                        <a:latin typeface="나눔스퀘어" panose="020B0600000101010101" pitchFamily="50" charset="-127"/>
+                        <a:ea typeface="나눔스퀘어" panose="020B0600000101010101" pitchFamily="50" charset="-127"/>
+                      </a:endParaRPr>
+                    </a:p>
+                  </a:txBody>
+                  <a:tcPr anchor="ctr">
+                    <a:lnL w="12700" cap="flat" cmpd="sng" algn="ctr">
+                      <a:solidFill>
+                        <a:schemeClr val="tx1"/>
+                      </a:solidFill>
+                      <a:prstDash val="solid"/>
+                      <a:round/>
+                      <a:headEnd type="none" w="med" len="med"/>
+                      <a:tailEnd type="none" w="med" len="med"/>
+                    </a:lnL>
+                    <a:lnR w="28575" cap="flat" cmpd="sng" algn="ctr">
+                      <a:solidFill>
+                        <a:schemeClr val="tx1"/>
+                      </a:solidFill>
+                      <a:prstDash val="solid"/>
+                      <a:round/>
+                      <a:headEnd type="none" w="med" len="med"/>
+                      <a:tailEnd type="none" w="med" len="med"/>
+                    </a:lnR>
+                    <a:lnT w="12700" cap="flat" cmpd="sng" algn="ctr">
+                      <a:solidFill>
+                        <a:schemeClr val="tx1"/>
+                      </a:solidFill>
+                      <a:prstDash val="solid"/>
+                      <a:round/>
+                      <a:headEnd type="none" w="med" len="med"/>
+                      <a:tailEnd type="none" w="med" len="med"/>
+                    </a:lnT>
+                    <a:lnB w="12700" cap="flat" cmpd="sng" algn="ctr">
+                      <a:solidFill>
+                        <a:schemeClr val="tx1"/>
+                      </a:solidFill>
+                      <a:prstDash val="solid"/>
+                      <a:round/>
+                      <a:headEnd type="none" w="med" len="med"/>
+                      <a:tailEnd type="none" w="med" len="med"/>
+                    </a:lnB>
+                    <a:solidFill>
+                      <a:schemeClr val="bg1"/>
+                    </a:solidFill>
+                  </a:tcPr>
+                </a:tc>
               </a:tr>
               <a:tr h="201336">
                 <a:tc gridSpan="4">
@@ -16370,7 +16574,7 @@
                 </a:tc>
                 <a:extLst>
                   <a:ext uri="{0D108BD9-81ED-4DB2-BD59-A6C34878D82A}">
-                    <a16:rowId xmlns:a16="http://schemas.microsoft.com/office/drawing/2014/main" xmlns="" val="795156824"/>
+                    <a16:rowId xmlns="" xmlns:a16="http://schemas.microsoft.com/office/drawing/2014/main" val="795156824"/>
                   </a:ext>
                 </a:extLst>
               </a:tr>
@@ -16592,114 +16796,7 @@
                 </a:tc>
                 <a:extLst>
                   <a:ext uri="{0D108BD9-81ED-4DB2-BD59-A6C34878D82A}">
-                    <a16:rowId xmlns:a16="http://schemas.microsoft.com/office/drawing/2014/main" xmlns="" val="1493729404"/>
-                  </a:ext>
-                </a:extLst>
-              </a:tr>
-              <a:tr h="204132">
-                <a:tc gridSpan="4">
-                  <a:txBody>
-                    <a:bodyPr/>
-                    <a:lstStyle/>
-                    <a:p>
-                      <a:pPr algn="ctr" latinLnBrk="1"/>
-                      <a:endParaRPr lang="en-US" altLang="ko-KR" sz="1600" dirty="0">
-                        <a:solidFill>
-                          <a:schemeClr val="tx1"/>
-                        </a:solidFill>
-                        <a:latin typeface="나눔스퀘어" panose="020B0600000101010101" pitchFamily="50" charset="-127"/>
-                        <a:ea typeface="나눔스퀘어" panose="020B0600000101010101" pitchFamily="50" charset="-127"/>
-                      </a:endParaRPr>
-                    </a:p>
-                    <a:p>
-                      <a:pPr algn="ctr" latinLnBrk="1"/>
-                      <a:endParaRPr lang="ko-KR" altLang="en-US" sz="1800" dirty="0">
-                        <a:solidFill>
-                          <a:schemeClr val="tx1"/>
-                        </a:solidFill>
-                        <a:latin typeface="나눔스퀘어" panose="020B0600000101010101" pitchFamily="50" charset="-127"/>
-                        <a:ea typeface="나눔스퀘어" panose="020B0600000101010101" pitchFamily="50" charset="-127"/>
-                      </a:endParaRPr>
-                    </a:p>
-                  </a:txBody>
-                  <a:tcPr anchor="ctr">
-                    <a:lnL w="28575" cap="flat" cmpd="sng" algn="ctr">
-                      <a:solidFill>
-                        <a:schemeClr val="tx1"/>
-                      </a:solidFill>
-                      <a:prstDash val="solid"/>
-                      <a:round/>
-                      <a:headEnd type="none" w="med" len="med"/>
-                      <a:tailEnd type="none" w="med" len="med"/>
-                    </a:lnL>
-                    <a:lnR w="28575" cap="flat" cmpd="sng" algn="ctr">
-                      <a:solidFill>
-                        <a:schemeClr val="tx1"/>
-                      </a:solidFill>
-                      <a:prstDash val="solid"/>
-                      <a:round/>
-                      <a:headEnd type="none" w="med" len="med"/>
-                      <a:tailEnd type="none" w="med" len="med"/>
-                    </a:lnR>
-                    <a:lnT w="12700" cap="flat" cmpd="sng" algn="ctr">
-                      <a:solidFill>
-                        <a:schemeClr val="tx1"/>
-                      </a:solidFill>
-                      <a:prstDash val="solid"/>
-                      <a:round/>
-                      <a:headEnd type="none" w="med" len="med"/>
-                      <a:tailEnd type="none" w="med" len="med"/>
-                    </a:lnT>
-                    <a:lnB w="12700" cap="flat" cmpd="sng" algn="ctr">
-                      <a:solidFill>
-                        <a:schemeClr val="tx1"/>
-                      </a:solidFill>
-                      <a:prstDash val="solid"/>
-                      <a:round/>
-                      <a:headEnd type="none" w="med" len="med"/>
-                      <a:tailEnd type="none" w="med" len="med"/>
-                    </a:lnB>
-                    <a:solidFill>
-                      <a:schemeClr val="bg1"/>
-                    </a:solidFill>
-                  </a:tcPr>
-                </a:tc>
-                <a:tc hMerge="1">
-                  <a:txBody>
-                    <a:bodyPr/>
-                    <a:lstStyle/>
-                    <a:p>
-                      <a:pPr latinLnBrk="1"/>
-                      <a:endParaRPr lang="ko-KR" altLang="en-US"/>
-                    </a:p>
-                  </a:txBody>
-                  <a:tcPr/>
-                </a:tc>
-                <a:tc hMerge="1">
-                  <a:txBody>
-                    <a:bodyPr/>
-                    <a:lstStyle/>
-                    <a:p>
-                      <a:pPr latinLnBrk="1"/>
-                      <a:endParaRPr lang="ko-KR" altLang="en-US"/>
-                    </a:p>
-                  </a:txBody>
-                  <a:tcPr/>
-                </a:tc>
-                <a:tc hMerge="1">
-                  <a:txBody>
-                    <a:bodyPr/>
-                    <a:lstStyle/>
-                    <a:p>
-                      <a:pPr latinLnBrk="1"/>
-                      <a:endParaRPr lang="ko-KR" altLang="en-US"/>
-                    </a:p>
-                  </a:txBody>
-                  <a:tcPr/>
-                </a:tc>
-                <a:extLst>
-                  <a:ext uri="{0D108BD9-81ED-4DB2-BD59-A6C34878D82A}">
-                    <a16:rowId xmlns:a16="http://schemas.microsoft.com/office/drawing/2014/main" xmlns="" val="1238193574"/>
+                    <a16:rowId xmlns="" xmlns:a16="http://schemas.microsoft.com/office/drawing/2014/main" val="1493729404"/>
                   </a:ext>
                 </a:extLst>
               </a:tr>
@@ -16825,7 +16922,7 @@
                 </a:tc>
                 <a:extLst>
                   <a:ext uri="{0D108BD9-81ED-4DB2-BD59-A6C34878D82A}">
-                    <a16:rowId xmlns:a16="http://schemas.microsoft.com/office/drawing/2014/main" xmlns="" val="814545869"/>
+                    <a16:rowId xmlns="" xmlns:a16="http://schemas.microsoft.com/office/drawing/2014/main" val="814545869"/>
                   </a:ext>
                 </a:extLst>
               </a:tr>
@@ -16838,7 +16935,7 @@
           <p:cNvPr id="35" name="그림 34">
             <a:extLst>
               <a:ext uri="{FF2B5EF4-FFF2-40B4-BE49-F238E27FC236}">
-                <a16:creationId xmlns:a16="http://schemas.microsoft.com/office/drawing/2014/main" xmlns="" id="{641BAEF2-D946-40FF-938A-26928EA7B3BD}"/>
+                <a16:creationId xmlns="" xmlns:a16="http://schemas.microsoft.com/office/drawing/2014/main" id="{641BAEF2-D946-40FF-938A-26928EA7B3BD}"/>
               </a:ext>
             </a:extLst>
           </p:cNvPr>
@@ -16868,7 +16965,7 @@
           <p:cNvPr id="36" name="직사각형 35">
             <a:extLst>
               <a:ext uri="{FF2B5EF4-FFF2-40B4-BE49-F238E27FC236}">
-                <a16:creationId xmlns:a16="http://schemas.microsoft.com/office/drawing/2014/main" xmlns="" id="{5A7B0BD0-A163-425F-8E81-067759156729}"/>
+                <a16:creationId xmlns="" xmlns:a16="http://schemas.microsoft.com/office/drawing/2014/main" id="{5A7B0BD0-A163-425F-8E81-067759156729}"/>
               </a:ext>
             </a:extLst>
           </p:cNvPr>
@@ -16920,7 +17017,7 @@
           <p:cNvPr id="37" name="직사각형 36">
             <a:extLst>
               <a:ext uri="{FF2B5EF4-FFF2-40B4-BE49-F238E27FC236}">
-                <a16:creationId xmlns:a16="http://schemas.microsoft.com/office/drawing/2014/main" xmlns="" id="{BF289825-58D5-4B8E-B868-642688F005C8}"/>
+                <a16:creationId xmlns="" xmlns:a16="http://schemas.microsoft.com/office/drawing/2014/main" id="{BF289825-58D5-4B8E-B868-642688F005C8}"/>
               </a:ext>
             </a:extLst>
           </p:cNvPr>
@@ -16983,7 +17080,7 @@
           <p:cNvPr id="38" name="직사각형 37">
             <a:extLst>
               <a:ext uri="{FF2B5EF4-FFF2-40B4-BE49-F238E27FC236}">
-                <a16:creationId xmlns:a16="http://schemas.microsoft.com/office/drawing/2014/main" xmlns="" id="{3CF3BF1B-F81A-4D94-8503-8A9E0F0C60E2}"/>
+                <a16:creationId xmlns="" xmlns:a16="http://schemas.microsoft.com/office/drawing/2014/main" id="{3CF3BF1B-F81A-4D94-8503-8A9E0F0C60E2}"/>
               </a:ext>
             </a:extLst>
           </p:cNvPr>
@@ -17049,7 +17146,7 @@
           <p:cNvPr id="39" name="직사각형 38">
             <a:extLst>
               <a:ext uri="{FF2B5EF4-FFF2-40B4-BE49-F238E27FC236}">
-                <a16:creationId xmlns:a16="http://schemas.microsoft.com/office/drawing/2014/main" xmlns="" id="{B1AEEE36-37F5-49A9-8084-44C7C665980C}"/>
+                <a16:creationId xmlns="" xmlns:a16="http://schemas.microsoft.com/office/drawing/2014/main" id="{B1AEEE36-37F5-49A9-8084-44C7C665980C}"/>
               </a:ext>
             </a:extLst>
           </p:cNvPr>
@@ -17110,7 +17207,7 @@
           <p:cNvPr id="40" name="표 10">
             <a:extLst>
               <a:ext uri="{FF2B5EF4-FFF2-40B4-BE49-F238E27FC236}">
-                <a16:creationId xmlns:a16="http://schemas.microsoft.com/office/drawing/2014/main" xmlns="" id="{3ACF9867-768A-4FB4-9F26-E2925A0828F3}"/>
+                <a16:creationId xmlns="" xmlns:a16="http://schemas.microsoft.com/office/drawing/2014/main" id="{3ACF9867-768A-4FB4-9F26-E2925A0828F3}"/>
               </a:ext>
             </a:extLst>
           </p:cNvPr>
@@ -17120,7 +17217,7 @@
           <p:nvPr>
             <p:extLst>
               <p:ext uri="{D42A27DB-BD31-4B8C-83A1-F6EECF244321}">
-                <p14:modId xmlns:p14="http://schemas.microsoft.com/office/powerpoint/2010/main" val="2390229317"/>
+                <p14:modId xmlns:p14="http://schemas.microsoft.com/office/powerpoint/2010/main" val="4161803234"/>
               </p:ext>
             </p:extLst>
           </p:nvPr>
@@ -17139,14 +17236,14 @@
                 <a:gridCol w="700233">
                   <a:extLst>
                     <a:ext uri="{9D8B030D-6E8A-4147-A177-3AD203B41FA5}">
-                      <a16:colId xmlns:a16="http://schemas.microsoft.com/office/drawing/2014/main" xmlns="" val="1237496162"/>
+                      <a16:colId xmlns="" xmlns:a16="http://schemas.microsoft.com/office/drawing/2014/main" val="1237496162"/>
                     </a:ext>
                   </a:extLst>
                 </a:gridCol>
                 <a:gridCol w="264222">
                   <a:extLst>
                     <a:ext uri="{9D8B030D-6E8A-4147-A177-3AD203B41FA5}">
-                      <a16:colId xmlns:a16="http://schemas.microsoft.com/office/drawing/2014/main" xmlns="" val="2799200606"/>
+                      <a16:colId xmlns="" xmlns:a16="http://schemas.microsoft.com/office/drawing/2014/main" val="2799200606"/>
                     </a:ext>
                   </a:extLst>
                 </a:gridCol>
@@ -17187,7 +17284,7 @@
                 </a:tc>
                 <a:extLst>
                   <a:ext uri="{0D108BD9-81ED-4DB2-BD59-A6C34878D82A}">
-                    <a16:rowId xmlns:a16="http://schemas.microsoft.com/office/drawing/2014/main" xmlns="" val="3721100454"/>
+                    <a16:rowId xmlns="" xmlns:a16="http://schemas.microsoft.com/office/drawing/2014/main" val="3721100454"/>
                   </a:ext>
                 </a:extLst>
               </a:tr>
@@ -17200,7 +17297,7 @@
           <p:cNvPr id="41" name="표 10">
             <a:extLst>
               <a:ext uri="{FF2B5EF4-FFF2-40B4-BE49-F238E27FC236}">
-                <a16:creationId xmlns:a16="http://schemas.microsoft.com/office/drawing/2014/main" xmlns="" id="{FB5C0159-01B3-41D5-9AB2-87CFD21FBBE4}"/>
+                <a16:creationId xmlns="" xmlns:a16="http://schemas.microsoft.com/office/drawing/2014/main" id="{FB5C0159-01B3-41D5-9AB2-87CFD21FBBE4}"/>
               </a:ext>
             </a:extLst>
           </p:cNvPr>
@@ -17229,14 +17326,14 @@
                 <a:gridCol w="700233">
                   <a:extLst>
                     <a:ext uri="{9D8B030D-6E8A-4147-A177-3AD203B41FA5}">
-                      <a16:colId xmlns:a16="http://schemas.microsoft.com/office/drawing/2014/main" xmlns="" val="1237496162"/>
+                      <a16:colId xmlns="" xmlns:a16="http://schemas.microsoft.com/office/drawing/2014/main" val="1237496162"/>
                     </a:ext>
                   </a:extLst>
                 </a:gridCol>
                 <a:gridCol w="264222">
                   <a:extLst>
                     <a:ext uri="{9D8B030D-6E8A-4147-A177-3AD203B41FA5}">
-                      <a16:colId xmlns:a16="http://schemas.microsoft.com/office/drawing/2014/main" xmlns="" val="2799200606"/>
+                      <a16:colId xmlns="" xmlns:a16="http://schemas.microsoft.com/office/drawing/2014/main" val="2799200606"/>
                     </a:ext>
                   </a:extLst>
                 </a:gridCol>
@@ -17277,7 +17374,7 @@
                 </a:tc>
                 <a:extLst>
                   <a:ext uri="{0D108BD9-81ED-4DB2-BD59-A6C34878D82A}">
-                    <a16:rowId xmlns:a16="http://schemas.microsoft.com/office/drawing/2014/main" xmlns="" val="3721100454"/>
+                    <a16:rowId xmlns="" xmlns:a16="http://schemas.microsoft.com/office/drawing/2014/main" val="3721100454"/>
                   </a:ext>
                 </a:extLst>
               </a:tr>
@@ -17290,7 +17387,7 @@
           <p:cNvPr id="42" name="표 10">
             <a:extLst>
               <a:ext uri="{FF2B5EF4-FFF2-40B4-BE49-F238E27FC236}">
-                <a16:creationId xmlns:a16="http://schemas.microsoft.com/office/drawing/2014/main" xmlns="" id="{21647DE2-70E7-41E2-97C0-7BA8F6F7AD94}"/>
+                <a16:creationId xmlns="" xmlns:a16="http://schemas.microsoft.com/office/drawing/2014/main" id="{21647DE2-70E7-41E2-97C0-7BA8F6F7AD94}"/>
               </a:ext>
             </a:extLst>
           </p:cNvPr>
@@ -17319,21 +17416,21 @@
                 <a:gridCol w="202742">
                   <a:extLst>
                     <a:ext uri="{9D8B030D-6E8A-4147-A177-3AD203B41FA5}">
-                      <a16:colId xmlns:a16="http://schemas.microsoft.com/office/drawing/2014/main" xmlns="" val="1237496162"/>
+                      <a16:colId xmlns="" xmlns:a16="http://schemas.microsoft.com/office/drawing/2014/main" val="1237496162"/>
                     </a:ext>
                   </a:extLst>
                 </a:gridCol>
                 <a:gridCol w="686861">
                   <a:extLst>
                     <a:ext uri="{9D8B030D-6E8A-4147-A177-3AD203B41FA5}">
-                      <a16:colId xmlns:a16="http://schemas.microsoft.com/office/drawing/2014/main" xmlns="" val="3186598357"/>
+                      <a16:colId xmlns="" xmlns:a16="http://schemas.microsoft.com/office/drawing/2014/main" val="3186598357"/>
                     </a:ext>
                   </a:extLst>
                 </a:gridCol>
                 <a:gridCol w="202742">
                   <a:extLst>
                     <a:ext uri="{9D8B030D-6E8A-4147-A177-3AD203B41FA5}">
-                      <a16:colId xmlns:a16="http://schemas.microsoft.com/office/drawing/2014/main" xmlns="" val="2799200606"/>
+                      <a16:colId xmlns="" xmlns:a16="http://schemas.microsoft.com/office/drawing/2014/main" val="2799200606"/>
                     </a:ext>
                   </a:extLst>
                 </a:gridCol>
@@ -17409,7 +17506,7 @@
                 </a:tc>
                 <a:extLst>
                   <a:ext uri="{0D108BD9-81ED-4DB2-BD59-A6C34878D82A}">
-                    <a16:rowId xmlns:a16="http://schemas.microsoft.com/office/drawing/2014/main" xmlns="" val="3721100454"/>
+                    <a16:rowId xmlns="" xmlns:a16="http://schemas.microsoft.com/office/drawing/2014/main" val="3721100454"/>
                   </a:ext>
                 </a:extLst>
               </a:tr>
@@ -17422,7 +17519,7 @@
           <p:cNvPr id="44" name="표 10">
             <a:extLst>
               <a:ext uri="{FF2B5EF4-FFF2-40B4-BE49-F238E27FC236}">
-                <a16:creationId xmlns:a16="http://schemas.microsoft.com/office/drawing/2014/main" xmlns="" id="{A30E746A-8A00-480B-BA05-23CFC0A238EC}"/>
+                <a16:creationId xmlns="" xmlns:a16="http://schemas.microsoft.com/office/drawing/2014/main" id="{A30E746A-8A00-480B-BA05-23CFC0A238EC}"/>
               </a:ext>
             </a:extLst>
           </p:cNvPr>
@@ -17451,21 +17548,21 @@
                 <a:gridCol w="202742">
                   <a:extLst>
                     <a:ext uri="{9D8B030D-6E8A-4147-A177-3AD203B41FA5}">
-                      <a16:colId xmlns:a16="http://schemas.microsoft.com/office/drawing/2014/main" xmlns="" val="1237496162"/>
+                      <a16:colId xmlns="" xmlns:a16="http://schemas.microsoft.com/office/drawing/2014/main" val="1237496162"/>
                     </a:ext>
                   </a:extLst>
                 </a:gridCol>
                 <a:gridCol w="686861">
                   <a:extLst>
                     <a:ext uri="{9D8B030D-6E8A-4147-A177-3AD203B41FA5}">
-                      <a16:colId xmlns:a16="http://schemas.microsoft.com/office/drawing/2014/main" xmlns="" val="3186598357"/>
+                      <a16:colId xmlns="" xmlns:a16="http://schemas.microsoft.com/office/drawing/2014/main" val="3186598357"/>
                     </a:ext>
                   </a:extLst>
                 </a:gridCol>
                 <a:gridCol w="202742">
                   <a:extLst>
                     <a:ext uri="{9D8B030D-6E8A-4147-A177-3AD203B41FA5}">
-                      <a16:colId xmlns:a16="http://schemas.microsoft.com/office/drawing/2014/main" xmlns="" val="2799200606"/>
+                      <a16:colId xmlns="" xmlns:a16="http://schemas.microsoft.com/office/drawing/2014/main" val="2799200606"/>
                     </a:ext>
                   </a:extLst>
                 </a:gridCol>
@@ -17541,7 +17638,7 @@
                 </a:tc>
                 <a:extLst>
                   <a:ext uri="{0D108BD9-81ED-4DB2-BD59-A6C34878D82A}">
-                    <a16:rowId xmlns:a16="http://schemas.microsoft.com/office/drawing/2014/main" xmlns="" val="3721100454"/>
+                    <a16:rowId xmlns="" xmlns:a16="http://schemas.microsoft.com/office/drawing/2014/main" val="3721100454"/>
                   </a:ext>
                 </a:extLst>
               </a:tr>
@@ -17554,7 +17651,7 @@
           <p:cNvPr id="46" name="표 10">
             <a:extLst>
               <a:ext uri="{FF2B5EF4-FFF2-40B4-BE49-F238E27FC236}">
-                <a16:creationId xmlns:a16="http://schemas.microsoft.com/office/drawing/2014/main" xmlns="" id="{E0B66952-0165-410D-9CBC-2BDAC783A867}"/>
+                <a16:creationId xmlns="" xmlns:a16="http://schemas.microsoft.com/office/drawing/2014/main" id="{E0B66952-0165-410D-9CBC-2BDAC783A867}"/>
               </a:ext>
             </a:extLst>
           </p:cNvPr>
@@ -17583,21 +17680,21 @@
                 <a:gridCol w="202742">
                   <a:extLst>
                     <a:ext uri="{9D8B030D-6E8A-4147-A177-3AD203B41FA5}">
-                      <a16:colId xmlns:a16="http://schemas.microsoft.com/office/drawing/2014/main" xmlns="" val="1237496162"/>
+                      <a16:colId xmlns="" xmlns:a16="http://schemas.microsoft.com/office/drawing/2014/main" val="1237496162"/>
                     </a:ext>
                   </a:extLst>
                 </a:gridCol>
                 <a:gridCol w="686861">
                   <a:extLst>
                     <a:ext uri="{9D8B030D-6E8A-4147-A177-3AD203B41FA5}">
-                      <a16:colId xmlns:a16="http://schemas.microsoft.com/office/drawing/2014/main" xmlns="" val="3186598357"/>
+                      <a16:colId xmlns="" xmlns:a16="http://schemas.microsoft.com/office/drawing/2014/main" val="3186598357"/>
                     </a:ext>
                   </a:extLst>
                 </a:gridCol>
                 <a:gridCol w="202742">
                   <a:extLst>
                     <a:ext uri="{9D8B030D-6E8A-4147-A177-3AD203B41FA5}">
-                      <a16:colId xmlns:a16="http://schemas.microsoft.com/office/drawing/2014/main" xmlns="" val="2799200606"/>
+                      <a16:colId xmlns="" xmlns:a16="http://schemas.microsoft.com/office/drawing/2014/main" val="2799200606"/>
                     </a:ext>
                   </a:extLst>
                 </a:gridCol>
@@ -17673,7 +17770,97 @@
                 </a:tc>
                 <a:extLst>
                   <a:ext uri="{0D108BD9-81ED-4DB2-BD59-A6C34878D82A}">
-                    <a16:rowId xmlns:a16="http://schemas.microsoft.com/office/drawing/2014/main" xmlns="" val="3721100454"/>
+                    <a16:rowId xmlns="" xmlns:a16="http://schemas.microsoft.com/office/drawing/2014/main" val="3721100454"/>
+                  </a:ext>
+                </a:extLst>
+              </a:tr>
+            </a:tbl>
+          </a:graphicData>
+        </a:graphic>
+      </p:graphicFrame>
+      <p:graphicFrame>
+        <p:nvGraphicFramePr>
+          <p:cNvPr id="16" name="표 10">
+            <a:extLst>
+              <a:ext uri="{FF2B5EF4-FFF2-40B4-BE49-F238E27FC236}">
+                <a16:creationId xmlns="" xmlns:a16="http://schemas.microsoft.com/office/drawing/2014/main" id="{3ACF9867-768A-4FB4-9F26-E2925A0828F3}"/>
+              </a:ext>
+            </a:extLst>
+          </p:cNvPr>
+          <p:cNvGraphicFramePr>
+            <a:graphicFrameLocks noGrp="1"/>
+          </p:cNvGraphicFramePr>
+          <p:nvPr>
+            <p:extLst>
+              <p:ext uri="{D42A27DB-BD31-4B8C-83A1-F6EECF244321}">
+                <p14:modId xmlns:p14="http://schemas.microsoft.com/office/powerpoint/2010/main" val="3527024030"/>
+              </p:ext>
+            </p:extLst>
+          </p:nvPr>
+        </p:nvGraphicFramePr>
+        <p:xfrm>
+          <a:off x="5024520" y="4825529"/>
+          <a:ext cx="964455" cy="273550"/>
+        </p:xfrm>
+        <a:graphic>
+          <a:graphicData uri="http://schemas.openxmlformats.org/drawingml/2006/table">
+            <a:tbl>
+              <a:tblPr firstRow="1" bandRow="1">
+                <a:tableStyleId>{D7AC3CCA-C797-4891-BE02-D94E43425B78}</a:tableStyleId>
+              </a:tblPr>
+              <a:tblGrid>
+                <a:gridCol w="700233">
+                  <a:extLst>
+                    <a:ext uri="{9D8B030D-6E8A-4147-A177-3AD203B41FA5}">
+                      <a16:colId xmlns="" xmlns:a16="http://schemas.microsoft.com/office/drawing/2014/main" val="1237496162"/>
+                    </a:ext>
+                  </a:extLst>
+                </a:gridCol>
+                <a:gridCol w="264222">
+                  <a:extLst>
+                    <a:ext uri="{9D8B030D-6E8A-4147-A177-3AD203B41FA5}">
+                      <a16:colId xmlns="" xmlns:a16="http://schemas.microsoft.com/office/drawing/2014/main" val="2799200606"/>
+                    </a:ext>
+                  </a:extLst>
+                </a:gridCol>
+              </a:tblGrid>
+              <a:tr h="273550">
+                <a:tc>
+                  <a:txBody>
+                    <a:bodyPr/>
+                    <a:lstStyle/>
+                    <a:p>
+                      <a:pPr algn="ctr" latinLnBrk="1"/>
+                      <a:endParaRPr lang="ko-KR" altLang="en-US" sz="1200" b="0" dirty="0"/>
+                    </a:p>
+                  </a:txBody>
+                  <a:tcPr marL="73629" marR="73629" marT="36815" marB="36815">
+                    <a:solidFill>
+                      <a:schemeClr val="bg1"/>
+                    </a:solidFill>
+                  </a:tcPr>
+                </a:tc>
+                <a:tc>
+                  <a:txBody>
+                    <a:bodyPr/>
+                    <a:lstStyle/>
+                    <a:p>
+                      <a:pPr algn="ctr" latinLnBrk="1"/>
+                      <a:r>
+                        <a:rPr lang="ko-KR" altLang="en-US" sz="1200" b="0" dirty="0"/>
+                        <a:t>▼</a:t>
+                      </a:r>
+                    </a:p>
+                  </a:txBody>
+                  <a:tcPr marL="73629" marR="73629" marT="36815" marB="36815">
+                    <a:solidFill>
+                      <a:schemeClr val="bg1"/>
+                    </a:solidFill>
+                  </a:tcPr>
+                </a:tc>
+                <a:extLst>
+                  <a:ext uri="{0D108BD9-81ED-4DB2-BD59-A6C34878D82A}">
+                    <a16:rowId xmlns="" xmlns:a16="http://schemas.microsoft.com/office/drawing/2014/main" val="3721100454"/>
                   </a:ext>
                 </a:extLst>
               </a:tr>
@@ -17716,7 +17903,7 @@
           <p:cNvPr id="2" name="제목 1">
             <a:extLst>
               <a:ext uri="{FF2B5EF4-FFF2-40B4-BE49-F238E27FC236}">
-                <a16:creationId xmlns:a16="http://schemas.microsoft.com/office/drawing/2014/main" xmlns="" id="{36E46BD5-9BF8-4A36-B399-C907B8D17343}"/>
+                <a16:creationId xmlns="" xmlns:a16="http://schemas.microsoft.com/office/drawing/2014/main" id="{36E46BD5-9BF8-4A36-B399-C907B8D17343}"/>
               </a:ext>
             </a:extLst>
           </p:cNvPr>
@@ -17756,7 +17943,7 @@
           <p:cNvPr id="37" name="내용 개체 틀 2">
             <a:extLst>
               <a:ext uri="{FF2B5EF4-FFF2-40B4-BE49-F238E27FC236}">
-                <a16:creationId xmlns:a16="http://schemas.microsoft.com/office/drawing/2014/main" xmlns="" id="{5B46A43F-CED7-4526-81B5-2A8AAB741294}"/>
+                <a16:creationId xmlns="" xmlns:a16="http://schemas.microsoft.com/office/drawing/2014/main" id="{5B46A43F-CED7-4526-81B5-2A8AAB741294}"/>
               </a:ext>
             </a:extLst>
           </p:cNvPr>
@@ -17807,7 +17994,7 @@
           <p:cNvPr id="6" name="TextBox 5">
             <a:extLst>
               <a:ext uri="{FF2B5EF4-FFF2-40B4-BE49-F238E27FC236}">
-                <a16:creationId xmlns:a16="http://schemas.microsoft.com/office/drawing/2014/main" xmlns="" id="{73814B6C-3FF8-4E66-8718-BE8B5F9DD995}"/>
+                <a16:creationId xmlns="" xmlns:a16="http://schemas.microsoft.com/office/drawing/2014/main" id="{73814B6C-3FF8-4E66-8718-BE8B5F9DD995}"/>
               </a:ext>
             </a:extLst>
           </p:cNvPr>
@@ -17850,7 +18037,7 @@
           <p:cNvPr id="7" name="표 7">
             <a:extLst>
               <a:ext uri="{FF2B5EF4-FFF2-40B4-BE49-F238E27FC236}">
-                <a16:creationId xmlns:a16="http://schemas.microsoft.com/office/drawing/2014/main" xmlns="" id="{2F34CFD3-0E55-42F2-AFFA-5BAB89522B5A}"/>
+                <a16:creationId xmlns="" xmlns:a16="http://schemas.microsoft.com/office/drawing/2014/main" id="{2F34CFD3-0E55-42F2-AFFA-5BAB89522B5A}"/>
               </a:ext>
             </a:extLst>
           </p:cNvPr>
@@ -17879,14 +18066,14 @@
                 <a:gridCol w="2281596">
                   <a:extLst>
                     <a:ext uri="{9D8B030D-6E8A-4147-A177-3AD203B41FA5}">
-                      <a16:colId xmlns:a16="http://schemas.microsoft.com/office/drawing/2014/main" xmlns="" val="107667662"/>
+                      <a16:colId xmlns="" xmlns:a16="http://schemas.microsoft.com/office/drawing/2014/main" val="107667662"/>
                     </a:ext>
                   </a:extLst>
                 </a:gridCol>
                 <a:gridCol w="2281596">
                   <a:extLst>
                     <a:ext uri="{9D8B030D-6E8A-4147-A177-3AD203B41FA5}">
-                      <a16:colId xmlns:a16="http://schemas.microsoft.com/office/drawing/2014/main" xmlns="" val="2015552464"/>
+                      <a16:colId xmlns="" xmlns:a16="http://schemas.microsoft.com/office/drawing/2014/main" val="2015552464"/>
                     </a:ext>
                   </a:extLst>
                 </a:gridCol>
@@ -18017,7 +18204,7 @@
                 </a:tc>
                 <a:extLst>
                   <a:ext uri="{0D108BD9-81ED-4DB2-BD59-A6C34878D82A}">
-                    <a16:rowId xmlns:a16="http://schemas.microsoft.com/office/drawing/2014/main" xmlns="" val="1787164256"/>
+                    <a16:rowId xmlns="" xmlns:a16="http://schemas.microsoft.com/office/drawing/2014/main" val="1787164256"/>
                   </a:ext>
                 </a:extLst>
               </a:tr>
@@ -18112,7 +18299,7 @@
                 </a:tc>
                 <a:extLst>
                   <a:ext uri="{0D108BD9-81ED-4DB2-BD59-A6C34878D82A}">
-                    <a16:rowId xmlns:a16="http://schemas.microsoft.com/office/drawing/2014/main" xmlns="" val="1453412708"/>
+                    <a16:rowId xmlns="" xmlns:a16="http://schemas.microsoft.com/office/drawing/2014/main" val="1453412708"/>
                   </a:ext>
                 </a:extLst>
               </a:tr>
@@ -18125,7 +18312,7 @@
           <p:cNvPr id="8" name="그림 7">
             <a:extLst>
               <a:ext uri="{FF2B5EF4-FFF2-40B4-BE49-F238E27FC236}">
-                <a16:creationId xmlns:a16="http://schemas.microsoft.com/office/drawing/2014/main" xmlns="" id="{248386C0-2F47-4566-8138-1E23E43987B3}"/>
+                <a16:creationId xmlns="" xmlns:a16="http://schemas.microsoft.com/office/drawing/2014/main" id="{248386C0-2F47-4566-8138-1E23E43987B3}"/>
               </a:ext>
             </a:extLst>
           </p:cNvPr>
@@ -18155,7 +18342,7 @@
           <p:cNvPr id="9" name="직사각형 8">
             <a:extLst>
               <a:ext uri="{FF2B5EF4-FFF2-40B4-BE49-F238E27FC236}">
-                <a16:creationId xmlns:a16="http://schemas.microsoft.com/office/drawing/2014/main" xmlns="" id="{1F4337E5-F5C5-4F07-9715-14729FD0FD78}"/>
+                <a16:creationId xmlns="" xmlns:a16="http://schemas.microsoft.com/office/drawing/2014/main" id="{1F4337E5-F5C5-4F07-9715-14729FD0FD78}"/>
               </a:ext>
             </a:extLst>
           </p:cNvPr>
@@ -18207,7 +18394,7 @@
           <p:cNvPr id="10" name="직사각형 9">
             <a:extLst>
               <a:ext uri="{FF2B5EF4-FFF2-40B4-BE49-F238E27FC236}">
-                <a16:creationId xmlns:a16="http://schemas.microsoft.com/office/drawing/2014/main" xmlns="" id="{2B7439DC-43B4-44CE-A945-6079538D53D0}"/>
+                <a16:creationId xmlns="" xmlns:a16="http://schemas.microsoft.com/office/drawing/2014/main" id="{2B7439DC-43B4-44CE-A945-6079538D53D0}"/>
               </a:ext>
             </a:extLst>
           </p:cNvPr>
@@ -18270,7 +18457,7 @@
           <p:cNvPr id="11" name="직사각형 10">
             <a:extLst>
               <a:ext uri="{FF2B5EF4-FFF2-40B4-BE49-F238E27FC236}">
-                <a16:creationId xmlns:a16="http://schemas.microsoft.com/office/drawing/2014/main" xmlns="" id="{9D383B6C-72EE-47F3-98A3-9251CCE558D0}"/>
+                <a16:creationId xmlns="" xmlns:a16="http://schemas.microsoft.com/office/drawing/2014/main" id="{9D383B6C-72EE-47F3-98A3-9251CCE558D0}"/>
               </a:ext>
             </a:extLst>
           </p:cNvPr>
@@ -18333,7 +18520,7 @@
           <p:cNvPr id="12" name="직사각형 11">
             <a:extLst>
               <a:ext uri="{FF2B5EF4-FFF2-40B4-BE49-F238E27FC236}">
-                <a16:creationId xmlns:a16="http://schemas.microsoft.com/office/drawing/2014/main" xmlns="" id="{1C8D0802-4334-466D-B692-37D2F72C92A1}"/>
+                <a16:creationId xmlns="" xmlns:a16="http://schemas.microsoft.com/office/drawing/2014/main" id="{1C8D0802-4334-466D-B692-37D2F72C92A1}"/>
               </a:ext>
             </a:extLst>
           </p:cNvPr>
@@ -18399,7 +18586,7 @@
           <p:cNvPr id="32" name="TextBox 31">
             <a:extLst>
               <a:ext uri="{FF2B5EF4-FFF2-40B4-BE49-F238E27FC236}">
-                <a16:creationId xmlns:a16="http://schemas.microsoft.com/office/drawing/2014/main" xmlns="" id="{3E5F975A-E7E6-4E10-958B-01B69BB8B04A}"/>
+                <a16:creationId xmlns="" xmlns:a16="http://schemas.microsoft.com/office/drawing/2014/main" id="{3E5F975A-E7E6-4E10-958B-01B69BB8B04A}"/>
               </a:ext>
             </a:extLst>
           </p:cNvPr>
@@ -18442,7 +18629,7 @@
           <p:cNvPr id="33" name="표 7">
             <a:extLst>
               <a:ext uri="{FF2B5EF4-FFF2-40B4-BE49-F238E27FC236}">
-                <a16:creationId xmlns:a16="http://schemas.microsoft.com/office/drawing/2014/main" xmlns="" id="{98A1857F-40A0-4216-825A-0316A062D907}"/>
+                <a16:creationId xmlns="" xmlns:a16="http://schemas.microsoft.com/office/drawing/2014/main" id="{98A1857F-40A0-4216-825A-0316A062D907}"/>
               </a:ext>
             </a:extLst>
           </p:cNvPr>
@@ -18471,14 +18658,14 @@
                 <a:gridCol w="2281596">
                   <a:extLst>
                     <a:ext uri="{9D8B030D-6E8A-4147-A177-3AD203B41FA5}">
-                      <a16:colId xmlns:a16="http://schemas.microsoft.com/office/drawing/2014/main" xmlns="" val="107667662"/>
+                      <a16:colId xmlns="" xmlns:a16="http://schemas.microsoft.com/office/drawing/2014/main" val="107667662"/>
                     </a:ext>
                   </a:extLst>
                 </a:gridCol>
                 <a:gridCol w="2281596">
                   <a:extLst>
                     <a:ext uri="{9D8B030D-6E8A-4147-A177-3AD203B41FA5}">
-                      <a16:colId xmlns:a16="http://schemas.microsoft.com/office/drawing/2014/main" xmlns="" val="2015552464"/>
+                      <a16:colId xmlns="" xmlns:a16="http://schemas.microsoft.com/office/drawing/2014/main" val="2015552464"/>
                     </a:ext>
                   </a:extLst>
                 </a:gridCol>
@@ -18609,7 +18796,7 @@
                 </a:tc>
                 <a:extLst>
                   <a:ext uri="{0D108BD9-81ED-4DB2-BD59-A6C34878D82A}">
-                    <a16:rowId xmlns:a16="http://schemas.microsoft.com/office/drawing/2014/main" xmlns="" val="1787164256"/>
+                    <a16:rowId xmlns="" xmlns:a16="http://schemas.microsoft.com/office/drawing/2014/main" val="1787164256"/>
                   </a:ext>
                 </a:extLst>
               </a:tr>
@@ -18747,7 +18934,7 @@
                 </a:tc>
                 <a:extLst>
                   <a:ext uri="{0D108BD9-81ED-4DB2-BD59-A6C34878D82A}">
-                    <a16:rowId xmlns:a16="http://schemas.microsoft.com/office/drawing/2014/main" xmlns="" val="1453412708"/>
+                    <a16:rowId xmlns="" xmlns:a16="http://schemas.microsoft.com/office/drawing/2014/main" val="1453412708"/>
                   </a:ext>
                 </a:extLst>
               </a:tr>
@@ -18885,7 +19072,7 @@
                 </a:tc>
                 <a:extLst>
                   <a:ext uri="{0D108BD9-81ED-4DB2-BD59-A6C34878D82A}">
-                    <a16:rowId xmlns:a16="http://schemas.microsoft.com/office/drawing/2014/main" xmlns="" val="214181751"/>
+                    <a16:rowId xmlns="" xmlns:a16="http://schemas.microsoft.com/office/drawing/2014/main" val="214181751"/>
                   </a:ext>
                 </a:extLst>
               </a:tr>
@@ -18960,7 +19147,7 @@
                 </a:tc>
                 <a:extLst>
                   <a:ext uri="{0D108BD9-81ED-4DB2-BD59-A6C34878D82A}">
-                    <a16:rowId xmlns:a16="http://schemas.microsoft.com/office/drawing/2014/main" xmlns="" val="4007676011"/>
+                    <a16:rowId xmlns="" xmlns:a16="http://schemas.microsoft.com/office/drawing/2014/main" val="4007676011"/>
                   </a:ext>
                 </a:extLst>
               </a:tr>
@@ -18973,7 +19160,7 @@
           <p:cNvPr id="34" name="그림 33">
             <a:extLst>
               <a:ext uri="{FF2B5EF4-FFF2-40B4-BE49-F238E27FC236}">
-                <a16:creationId xmlns:a16="http://schemas.microsoft.com/office/drawing/2014/main" xmlns="" id="{33C4DDD5-36CC-45A6-A862-5DB69C09F500}"/>
+                <a16:creationId xmlns="" xmlns:a16="http://schemas.microsoft.com/office/drawing/2014/main" id="{33C4DDD5-36CC-45A6-A862-5DB69C09F500}"/>
               </a:ext>
             </a:extLst>
           </p:cNvPr>
@@ -19003,7 +19190,7 @@
           <p:cNvPr id="35" name="직사각형 34">
             <a:extLst>
               <a:ext uri="{FF2B5EF4-FFF2-40B4-BE49-F238E27FC236}">
-                <a16:creationId xmlns:a16="http://schemas.microsoft.com/office/drawing/2014/main" xmlns="" id="{435A94E5-CEA5-4906-95EB-AE036701634A}"/>
+                <a16:creationId xmlns="" xmlns:a16="http://schemas.microsoft.com/office/drawing/2014/main" id="{435A94E5-CEA5-4906-95EB-AE036701634A}"/>
               </a:ext>
             </a:extLst>
           </p:cNvPr>
@@ -19055,7 +19242,7 @@
           <p:cNvPr id="36" name="직사각형 35">
             <a:extLst>
               <a:ext uri="{FF2B5EF4-FFF2-40B4-BE49-F238E27FC236}">
-                <a16:creationId xmlns:a16="http://schemas.microsoft.com/office/drawing/2014/main" xmlns="" id="{4C817459-ACE2-4B1F-86AB-F9126A98B7D7}"/>
+                <a16:creationId xmlns="" xmlns:a16="http://schemas.microsoft.com/office/drawing/2014/main" id="{4C817459-ACE2-4B1F-86AB-F9126A98B7D7}"/>
               </a:ext>
             </a:extLst>
           </p:cNvPr>
@@ -19118,7 +19305,7 @@
           <p:cNvPr id="38" name="직사각형 37">
             <a:extLst>
               <a:ext uri="{FF2B5EF4-FFF2-40B4-BE49-F238E27FC236}">
-                <a16:creationId xmlns:a16="http://schemas.microsoft.com/office/drawing/2014/main" xmlns="" id="{749493E7-866F-4C7A-81F6-1833CB67B213}"/>
+                <a16:creationId xmlns="" xmlns:a16="http://schemas.microsoft.com/office/drawing/2014/main" id="{749493E7-866F-4C7A-81F6-1833CB67B213}"/>
               </a:ext>
             </a:extLst>
           </p:cNvPr>
@@ -19181,7 +19368,7 @@
           <p:cNvPr id="39" name="직사각형 38">
             <a:extLst>
               <a:ext uri="{FF2B5EF4-FFF2-40B4-BE49-F238E27FC236}">
-                <a16:creationId xmlns:a16="http://schemas.microsoft.com/office/drawing/2014/main" xmlns="" id="{7BB9F99A-D161-4DBE-B5DE-AB644DE99D34}"/>
+                <a16:creationId xmlns="" xmlns:a16="http://schemas.microsoft.com/office/drawing/2014/main" id="{7BB9F99A-D161-4DBE-B5DE-AB644DE99D34}"/>
               </a:ext>
             </a:extLst>
           </p:cNvPr>
@@ -19277,7 +19464,7 @@
           <p:cNvPr id="2" name="제목 1">
             <a:extLst>
               <a:ext uri="{FF2B5EF4-FFF2-40B4-BE49-F238E27FC236}">
-                <a16:creationId xmlns:a16="http://schemas.microsoft.com/office/drawing/2014/main" xmlns="" id="{36E46BD5-9BF8-4A36-B399-C907B8D17343}"/>
+                <a16:creationId xmlns="" xmlns:a16="http://schemas.microsoft.com/office/drawing/2014/main" id="{36E46BD5-9BF8-4A36-B399-C907B8D17343}"/>
               </a:ext>
             </a:extLst>
           </p:cNvPr>
@@ -19317,7 +19504,7 @@
           <p:cNvPr id="37" name="내용 개체 틀 2">
             <a:extLst>
               <a:ext uri="{FF2B5EF4-FFF2-40B4-BE49-F238E27FC236}">
-                <a16:creationId xmlns:a16="http://schemas.microsoft.com/office/drawing/2014/main" xmlns="" id="{5B46A43F-CED7-4526-81B5-2A8AAB741294}"/>
+                <a16:creationId xmlns="" xmlns:a16="http://schemas.microsoft.com/office/drawing/2014/main" id="{5B46A43F-CED7-4526-81B5-2A8AAB741294}"/>
               </a:ext>
             </a:extLst>
           </p:cNvPr>
@@ -19368,7 +19555,7 @@
           <p:cNvPr id="5" name="표 5">
             <a:extLst>
               <a:ext uri="{FF2B5EF4-FFF2-40B4-BE49-F238E27FC236}">
-                <a16:creationId xmlns:a16="http://schemas.microsoft.com/office/drawing/2014/main" xmlns="" id="{F1B2414C-790C-48B3-99E9-0DC9274292DF}"/>
+                <a16:creationId xmlns="" xmlns:a16="http://schemas.microsoft.com/office/drawing/2014/main" id="{F1B2414C-790C-48B3-99E9-0DC9274292DF}"/>
               </a:ext>
             </a:extLst>
           </p:cNvPr>
@@ -19397,56 +19584,56 @@
                 <a:gridCol w="556101">
                   <a:extLst>
                     <a:ext uri="{9D8B030D-6E8A-4147-A177-3AD203B41FA5}">
-                      <a16:colId xmlns:a16="http://schemas.microsoft.com/office/drawing/2014/main" xmlns="" val="2386657572"/>
+                      <a16:colId xmlns="" xmlns:a16="http://schemas.microsoft.com/office/drawing/2014/main" val="2386657572"/>
                     </a:ext>
                   </a:extLst>
                 </a:gridCol>
                 <a:gridCol w="1243899">
                   <a:extLst>
                     <a:ext uri="{9D8B030D-6E8A-4147-A177-3AD203B41FA5}">
-                      <a16:colId xmlns:a16="http://schemas.microsoft.com/office/drawing/2014/main" xmlns="" val="4083065442"/>
+                      <a16:colId xmlns="" xmlns:a16="http://schemas.microsoft.com/office/drawing/2014/main" val="4083065442"/>
                     </a:ext>
                   </a:extLst>
                 </a:gridCol>
                 <a:gridCol w="260916">
                   <a:extLst>
                     <a:ext uri="{9D8B030D-6E8A-4147-A177-3AD203B41FA5}">
-                      <a16:colId xmlns:a16="http://schemas.microsoft.com/office/drawing/2014/main" xmlns="" val="1590782492"/>
+                      <a16:colId xmlns="" xmlns:a16="http://schemas.microsoft.com/office/drawing/2014/main" val="1590782492"/>
                     </a:ext>
                   </a:extLst>
                 </a:gridCol>
                 <a:gridCol w="639083">
                   <a:extLst>
                     <a:ext uri="{9D8B030D-6E8A-4147-A177-3AD203B41FA5}">
-                      <a16:colId xmlns:a16="http://schemas.microsoft.com/office/drawing/2014/main" xmlns="" val="3241232831"/>
+                      <a16:colId xmlns="" xmlns:a16="http://schemas.microsoft.com/office/drawing/2014/main" val="3241232831"/>
                     </a:ext>
                   </a:extLst>
                 </a:gridCol>
                 <a:gridCol w="603784">
                   <a:extLst>
                     <a:ext uri="{9D8B030D-6E8A-4147-A177-3AD203B41FA5}">
-                      <a16:colId xmlns:a16="http://schemas.microsoft.com/office/drawing/2014/main" xmlns="" val="2435956196"/>
+                      <a16:colId xmlns="" xmlns:a16="http://schemas.microsoft.com/office/drawing/2014/main" val="2435956196"/>
                     </a:ext>
                   </a:extLst>
                 </a:gridCol>
                 <a:gridCol w="296216">
                   <a:extLst>
                     <a:ext uri="{9D8B030D-6E8A-4147-A177-3AD203B41FA5}">
-                      <a16:colId xmlns:a16="http://schemas.microsoft.com/office/drawing/2014/main" xmlns="" val="3530580508"/>
+                      <a16:colId xmlns="" xmlns:a16="http://schemas.microsoft.com/office/drawing/2014/main" val="3530580508"/>
                     </a:ext>
                   </a:extLst>
                 </a:gridCol>
                 <a:gridCol w="1247615">
                   <a:extLst>
                     <a:ext uri="{9D8B030D-6E8A-4147-A177-3AD203B41FA5}">
-                      <a16:colId xmlns:a16="http://schemas.microsoft.com/office/drawing/2014/main" xmlns="" val="154686974"/>
+                      <a16:colId xmlns="" xmlns:a16="http://schemas.microsoft.com/office/drawing/2014/main" val="154686974"/>
                     </a:ext>
                   </a:extLst>
                 </a:gridCol>
                 <a:gridCol w="552386">
                   <a:extLst>
                     <a:ext uri="{9D8B030D-6E8A-4147-A177-3AD203B41FA5}">
-                      <a16:colId xmlns:a16="http://schemas.microsoft.com/office/drawing/2014/main" xmlns="" val="1514467867"/>
+                      <a16:colId xmlns="" xmlns:a16="http://schemas.microsoft.com/office/drawing/2014/main" val="1514467867"/>
                     </a:ext>
                   </a:extLst>
                 </a:gridCol>
@@ -19616,7 +19803,7 @@
                 </a:tc>
                 <a:extLst>
                   <a:ext uri="{0D108BD9-81ED-4DB2-BD59-A6C34878D82A}">
-                    <a16:rowId xmlns:a16="http://schemas.microsoft.com/office/drawing/2014/main" xmlns="" val="2183292843"/>
+                    <a16:rowId xmlns="" xmlns:a16="http://schemas.microsoft.com/office/drawing/2014/main" val="2183292843"/>
                   </a:ext>
                 </a:extLst>
               </a:tr>
@@ -19893,7 +20080,7 @@
                 </a:tc>
                 <a:extLst>
                   <a:ext uri="{0D108BD9-81ED-4DB2-BD59-A6C34878D82A}">
-                    <a16:rowId xmlns:a16="http://schemas.microsoft.com/office/drawing/2014/main" xmlns="" val="2530478243"/>
+                    <a16:rowId xmlns="" xmlns:a16="http://schemas.microsoft.com/office/drawing/2014/main" val="2530478243"/>
                   </a:ext>
                 </a:extLst>
               </a:tr>
@@ -20289,7 +20476,7 @@
                 </a:tc>
                 <a:extLst>
                   <a:ext uri="{0D108BD9-81ED-4DB2-BD59-A6C34878D82A}">
-                    <a16:rowId xmlns:a16="http://schemas.microsoft.com/office/drawing/2014/main" xmlns="" val="2806121530"/>
+                    <a16:rowId xmlns="" xmlns:a16="http://schemas.microsoft.com/office/drawing/2014/main" val="2806121530"/>
                   </a:ext>
                 </a:extLst>
               </a:tr>
@@ -20496,7 +20683,7 @@
                 </a:tc>
                 <a:extLst>
                   <a:ext uri="{0D108BD9-81ED-4DB2-BD59-A6C34878D82A}">
-                    <a16:rowId xmlns:a16="http://schemas.microsoft.com/office/drawing/2014/main" xmlns="" val="982134245"/>
+                    <a16:rowId xmlns="" xmlns:a16="http://schemas.microsoft.com/office/drawing/2014/main" val="982134245"/>
                   </a:ext>
                 </a:extLst>
               </a:tr>
@@ -20713,7 +20900,7 @@
                 </a:tc>
                 <a:extLst>
                   <a:ext uri="{0D108BD9-81ED-4DB2-BD59-A6C34878D82A}">
-                    <a16:rowId xmlns:a16="http://schemas.microsoft.com/office/drawing/2014/main" xmlns="" val="3751597697"/>
+                    <a16:rowId xmlns="" xmlns:a16="http://schemas.microsoft.com/office/drawing/2014/main" val="3751597697"/>
                   </a:ext>
                 </a:extLst>
               </a:tr>
@@ -21001,7 +21188,7 @@
                 </a:tc>
                 <a:extLst>
                   <a:ext uri="{0D108BD9-81ED-4DB2-BD59-A6C34878D82A}">
-                    <a16:rowId xmlns:a16="http://schemas.microsoft.com/office/drawing/2014/main" xmlns="" val="3079739193"/>
+                    <a16:rowId xmlns="" xmlns:a16="http://schemas.microsoft.com/office/drawing/2014/main" val="3079739193"/>
                   </a:ext>
                 </a:extLst>
               </a:tr>
@@ -21310,7 +21497,7 @@
                 </a:tc>
                 <a:extLst>
                   <a:ext uri="{0D108BD9-81ED-4DB2-BD59-A6C34878D82A}">
-                    <a16:rowId xmlns:a16="http://schemas.microsoft.com/office/drawing/2014/main" xmlns="" val="848844550"/>
+                    <a16:rowId xmlns="" xmlns:a16="http://schemas.microsoft.com/office/drawing/2014/main" val="848844550"/>
                   </a:ext>
                 </a:extLst>
               </a:tr>
@@ -21552,7 +21739,7 @@
                 </a:tc>
                 <a:extLst>
                   <a:ext uri="{0D108BD9-81ED-4DB2-BD59-A6C34878D82A}">
-                    <a16:rowId xmlns:a16="http://schemas.microsoft.com/office/drawing/2014/main" xmlns="" val="3609028511"/>
+                    <a16:rowId xmlns="" xmlns:a16="http://schemas.microsoft.com/office/drawing/2014/main" val="3609028511"/>
                   </a:ext>
                 </a:extLst>
               </a:tr>
@@ -21815,7 +22002,7 @@
                 </a:tc>
                 <a:extLst>
                   <a:ext uri="{0D108BD9-81ED-4DB2-BD59-A6C34878D82A}">
-                    <a16:rowId xmlns:a16="http://schemas.microsoft.com/office/drawing/2014/main" xmlns="" val="128158159"/>
+                    <a16:rowId xmlns="" xmlns:a16="http://schemas.microsoft.com/office/drawing/2014/main" val="128158159"/>
                   </a:ext>
                 </a:extLst>
               </a:tr>
@@ -21922,7 +22109,7 @@
           <p:cNvPr id="2" name="제목 1">
             <a:extLst>
               <a:ext uri="{FF2B5EF4-FFF2-40B4-BE49-F238E27FC236}">
-                <a16:creationId xmlns:a16="http://schemas.microsoft.com/office/drawing/2014/main" xmlns="" id="{36E46BD5-9BF8-4A36-B399-C907B8D17343}"/>
+                <a16:creationId xmlns="" xmlns:a16="http://schemas.microsoft.com/office/drawing/2014/main" id="{36E46BD5-9BF8-4A36-B399-C907B8D17343}"/>
               </a:ext>
             </a:extLst>
           </p:cNvPr>
@@ -21962,7 +22149,7 @@
           <p:cNvPr id="9" name="TextBox 8">
             <a:extLst>
               <a:ext uri="{FF2B5EF4-FFF2-40B4-BE49-F238E27FC236}">
-                <a16:creationId xmlns:a16="http://schemas.microsoft.com/office/drawing/2014/main" xmlns="" id="{0A697C2E-DA85-4400-BC23-D31124415A54}"/>
+                <a16:creationId xmlns="" xmlns:a16="http://schemas.microsoft.com/office/drawing/2014/main" id="{0A697C2E-DA85-4400-BC23-D31124415A54}"/>
               </a:ext>
             </a:extLst>
           </p:cNvPr>
@@ -22001,7 +22188,7 @@
           <p:cNvPr id="11" name="TextBox 10">
             <a:extLst>
               <a:ext uri="{FF2B5EF4-FFF2-40B4-BE49-F238E27FC236}">
-                <a16:creationId xmlns:a16="http://schemas.microsoft.com/office/drawing/2014/main" xmlns="" id="{7E856FC5-D020-47A6-9DA5-A3EB6BE9BEF7}"/>
+                <a16:creationId xmlns="" xmlns:a16="http://schemas.microsoft.com/office/drawing/2014/main" id="{7E856FC5-D020-47A6-9DA5-A3EB6BE9BEF7}"/>
               </a:ext>
             </a:extLst>
           </p:cNvPr>
@@ -22040,7 +22227,7 @@
           <p:cNvPr id="13" name="TextBox 12">
             <a:extLst>
               <a:ext uri="{FF2B5EF4-FFF2-40B4-BE49-F238E27FC236}">
-                <a16:creationId xmlns:a16="http://schemas.microsoft.com/office/drawing/2014/main" xmlns="" id="{557FFC3D-B8CD-48AC-B925-59A8784E2552}"/>
+                <a16:creationId xmlns="" xmlns:a16="http://schemas.microsoft.com/office/drawing/2014/main" id="{557FFC3D-B8CD-48AC-B925-59A8784E2552}"/>
               </a:ext>
             </a:extLst>
           </p:cNvPr>
@@ -22079,7 +22266,7 @@
           <p:cNvPr id="7" name="TextBox 6">
             <a:extLst>
               <a:ext uri="{FF2B5EF4-FFF2-40B4-BE49-F238E27FC236}">
-                <a16:creationId xmlns:a16="http://schemas.microsoft.com/office/drawing/2014/main" xmlns="" id="{781934E9-DC69-428F-8DBA-509350978D0A}"/>
+                <a16:creationId xmlns="" xmlns:a16="http://schemas.microsoft.com/office/drawing/2014/main" id="{781934E9-DC69-428F-8DBA-509350978D0A}"/>
               </a:ext>
             </a:extLst>
           </p:cNvPr>
@@ -22148,7 +22335,7 @@
           <p:cNvPr id="2" name="제목 1">
             <a:extLst>
               <a:ext uri="{FF2B5EF4-FFF2-40B4-BE49-F238E27FC236}">
-                <a16:creationId xmlns:a16="http://schemas.microsoft.com/office/drawing/2014/main" xmlns="" id="{36E46BD5-9BF8-4A36-B399-C907B8D17343}"/>
+                <a16:creationId xmlns="" xmlns:a16="http://schemas.microsoft.com/office/drawing/2014/main" id="{36E46BD5-9BF8-4A36-B399-C907B8D17343}"/>
               </a:ext>
             </a:extLst>
           </p:cNvPr>
@@ -22181,7 +22368,7 @@
           <p:cNvPr id="5" name="표 5">
             <a:extLst>
               <a:ext uri="{FF2B5EF4-FFF2-40B4-BE49-F238E27FC236}">
-                <a16:creationId xmlns:a16="http://schemas.microsoft.com/office/drawing/2014/main" xmlns="" id="{CE5321EC-7E91-4224-8F3F-B12331B5CA1C}"/>
+                <a16:creationId xmlns="" xmlns:a16="http://schemas.microsoft.com/office/drawing/2014/main" id="{CE5321EC-7E91-4224-8F3F-B12331B5CA1C}"/>
               </a:ext>
             </a:extLst>
           </p:cNvPr>
@@ -22204,35 +22391,35 @@
                 <a:gridCol w="1643380">
                   <a:extLst>
                     <a:ext uri="{9D8B030D-6E8A-4147-A177-3AD203B41FA5}">
-                      <a16:colId xmlns:a16="http://schemas.microsoft.com/office/drawing/2014/main" xmlns="" val="4195148219"/>
+                      <a16:colId xmlns="" xmlns:a16="http://schemas.microsoft.com/office/drawing/2014/main" val="4195148219"/>
                     </a:ext>
                   </a:extLst>
                 </a:gridCol>
                 <a:gridCol w="1643380">
                   <a:extLst>
                     <a:ext uri="{9D8B030D-6E8A-4147-A177-3AD203B41FA5}">
-                      <a16:colId xmlns:a16="http://schemas.microsoft.com/office/drawing/2014/main" xmlns="" val="1289355730"/>
+                      <a16:colId xmlns="" xmlns:a16="http://schemas.microsoft.com/office/drawing/2014/main" val="1289355730"/>
                     </a:ext>
                   </a:extLst>
                 </a:gridCol>
                 <a:gridCol w="1643380">
                   <a:extLst>
                     <a:ext uri="{9D8B030D-6E8A-4147-A177-3AD203B41FA5}">
-                      <a16:colId xmlns:a16="http://schemas.microsoft.com/office/drawing/2014/main" xmlns="" val="428314179"/>
+                      <a16:colId xmlns="" xmlns:a16="http://schemas.microsoft.com/office/drawing/2014/main" val="428314179"/>
                     </a:ext>
                   </a:extLst>
                 </a:gridCol>
                 <a:gridCol w="1643380">
                   <a:extLst>
                     <a:ext uri="{9D8B030D-6E8A-4147-A177-3AD203B41FA5}">
-                      <a16:colId xmlns:a16="http://schemas.microsoft.com/office/drawing/2014/main" xmlns="" val="950064612"/>
+                      <a16:colId xmlns="" xmlns:a16="http://schemas.microsoft.com/office/drawing/2014/main" val="950064612"/>
                     </a:ext>
                   </a:extLst>
                 </a:gridCol>
                 <a:gridCol w="1643380">
                   <a:extLst>
                     <a:ext uri="{9D8B030D-6E8A-4147-A177-3AD203B41FA5}">
-                      <a16:colId xmlns:a16="http://schemas.microsoft.com/office/drawing/2014/main" xmlns="" val="3734129081"/>
+                      <a16:colId xmlns="" xmlns:a16="http://schemas.microsoft.com/office/drawing/2014/main" val="3734129081"/>
                     </a:ext>
                   </a:extLst>
                 </a:gridCol>
@@ -22415,7 +22602,7 @@
                 </a:tc>
                 <a:extLst>
                   <a:ext uri="{0D108BD9-81ED-4DB2-BD59-A6C34878D82A}">
-                    <a16:rowId xmlns:a16="http://schemas.microsoft.com/office/drawing/2014/main" xmlns="" val="3279705563"/>
+                    <a16:rowId xmlns="" xmlns:a16="http://schemas.microsoft.com/office/drawing/2014/main" val="3279705563"/>
                   </a:ext>
                 </a:extLst>
               </a:tr>
@@ -22522,7 +22709,7 @@
                 </a:tc>
                 <a:extLst>
                   <a:ext uri="{0D108BD9-81ED-4DB2-BD59-A6C34878D82A}">
-                    <a16:rowId xmlns:a16="http://schemas.microsoft.com/office/drawing/2014/main" xmlns="" val="3713229009"/>
+                    <a16:rowId xmlns="" xmlns:a16="http://schemas.microsoft.com/office/drawing/2014/main" val="3713229009"/>
                   </a:ext>
                 </a:extLst>
               </a:tr>
@@ -22626,7 +22813,7 @@
                 </a:tc>
                 <a:extLst>
                   <a:ext uri="{0D108BD9-81ED-4DB2-BD59-A6C34878D82A}">
-                    <a16:rowId xmlns:a16="http://schemas.microsoft.com/office/drawing/2014/main" xmlns="" val="1156813139"/>
+                    <a16:rowId xmlns="" xmlns:a16="http://schemas.microsoft.com/office/drawing/2014/main" val="1156813139"/>
                   </a:ext>
                 </a:extLst>
               </a:tr>
@@ -22730,7 +22917,7 @@
                 </a:tc>
                 <a:extLst>
                   <a:ext uri="{0D108BD9-81ED-4DB2-BD59-A6C34878D82A}">
-                    <a16:rowId xmlns:a16="http://schemas.microsoft.com/office/drawing/2014/main" xmlns="" val="3166441492"/>
+                    <a16:rowId xmlns="" xmlns:a16="http://schemas.microsoft.com/office/drawing/2014/main" val="3166441492"/>
                   </a:ext>
                 </a:extLst>
               </a:tr>
@@ -22830,7 +23017,7 @@
                 </a:tc>
                 <a:extLst>
                   <a:ext uri="{0D108BD9-81ED-4DB2-BD59-A6C34878D82A}">
-                    <a16:rowId xmlns:a16="http://schemas.microsoft.com/office/drawing/2014/main" xmlns="" val="1543985384"/>
+                    <a16:rowId xmlns="" xmlns:a16="http://schemas.microsoft.com/office/drawing/2014/main" val="1543985384"/>
                   </a:ext>
                 </a:extLst>
               </a:tr>
@@ -22978,7 +23165,7 @@
                 </a:tc>
                 <a:extLst>
                   <a:ext uri="{0D108BD9-81ED-4DB2-BD59-A6C34878D82A}">
-                    <a16:rowId xmlns:a16="http://schemas.microsoft.com/office/drawing/2014/main" xmlns="" val="709487535"/>
+                    <a16:rowId xmlns="" xmlns:a16="http://schemas.microsoft.com/office/drawing/2014/main" val="709487535"/>
                   </a:ext>
                 </a:extLst>
               </a:tr>
@@ -22991,7 +23178,7 @@
           <p:cNvPr id="6" name="화살표: 오른쪽 5">
             <a:extLst>
               <a:ext uri="{FF2B5EF4-FFF2-40B4-BE49-F238E27FC236}">
-                <a16:creationId xmlns:a16="http://schemas.microsoft.com/office/drawing/2014/main" xmlns="" id="{5C11C6D9-84D7-4B68-9771-3C04E09307C0}"/>
+                <a16:creationId xmlns="" xmlns:a16="http://schemas.microsoft.com/office/drawing/2014/main" id="{5C11C6D9-84D7-4B68-9771-3C04E09307C0}"/>
               </a:ext>
             </a:extLst>
           </p:cNvPr>
@@ -23037,7 +23224,7 @@
           <p:cNvPr id="7" name="화살표: 오른쪽 6">
             <a:extLst>
               <a:ext uri="{FF2B5EF4-FFF2-40B4-BE49-F238E27FC236}">
-                <a16:creationId xmlns:a16="http://schemas.microsoft.com/office/drawing/2014/main" xmlns="" id="{D4486C86-CF19-45F5-8107-DDE00562DFD4}"/>
+                <a16:creationId xmlns="" xmlns:a16="http://schemas.microsoft.com/office/drawing/2014/main" id="{D4486C86-CF19-45F5-8107-DDE00562DFD4}"/>
               </a:ext>
             </a:extLst>
           </p:cNvPr>
@@ -23083,7 +23270,7 @@
           <p:cNvPr id="8" name="화살표: 오른쪽 7">
             <a:extLst>
               <a:ext uri="{FF2B5EF4-FFF2-40B4-BE49-F238E27FC236}">
-                <a16:creationId xmlns:a16="http://schemas.microsoft.com/office/drawing/2014/main" xmlns="" id="{F8C0F45F-2834-48DE-A50F-D09A6D94B67D}"/>
+                <a16:creationId xmlns="" xmlns:a16="http://schemas.microsoft.com/office/drawing/2014/main" id="{F8C0F45F-2834-48DE-A50F-D09A6D94B67D}"/>
               </a:ext>
             </a:extLst>
           </p:cNvPr>
@@ -23129,7 +23316,7 @@
           <p:cNvPr id="9" name="화살표: 오른쪽 8">
             <a:extLst>
               <a:ext uri="{FF2B5EF4-FFF2-40B4-BE49-F238E27FC236}">
-                <a16:creationId xmlns:a16="http://schemas.microsoft.com/office/drawing/2014/main" xmlns="" id="{93BD7CF1-82CD-496E-8272-BA01C741CE8E}"/>
+                <a16:creationId xmlns="" xmlns:a16="http://schemas.microsoft.com/office/drawing/2014/main" id="{93BD7CF1-82CD-496E-8272-BA01C741CE8E}"/>
               </a:ext>
             </a:extLst>
           </p:cNvPr>
@@ -23175,7 +23362,7 @@
           <p:cNvPr id="10" name="화살표: 오른쪽 9">
             <a:extLst>
               <a:ext uri="{FF2B5EF4-FFF2-40B4-BE49-F238E27FC236}">
-                <a16:creationId xmlns:a16="http://schemas.microsoft.com/office/drawing/2014/main" xmlns="" id="{A375DDD9-4D19-443A-8C9A-35E4EDCE8594}"/>
+                <a16:creationId xmlns="" xmlns:a16="http://schemas.microsoft.com/office/drawing/2014/main" id="{A375DDD9-4D19-443A-8C9A-35E4EDCE8594}"/>
               </a:ext>
             </a:extLst>
           </p:cNvPr>
@@ -23251,7 +23438,7 @@
           <p:cNvPr id="2" name="제목 1">
             <a:extLst>
               <a:ext uri="{FF2B5EF4-FFF2-40B4-BE49-F238E27FC236}">
-                <a16:creationId xmlns:a16="http://schemas.microsoft.com/office/drawing/2014/main" xmlns="" id="{36E46BD5-9BF8-4A36-B399-C907B8D17343}"/>
+                <a16:creationId xmlns="" xmlns:a16="http://schemas.microsoft.com/office/drawing/2014/main" id="{36E46BD5-9BF8-4A36-B399-C907B8D17343}"/>
               </a:ext>
             </a:extLst>
           </p:cNvPr>
@@ -23284,7 +23471,7 @@
           <p:cNvPr id="3" name="내용 개체 틀 2">
             <a:extLst>
               <a:ext uri="{FF2B5EF4-FFF2-40B4-BE49-F238E27FC236}">
-                <a16:creationId xmlns:a16="http://schemas.microsoft.com/office/drawing/2014/main" xmlns="" id="{CE680D33-7DE6-430A-91B0-F2A3DC91933B}"/>
+                <a16:creationId xmlns="" xmlns:a16="http://schemas.microsoft.com/office/drawing/2014/main" id="{CE680D33-7DE6-430A-91B0-F2A3DC91933B}"/>
               </a:ext>
             </a:extLst>
           </p:cNvPr>
@@ -23478,7 +23665,7 @@
           <p:cNvPr id="2" name="제목 1">
             <a:extLst>
               <a:ext uri="{FF2B5EF4-FFF2-40B4-BE49-F238E27FC236}">
-                <a16:creationId xmlns:a16="http://schemas.microsoft.com/office/drawing/2014/main" xmlns="" id="{36E46BD5-9BF8-4A36-B399-C907B8D17343}"/>
+                <a16:creationId xmlns="" xmlns:a16="http://schemas.microsoft.com/office/drawing/2014/main" id="{36E46BD5-9BF8-4A36-B399-C907B8D17343}"/>
               </a:ext>
             </a:extLst>
           </p:cNvPr>
@@ -23511,7 +23698,7 @@
           <p:cNvPr id="3" name="내용 개체 틀 2">
             <a:extLst>
               <a:ext uri="{FF2B5EF4-FFF2-40B4-BE49-F238E27FC236}">
-                <a16:creationId xmlns:a16="http://schemas.microsoft.com/office/drawing/2014/main" xmlns="" id="{CE680D33-7DE6-430A-91B0-F2A3DC91933B}"/>
+                <a16:creationId xmlns="" xmlns:a16="http://schemas.microsoft.com/office/drawing/2014/main" id="{CE680D33-7DE6-430A-91B0-F2A3DC91933B}"/>
               </a:ext>
             </a:extLst>
           </p:cNvPr>
@@ -23597,7 +23784,7 @@
           <p:cNvPr id="5" name="그림 4">
             <a:extLst>
               <a:ext uri="{FF2B5EF4-FFF2-40B4-BE49-F238E27FC236}">
-                <a16:creationId xmlns:a16="http://schemas.microsoft.com/office/drawing/2014/main" xmlns="" id="{D31AD1C7-08BF-4A7F-86B2-D6A841D3658B}"/>
+                <a16:creationId xmlns="" xmlns:a16="http://schemas.microsoft.com/office/drawing/2014/main" id="{D31AD1C7-08BF-4A7F-86B2-D6A841D3658B}"/>
               </a:ext>
             </a:extLst>
           </p:cNvPr>
@@ -23632,7 +23819,7 @@
           <p:cNvPr id="4" name="TextBox 3">
             <a:extLst>
               <a:ext uri="{FF2B5EF4-FFF2-40B4-BE49-F238E27FC236}">
-                <a16:creationId xmlns:a16="http://schemas.microsoft.com/office/drawing/2014/main" xmlns="" id="{AED0DE7B-6ACD-4F61-A099-CB90B1413966}"/>
+                <a16:creationId xmlns="" xmlns:a16="http://schemas.microsoft.com/office/drawing/2014/main" id="{AED0DE7B-6ACD-4F61-A099-CB90B1413966}"/>
               </a:ext>
             </a:extLst>
           </p:cNvPr>
@@ -23708,7 +23895,7 @@
           <p:cNvPr id="2" name="제목 1">
             <a:extLst>
               <a:ext uri="{FF2B5EF4-FFF2-40B4-BE49-F238E27FC236}">
-                <a16:creationId xmlns:a16="http://schemas.microsoft.com/office/drawing/2014/main" xmlns="" id="{36E46BD5-9BF8-4A36-B399-C907B8D17343}"/>
+                <a16:creationId xmlns="" xmlns:a16="http://schemas.microsoft.com/office/drawing/2014/main" id="{36E46BD5-9BF8-4A36-B399-C907B8D17343}"/>
               </a:ext>
             </a:extLst>
           </p:cNvPr>
@@ -23741,7 +23928,7 @@
           <p:cNvPr id="3" name="내용 개체 틀 2">
             <a:extLst>
               <a:ext uri="{FF2B5EF4-FFF2-40B4-BE49-F238E27FC236}">
-                <a16:creationId xmlns:a16="http://schemas.microsoft.com/office/drawing/2014/main" xmlns="" id="{CE680D33-7DE6-430A-91B0-F2A3DC91933B}"/>
+                <a16:creationId xmlns="" xmlns:a16="http://schemas.microsoft.com/office/drawing/2014/main" id="{CE680D33-7DE6-430A-91B0-F2A3DC91933B}"/>
               </a:ext>
             </a:extLst>
           </p:cNvPr>
@@ -23956,7 +24143,7 @@
           <p:cNvPr id="2" name="제목 1">
             <a:extLst>
               <a:ext uri="{FF2B5EF4-FFF2-40B4-BE49-F238E27FC236}">
-                <a16:creationId xmlns:a16="http://schemas.microsoft.com/office/drawing/2014/main" xmlns="" id="{36E46BD5-9BF8-4A36-B399-C907B8D17343}"/>
+                <a16:creationId xmlns="" xmlns:a16="http://schemas.microsoft.com/office/drawing/2014/main" id="{36E46BD5-9BF8-4A36-B399-C907B8D17343}"/>
               </a:ext>
             </a:extLst>
           </p:cNvPr>
@@ -23989,7 +24176,7 @@
           <p:cNvPr id="3" name="내용 개체 틀 2">
             <a:extLst>
               <a:ext uri="{FF2B5EF4-FFF2-40B4-BE49-F238E27FC236}">
-                <a16:creationId xmlns:a16="http://schemas.microsoft.com/office/drawing/2014/main" xmlns="" id="{CE680D33-7DE6-430A-91B0-F2A3DC91933B}"/>
+                <a16:creationId xmlns="" xmlns:a16="http://schemas.microsoft.com/office/drawing/2014/main" id="{CE680D33-7DE6-430A-91B0-F2A3DC91933B}"/>
               </a:ext>
             </a:extLst>
           </p:cNvPr>
@@ -24244,7 +24431,7 @@
           <p:cNvPr id="2" name="제목 1">
             <a:extLst>
               <a:ext uri="{FF2B5EF4-FFF2-40B4-BE49-F238E27FC236}">
-                <a16:creationId xmlns:a16="http://schemas.microsoft.com/office/drawing/2014/main" xmlns="" id="{36E46BD5-9BF8-4A36-B399-C907B8D17343}"/>
+                <a16:creationId xmlns="" xmlns:a16="http://schemas.microsoft.com/office/drawing/2014/main" id="{36E46BD5-9BF8-4A36-B399-C907B8D17343}"/>
               </a:ext>
             </a:extLst>
           </p:cNvPr>
@@ -24284,7 +24471,7 @@
           <p:cNvPr id="12" name="내용 개체 틀 2">
             <a:extLst>
               <a:ext uri="{FF2B5EF4-FFF2-40B4-BE49-F238E27FC236}">
-                <a16:creationId xmlns:a16="http://schemas.microsoft.com/office/drawing/2014/main" xmlns="" id="{135DF031-1573-492B-A38B-1FB524DF4CD3}"/>
+                <a16:creationId xmlns="" xmlns:a16="http://schemas.microsoft.com/office/drawing/2014/main" id="{135DF031-1573-492B-A38B-1FB524DF4CD3}"/>
               </a:ext>
             </a:extLst>
           </p:cNvPr>
@@ -24335,7 +24522,7 @@
           <p:cNvPr id="5" name="직사각형 4">
             <a:extLst>
               <a:ext uri="{FF2B5EF4-FFF2-40B4-BE49-F238E27FC236}">
-                <a16:creationId xmlns:a16="http://schemas.microsoft.com/office/drawing/2014/main" xmlns="" id="{3ECAA62B-75D5-49B5-B752-079E72A949D0}"/>
+                <a16:creationId xmlns="" xmlns:a16="http://schemas.microsoft.com/office/drawing/2014/main" id="{3ECAA62B-75D5-49B5-B752-079E72A949D0}"/>
               </a:ext>
             </a:extLst>
           </p:cNvPr>
@@ -24387,7 +24574,7 @@
           <p:cNvPr id="3" name="직사각형 2">
             <a:extLst>
               <a:ext uri="{FF2B5EF4-FFF2-40B4-BE49-F238E27FC236}">
-                <a16:creationId xmlns:a16="http://schemas.microsoft.com/office/drawing/2014/main" xmlns="" id="{A760900A-5E7D-48C8-A6B0-1FBA118307B6}"/>
+                <a16:creationId xmlns="" xmlns:a16="http://schemas.microsoft.com/office/drawing/2014/main" id="{A760900A-5E7D-48C8-A6B0-1FBA118307B6}"/>
               </a:ext>
             </a:extLst>
           </p:cNvPr>
@@ -24439,7 +24626,7 @@
           <p:cNvPr id="4" name="직사각형 3">
             <a:extLst>
               <a:ext uri="{FF2B5EF4-FFF2-40B4-BE49-F238E27FC236}">
-                <a16:creationId xmlns:a16="http://schemas.microsoft.com/office/drawing/2014/main" xmlns="" id="{5FE51907-01A9-48BB-9DBC-05319A2A0903}"/>
+                <a16:creationId xmlns="" xmlns:a16="http://schemas.microsoft.com/office/drawing/2014/main" id="{5FE51907-01A9-48BB-9DBC-05319A2A0903}"/>
               </a:ext>
             </a:extLst>
           </p:cNvPr>
@@ -24491,7 +24678,7 @@
           <p:cNvPr id="6" name="직사각형 5">
             <a:extLst>
               <a:ext uri="{FF2B5EF4-FFF2-40B4-BE49-F238E27FC236}">
-                <a16:creationId xmlns:a16="http://schemas.microsoft.com/office/drawing/2014/main" xmlns="" id="{BB66BF40-4DC9-4996-AB13-8B851C9E5F49}"/>
+                <a16:creationId xmlns="" xmlns:a16="http://schemas.microsoft.com/office/drawing/2014/main" id="{BB66BF40-4DC9-4996-AB13-8B851C9E5F49}"/>
               </a:ext>
             </a:extLst>
           </p:cNvPr>
@@ -24552,7 +24739,7 @@
           <p:cNvPr id="8" name="TextBox 7">
             <a:extLst>
               <a:ext uri="{FF2B5EF4-FFF2-40B4-BE49-F238E27FC236}">
-                <a16:creationId xmlns:a16="http://schemas.microsoft.com/office/drawing/2014/main" xmlns="" id="{6E25E96F-5BB1-41E7-BBBF-C6AA736E1B00}"/>
+                <a16:creationId xmlns="" xmlns:a16="http://schemas.microsoft.com/office/drawing/2014/main" id="{6E25E96F-5BB1-41E7-BBBF-C6AA736E1B00}"/>
               </a:ext>
             </a:extLst>
           </p:cNvPr>
@@ -24592,7 +24779,7 @@
           <p:cNvPr id="10" name="TextBox 9">
             <a:extLst>
               <a:ext uri="{FF2B5EF4-FFF2-40B4-BE49-F238E27FC236}">
-                <a16:creationId xmlns:a16="http://schemas.microsoft.com/office/drawing/2014/main" xmlns="" id="{E30AD887-0D54-4F45-B857-812C94248538}"/>
+                <a16:creationId xmlns="" xmlns:a16="http://schemas.microsoft.com/office/drawing/2014/main" id="{E30AD887-0D54-4F45-B857-812C94248538}"/>
               </a:ext>
             </a:extLst>
           </p:cNvPr>
@@ -24632,7 +24819,7 @@
           <p:cNvPr id="11" name="직사각형 10">
             <a:extLst>
               <a:ext uri="{FF2B5EF4-FFF2-40B4-BE49-F238E27FC236}">
-                <a16:creationId xmlns:a16="http://schemas.microsoft.com/office/drawing/2014/main" xmlns="" id="{44858FF4-17C5-488D-86CA-D63AD335D27D}"/>
+                <a16:creationId xmlns="" xmlns:a16="http://schemas.microsoft.com/office/drawing/2014/main" id="{44858FF4-17C5-488D-86CA-D63AD335D27D}"/>
               </a:ext>
             </a:extLst>
           </p:cNvPr>
@@ -24723,7 +24910,7 @@
           <p:cNvPr id="2" name="제목 1">
             <a:extLst>
               <a:ext uri="{FF2B5EF4-FFF2-40B4-BE49-F238E27FC236}">
-                <a16:creationId xmlns:a16="http://schemas.microsoft.com/office/drawing/2014/main" xmlns="" id="{36E46BD5-9BF8-4A36-B399-C907B8D17343}"/>
+                <a16:creationId xmlns="" xmlns:a16="http://schemas.microsoft.com/office/drawing/2014/main" id="{36E46BD5-9BF8-4A36-B399-C907B8D17343}"/>
               </a:ext>
             </a:extLst>
           </p:cNvPr>
@@ -24763,7 +24950,7 @@
           <p:cNvPr id="12" name="내용 개체 틀 2">
             <a:extLst>
               <a:ext uri="{FF2B5EF4-FFF2-40B4-BE49-F238E27FC236}">
-                <a16:creationId xmlns:a16="http://schemas.microsoft.com/office/drawing/2014/main" xmlns="" id="{135DF031-1573-492B-A38B-1FB524DF4CD3}"/>
+                <a16:creationId xmlns="" xmlns:a16="http://schemas.microsoft.com/office/drawing/2014/main" id="{135DF031-1573-492B-A38B-1FB524DF4CD3}"/>
               </a:ext>
             </a:extLst>
           </p:cNvPr>
@@ -24814,7 +25001,7 @@
           <p:cNvPr id="16" name="TextBox 15">
             <a:extLst>
               <a:ext uri="{FF2B5EF4-FFF2-40B4-BE49-F238E27FC236}">
-                <a16:creationId xmlns:a16="http://schemas.microsoft.com/office/drawing/2014/main" xmlns="" id="{C0E870D6-3960-445A-8CE2-27E80D46A8A8}"/>
+                <a16:creationId xmlns="" xmlns:a16="http://schemas.microsoft.com/office/drawing/2014/main" id="{C0E870D6-3960-445A-8CE2-27E80D46A8A8}"/>
               </a:ext>
             </a:extLst>
           </p:cNvPr>
@@ -24857,7 +25044,7 @@
           <p:cNvPr id="19" name="표 7">
             <a:extLst>
               <a:ext uri="{FF2B5EF4-FFF2-40B4-BE49-F238E27FC236}">
-                <a16:creationId xmlns:a16="http://schemas.microsoft.com/office/drawing/2014/main" xmlns="" id="{7705F207-3732-4195-9B8D-15FE265CCB20}"/>
+                <a16:creationId xmlns="" xmlns:a16="http://schemas.microsoft.com/office/drawing/2014/main" id="{7705F207-3732-4195-9B8D-15FE265CCB20}"/>
               </a:ext>
             </a:extLst>
           </p:cNvPr>
@@ -24886,14 +25073,14 @@
                 <a:gridCol w="2341882">
                   <a:extLst>
                     <a:ext uri="{9D8B030D-6E8A-4147-A177-3AD203B41FA5}">
-                      <a16:colId xmlns:a16="http://schemas.microsoft.com/office/drawing/2014/main" xmlns="" val="107667662"/>
+                      <a16:colId xmlns="" xmlns:a16="http://schemas.microsoft.com/office/drawing/2014/main" val="107667662"/>
                     </a:ext>
                   </a:extLst>
                 </a:gridCol>
                 <a:gridCol w="2341881">
                   <a:extLst>
                     <a:ext uri="{9D8B030D-6E8A-4147-A177-3AD203B41FA5}">
-                      <a16:colId xmlns:a16="http://schemas.microsoft.com/office/drawing/2014/main" xmlns="" val="1487680637"/>
+                      <a16:colId xmlns="" xmlns:a16="http://schemas.microsoft.com/office/drawing/2014/main" val="1487680637"/>
                     </a:ext>
                   </a:extLst>
                 </a:gridCol>
@@ -25003,7 +25190,7 @@
                 </a:tc>
                 <a:extLst>
                   <a:ext uri="{0D108BD9-81ED-4DB2-BD59-A6C34878D82A}">
-                    <a16:rowId xmlns:a16="http://schemas.microsoft.com/office/drawing/2014/main" xmlns="" val="1720057414"/>
+                    <a16:rowId xmlns="" xmlns:a16="http://schemas.microsoft.com/office/drawing/2014/main" val="1720057414"/>
                   </a:ext>
                 </a:extLst>
               </a:tr>
@@ -25100,7 +25287,7 @@
                 </a:tc>
                 <a:extLst>
                   <a:ext uri="{0D108BD9-81ED-4DB2-BD59-A6C34878D82A}">
-                    <a16:rowId xmlns:a16="http://schemas.microsoft.com/office/drawing/2014/main" xmlns="" val="36251073"/>
+                    <a16:rowId xmlns="" xmlns:a16="http://schemas.microsoft.com/office/drawing/2014/main" val="36251073"/>
                   </a:ext>
                 </a:extLst>
               </a:tr>
@@ -25194,7 +25381,7 @@
                 </a:tc>
                 <a:extLst>
                   <a:ext uri="{0D108BD9-81ED-4DB2-BD59-A6C34878D82A}">
-                    <a16:rowId xmlns:a16="http://schemas.microsoft.com/office/drawing/2014/main" xmlns="" val="814545869"/>
+                    <a16:rowId xmlns="" xmlns:a16="http://schemas.microsoft.com/office/drawing/2014/main" val="814545869"/>
                   </a:ext>
                 </a:extLst>
               </a:tr>
@@ -25207,7 +25394,7 @@
           <p:cNvPr id="20" name="그림 19">
             <a:extLst>
               <a:ext uri="{FF2B5EF4-FFF2-40B4-BE49-F238E27FC236}">
-                <a16:creationId xmlns:a16="http://schemas.microsoft.com/office/drawing/2014/main" xmlns="" id="{ECC4DCF1-A29E-4AC5-9BE9-886C1C9C0A3E}"/>
+                <a16:creationId xmlns="" xmlns:a16="http://schemas.microsoft.com/office/drawing/2014/main" id="{ECC4DCF1-A29E-4AC5-9BE9-886C1C9C0A3E}"/>
               </a:ext>
             </a:extLst>
           </p:cNvPr>
@@ -25237,7 +25424,7 @@
           <p:cNvPr id="21" name="직사각형 20">
             <a:extLst>
               <a:ext uri="{FF2B5EF4-FFF2-40B4-BE49-F238E27FC236}">
-                <a16:creationId xmlns:a16="http://schemas.microsoft.com/office/drawing/2014/main" xmlns="" id="{4C3B8BAE-BADD-4E84-8894-74BDAC9DA8C9}"/>
+                <a16:creationId xmlns="" xmlns:a16="http://schemas.microsoft.com/office/drawing/2014/main" id="{4C3B8BAE-BADD-4E84-8894-74BDAC9DA8C9}"/>
               </a:ext>
             </a:extLst>
           </p:cNvPr>
@@ -25289,7 +25476,7 @@
           <p:cNvPr id="23" name="직사각형 22">
             <a:extLst>
               <a:ext uri="{FF2B5EF4-FFF2-40B4-BE49-F238E27FC236}">
-                <a16:creationId xmlns:a16="http://schemas.microsoft.com/office/drawing/2014/main" xmlns="" id="{8CAFE085-FE1B-4ABC-9D80-C2FF8A3E6D4A}"/>
+                <a16:creationId xmlns="" xmlns:a16="http://schemas.microsoft.com/office/drawing/2014/main" id="{8CAFE085-FE1B-4ABC-9D80-C2FF8A3E6D4A}"/>
               </a:ext>
             </a:extLst>
           </p:cNvPr>
@@ -25350,7 +25537,7 @@
           <p:cNvPr id="24" name="직사각형 23">
             <a:extLst>
               <a:ext uri="{FF2B5EF4-FFF2-40B4-BE49-F238E27FC236}">
-                <a16:creationId xmlns:a16="http://schemas.microsoft.com/office/drawing/2014/main" xmlns="" id="{D5738351-AE8A-4B13-B8A3-C92925D5F9C4}"/>
+                <a16:creationId xmlns="" xmlns:a16="http://schemas.microsoft.com/office/drawing/2014/main" id="{D5738351-AE8A-4B13-B8A3-C92925D5F9C4}"/>
               </a:ext>
             </a:extLst>
           </p:cNvPr>
@@ -25411,7 +25598,7 @@
           <p:cNvPr id="25" name="직사각형 24">
             <a:extLst>
               <a:ext uri="{FF2B5EF4-FFF2-40B4-BE49-F238E27FC236}">
-                <a16:creationId xmlns:a16="http://schemas.microsoft.com/office/drawing/2014/main" xmlns="" id="{C6705A6C-735E-4177-8611-DBE1A396A075}"/>
+                <a16:creationId xmlns="" xmlns:a16="http://schemas.microsoft.com/office/drawing/2014/main" id="{C6705A6C-735E-4177-8611-DBE1A396A075}"/>
               </a:ext>
             </a:extLst>
           </p:cNvPr>
@@ -25502,7 +25689,7 @@
           <p:cNvPr id="2" name="제목 1">
             <a:extLst>
               <a:ext uri="{FF2B5EF4-FFF2-40B4-BE49-F238E27FC236}">
-                <a16:creationId xmlns:a16="http://schemas.microsoft.com/office/drawing/2014/main" xmlns="" id="{36E46BD5-9BF8-4A36-B399-C907B8D17343}"/>
+                <a16:creationId xmlns="" xmlns:a16="http://schemas.microsoft.com/office/drawing/2014/main" id="{36E46BD5-9BF8-4A36-B399-C907B8D17343}"/>
               </a:ext>
             </a:extLst>
           </p:cNvPr>
@@ -25542,7 +25729,7 @@
           <p:cNvPr id="12" name="내용 개체 틀 2">
             <a:extLst>
               <a:ext uri="{FF2B5EF4-FFF2-40B4-BE49-F238E27FC236}">
-                <a16:creationId xmlns:a16="http://schemas.microsoft.com/office/drawing/2014/main" xmlns="" id="{135DF031-1573-492B-A38B-1FB524DF4CD3}"/>
+                <a16:creationId xmlns="" xmlns:a16="http://schemas.microsoft.com/office/drawing/2014/main" id="{135DF031-1573-492B-A38B-1FB524DF4CD3}"/>
               </a:ext>
             </a:extLst>
           </p:cNvPr>
@@ -25593,7 +25780,7 @@
           <p:cNvPr id="11" name="TextBox 10">
             <a:extLst>
               <a:ext uri="{FF2B5EF4-FFF2-40B4-BE49-F238E27FC236}">
-                <a16:creationId xmlns:a16="http://schemas.microsoft.com/office/drawing/2014/main" xmlns="" id="{C0188EB4-90D7-492F-9909-90CB7FE3EA8A}"/>
+                <a16:creationId xmlns="" xmlns:a16="http://schemas.microsoft.com/office/drawing/2014/main" id="{C0188EB4-90D7-492F-9909-90CB7FE3EA8A}"/>
               </a:ext>
             </a:extLst>
           </p:cNvPr>
@@ -25636,7 +25823,7 @@
           <p:cNvPr id="13" name="표 7">
             <a:extLst>
               <a:ext uri="{FF2B5EF4-FFF2-40B4-BE49-F238E27FC236}">
-                <a16:creationId xmlns:a16="http://schemas.microsoft.com/office/drawing/2014/main" xmlns="" id="{8EC54993-0105-412E-8FB7-9AF8E0F7C09D}"/>
+                <a16:creationId xmlns="" xmlns:a16="http://schemas.microsoft.com/office/drawing/2014/main" id="{8EC54993-0105-412E-8FB7-9AF8E0F7C09D}"/>
               </a:ext>
             </a:extLst>
           </p:cNvPr>
@@ -25665,28 +25852,28 @@
                 <a:gridCol w="1561254">
                   <a:extLst>
                     <a:ext uri="{9D8B030D-6E8A-4147-A177-3AD203B41FA5}">
-                      <a16:colId xmlns:a16="http://schemas.microsoft.com/office/drawing/2014/main" xmlns="" val="107667662"/>
+                      <a16:colId xmlns="" xmlns:a16="http://schemas.microsoft.com/office/drawing/2014/main" val="107667662"/>
                     </a:ext>
                   </a:extLst>
                 </a:gridCol>
                 <a:gridCol w="780628">
                   <a:extLst>
                     <a:ext uri="{9D8B030D-6E8A-4147-A177-3AD203B41FA5}">
-                      <a16:colId xmlns:a16="http://schemas.microsoft.com/office/drawing/2014/main" xmlns="" val="3419335263"/>
+                      <a16:colId xmlns="" xmlns:a16="http://schemas.microsoft.com/office/drawing/2014/main" val="3419335263"/>
                     </a:ext>
                   </a:extLst>
                 </a:gridCol>
                 <a:gridCol w="780627">
                   <a:extLst>
                     <a:ext uri="{9D8B030D-6E8A-4147-A177-3AD203B41FA5}">
-                      <a16:colId xmlns:a16="http://schemas.microsoft.com/office/drawing/2014/main" xmlns="" val="1487680637"/>
+                      <a16:colId xmlns="" xmlns:a16="http://schemas.microsoft.com/office/drawing/2014/main" val="1487680637"/>
                     </a:ext>
                   </a:extLst>
                 </a:gridCol>
                 <a:gridCol w="1561254">
                   <a:extLst>
                     <a:ext uri="{9D8B030D-6E8A-4147-A177-3AD203B41FA5}">
-                      <a16:colId xmlns:a16="http://schemas.microsoft.com/office/drawing/2014/main" xmlns="" val="1993010660"/>
+                      <a16:colId xmlns="" xmlns:a16="http://schemas.microsoft.com/office/drawing/2014/main" val="1993010660"/>
                     </a:ext>
                   </a:extLst>
                 </a:gridCol>
@@ -25841,7 +26028,7 @@
                 </a:tc>
                 <a:extLst>
                   <a:ext uri="{0D108BD9-81ED-4DB2-BD59-A6C34878D82A}">
-                    <a16:rowId xmlns:a16="http://schemas.microsoft.com/office/drawing/2014/main" xmlns="" val="1720057414"/>
+                    <a16:rowId xmlns="" xmlns:a16="http://schemas.microsoft.com/office/drawing/2014/main" val="1720057414"/>
                   </a:ext>
                 </a:extLst>
               </a:tr>
@@ -25990,7 +26177,7 @@
                 </a:tc>
                 <a:extLst>
                   <a:ext uri="{0D108BD9-81ED-4DB2-BD59-A6C34878D82A}">
-                    <a16:rowId xmlns:a16="http://schemas.microsoft.com/office/drawing/2014/main" xmlns="" val="36251073"/>
+                    <a16:rowId xmlns="" xmlns:a16="http://schemas.microsoft.com/office/drawing/2014/main" val="36251073"/>
                   </a:ext>
                 </a:extLst>
               </a:tr>
@@ -26133,7 +26320,7 @@
                 </a:tc>
                 <a:extLst>
                   <a:ext uri="{0D108BD9-81ED-4DB2-BD59-A6C34878D82A}">
-                    <a16:rowId xmlns:a16="http://schemas.microsoft.com/office/drawing/2014/main" xmlns="" val="1903726510"/>
+                    <a16:rowId xmlns="" xmlns:a16="http://schemas.microsoft.com/office/drawing/2014/main" val="1903726510"/>
                   </a:ext>
                 </a:extLst>
               </a:tr>
@@ -26276,7 +26463,7 @@
                 </a:tc>
                 <a:extLst>
                   <a:ext uri="{0D108BD9-81ED-4DB2-BD59-A6C34878D82A}">
-                    <a16:rowId xmlns:a16="http://schemas.microsoft.com/office/drawing/2014/main" xmlns="" val="187047202"/>
+                    <a16:rowId xmlns="" xmlns:a16="http://schemas.microsoft.com/office/drawing/2014/main" val="187047202"/>
                   </a:ext>
                 </a:extLst>
               </a:tr>
@@ -26517,7 +26704,7 @@
                 </a:tc>
                 <a:extLst>
                   <a:ext uri="{0D108BD9-81ED-4DB2-BD59-A6C34878D82A}">
-                    <a16:rowId xmlns:a16="http://schemas.microsoft.com/office/drawing/2014/main" xmlns="" val="338824605"/>
+                    <a16:rowId xmlns="" xmlns:a16="http://schemas.microsoft.com/office/drawing/2014/main" val="338824605"/>
                   </a:ext>
                 </a:extLst>
               </a:tr>
@@ -26660,7 +26847,7 @@
                 </a:tc>
                 <a:extLst>
                   <a:ext uri="{0D108BD9-81ED-4DB2-BD59-A6C34878D82A}">
-                    <a16:rowId xmlns:a16="http://schemas.microsoft.com/office/drawing/2014/main" xmlns="" val="2024704978"/>
+                    <a16:rowId xmlns="" xmlns:a16="http://schemas.microsoft.com/office/drawing/2014/main" val="2024704978"/>
                   </a:ext>
                 </a:extLst>
               </a:tr>
@@ -26961,7 +27148,7 @@
                 </a:tc>
                 <a:extLst>
                   <a:ext uri="{0D108BD9-81ED-4DB2-BD59-A6C34878D82A}">
-                    <a16:rowId xmlns:a16="http://schemas.microsoft.com/office/drawing/2014/main" xmlns="" val="795156824"/>
+                    <a16:rowId xmlns="" xmlns:a16="http://schemas.microsoft.com/office/drawing/2014/main" val="795156824"/>
                   </a:ext>
                 </a:extLst>
               </a:tr>
@@ -27202,7 +27389,7 @@
                 </a:tc>
                 <a:extLst>
                   <a:ext uri="{0D108BD9-81ED-4DB2-BD59-A6C34878D82A}">
-                    <a16:rowId xmlns:a16="http://schemas.microsoft.com/office/drawing/2014/main" xmlns="" val="2601327631"/>
+                    <a16:rowId xmlns="" xmlns:a16="http://schemas.microsoft.com/office/drawing/2014/main" val="2601327631"/>
                   </a:ext>
                 </a:extLst>
               </a:tr>
@@ -27434,7 +27621,7 @@
                 </a:tc>
                 <a:extLst>
                   <a:ext uri="{0D108BD9-81ED-4DB2-BD59-A6C34878D82A}">
-                    <a16:rowId xmlns:a16="http://schemas.microsoft.com/office/drawing/2014/main" xmlns="" val="1493729404"/>
+                    <a16:rowId xmlns="" xmlns:a16="http://schemas.microsoft.com/office/drawing/2014/main" val="1493729404"/>
                   </a:ext>
                 </a:extLst>
               </a:tr>
@@ -27531,7 +27718,7 @@
                 </a:tc>
                 <a:extLst>
                   <a:ext uri="{0D108BD9-81ED-4DB2-BD59-A6C34878D82A}">
-                    <a16:rowId xmlns:a16="http://schemas.microsoft.com/office/drawing/2014/main" xmlns="" val="3630720200"/>
+                    <a16:rowId xmlns="" xmlns:a16="http://schemas.microsoft.com/office/drawing/2014/main" val="3630720200"/>
                   </a:ext>
                 </a:extLst>
               </a:tr>
@@ -27647,7 +27834,7 @@
                 </a:tc>
                 <a:extLst>
                   <a:ext uri="{0D108BD9-81ED-4DB2-BD59-A6C34878D82A}">
-                    <a16:rowId xmlns:a16="http://schemas.microsoft.com/office/drawing/2014/main" xmlns="" val="814545869"/>
+                    <a16:rowId xmlns="" xmlns:a16="http://schemas.microsoft.com/office/drawing/2014/main" val="814545869"/>
                   </a:ext>
                 </a:extLst>
               </a:tr>
@@ -27660,7 +27847,7 @@
           <p:cNvPr id="14" name="그림 13">
             <a:extLst>
               <a:ext uri="{FF2B5EF4-FFF2-40B4-BE49-F238E27FC236}">
-                <a16:creationId xmlns:a16="http://schemas.microsoft.com/office/drawing/2014/main" xmlns="" id="{F1C7A3F6-86EE-45FB-BEB0-916C30FA2973}"/>
+                <a16:creationId xmlns="" xmlns:a16="http://schemas.microsoft.com/office/drawing/2014/main" id="{F1C7A3F6-86EE-45FB-BEB0-916C30FA2973}"/>
               </a:ext>
             </a:extLst>
           </p:cNvPr>
@@ -27690,7 +27877,7 @@
           <p:cNvPr id="16" name="직사각형 15">
             <a:extLst>
               <a:ext uri="{FF2B5EF4-FFF2-40B4-BE49-F238E27FC236}">
-                <a16:creationId xmlns:a16="http://schemas.microsoft.com/office/drawing/2014/main" xmlns="" id="{55B40157-17C5-4582-922E-A09BE14A568F}"/>
+                <a16:creationId xmlns="" xmlns:a16="http://schemas.microsoft.com/office/drawing/2014/main" id="{55B40157-17C5-4582-922E-A09BE14A568F}"/>
               </a:ext>
             </a:extLst>
           </p:cNvPr>
@@ -27742,7 +27929,7 @@
           <p:cNvPr id="18" name="직사각형 17">
             <a:extLst>
               <a:ext uri="{FF2B5EF4-FFF2-40B4-BE49-F238E27FC236}">
-                <a16:creationId xmlns:a16="http://schemas.microsoft.com/office/drawing/2014/main" xmlns="" id="{6CB32B52-DF23-4C04-A70F-A29ACC6EC8A1}"/>
+                <a16:creationId xmlns="" xmlns:a16="http://schemas.microsoft.com/office/drawing/2014/main" id="{6CB32B52-DF23-4C04-A70F-A29ACC6EC8A1}"/>
               </a:ext>
             </a:extLst>
           </p:cNvPr>
@@ -27808,7 +27995,7 @@
           <p:cNvPr id="19" name="직사각형 18">
             <a:extLst>
               <a:ext uri="{FF2B5EF4-FFF2-40B4-BE49-F238E27FC236}">
-                <a16:creationId xmlns:a16="http://schemas.microsoft.com/office/drawing/2014/main" xmlns="" id="{9E22B29F-8C8A-4D8A-BD33-5016DD51D777}"/>
+                <a16:creationId xmlns="" xmlns:a16="http://schemas.microsoft.com/office/drawing/2014/main" id="{9E22B29F-8C8A-4D8A-BD33-5016DD51D777}"/>
               </a:ext>
             </a:extLst>
           </p:cNvPr>
@@ -27869,7 +28056,7 @@
           <p:cNvPr id="20" name="직사각형 19">
             <a:extLst>
               <a:ext uri="{FF2B5EF4-FFF2-40B4-BE49-F238E27FC236}">
-                <a16:creationId xmlns:a16="http://schemas.microsoft.com/office/drawing/2014/main" xmlns="" id="{E1D4B95F-1192-4B4A-922D-38847D004B56}"/>
+                <a16:creationId xmlns="" xmlns:a16="http://schemas.microsoft.com/office/drawing/2014/main" id="{E1D4B95F-1192-4B4A-922D-38847D004B56}"/>
               </a:ext>
             </a:extLst>
           </p:cNvPr>
@@ -27930,7 +28117,7 @@
           <p:cNvPr id="21" name="표 10">
             <a:extLst>
               <a:ext uri="{FF2B5EF4-FFF2-40B4-BE49-F238E27FC236}">
-                <a16:creationId xmlns:a16="http://schemas.microsoft.com/office/drawing/2014/main" xmlns="" id="{F6B0E67D-AD03-45F0-A684-8577807C149A}"/>
+                <a16:creationId xmlns="" xmlns:a16="http://schemas.microsoft.com/office/drawing/2014/main" id="{F6B0E67D-AD03-45F0-A684-8577807C149A}"/>
               </a:ext>
             </a:extLst>
           </p:cNvPr>
@@ -27953,14 +28140,14 @@
                 <a:gridCol w="668220">
                   <a:extLst>
                     <a:ext uri="{9D8B030D-6E8A-4147-A177-3AD203B41FA5}">
-                      <a16:colId xmlns:a16="http://schemas.microsoft.com/office/drawing/2014/main" xmlns="" val="1237496162"/>
+                      <a16:colId xmlns="" xmlns:a16="http://schemas.microsoft.com/office/drawing/2014/main" val="1237496162"/>
                     </a:ext>
                   </a:extLst>
                 </a:gridCol>
                 <a:gridCol w="252143">
                   <a:extLst>
                     <a:ext uri="{9D8B030D-6E8A-4147-A177-3AD203B41FA5}">
-                      <a16:colId xmlns:a16="http://schemas.microsoft.com/office/drawing/2014/main" xmlns="" val="2799200606"/>
+                      <a16:colId xmlns="" xmlns:a16="http://schemas.microsoft.com/office/drawing/2014/main" val="2799200606"/>
                     </a:ext>
                   </a:extLst>
                 </a:gridCol>
@@ -28001,7 +28188,7 @@
                 </a:tc>
                 <a:extLst>
                   <a:ext uri="{0D108BD9-81ED-4DB2-BD59-A6C34878D82A}">
-                    <a16:rowId xmlns:a16="http://schemas.microsoft.com/office/drawing/2014/main" xmlns="" val="3721100454"/>
+                    <a16:rowId xmlns="" xmlns:a16="http://schemas.microsoft.com/office/drawing/2014/main" val="3721100454"/>
                   </a:ext>
                 </a:extLst>
               </a:tr>
@@ -28014,7 +28201,7 @@
           <p:cNvPr id="22" name="표 10">
             <a:extLst>
               <a:ext uri="{FF2B5EF4-FFF2-40B4-BE49-F238E27FC236}">
-                <a16:creationId xmlns:a16="http://schemas.microsoft.com/office/drawing/2014/main" xmlns="" id="{4D527045-138D-41FD-99ED-EBD106D4349D}"/>
+                <a16:creationId xmlns="" xmlns:a16="http://schemas.microsoft.com/office/drawing/2014/main" id="{4D527045-138D-41FD-99ED-EBD106D4349D}"/>
               </a:ext>
             </a:extLst>
           </p:cNvPr>
@@ -28037,14 +28224,14 @@
                 <a:gridCol w="668220">
                   <a:extLst>
                     <a:ext uri="{9D8B030D-6E8A-4147-A177-3AD203B41FA5}">
-                      <a16:colId xmlns:a16="http://schemas.microsoft.com/office/drawing/2014/main" xmlns="" val="1237496162"/>
+                      <a16:colId xmlns="" xmlns:a16="http://schemas.microsoft.com/office/drawing/2014/main" val="1237496162"/>
                     </a:ext>
                   </a:extLst>
                 </a:gridCol>
                 <a:gridCol w="252143">
                   <a:extLst>
                     <a:ext uri="{9D8B030D-6E8A-4147-A177-3AD203B41FA5}">
-                      <a16:colId xmlns:a16="http://schemas.microsoft.com/office/drawing/2014/main" xmlns="" val="2799200606"/>
+                      <a16:colId xmlns="" xmlns:a16="http://schemas.microsoft.com/office/drawing/2014/main" val="2799200606"/>
                     </a:ext>
                   </a:extLst>
                 </a:gridCol>
@@ -28085,7 +28272,7 @@
                 </a:tc>
                 <a:extLst>
                   <a:ext uri="{0D108BD9-81ED-4DB2-BD59-A6C34878D82A}">
-                    <a16:rowId xmlns:a16="http://schemas.microsoft.com/office/drawing/2014/main" xmlns="" val="3721100454"/>
+                    <a16:rowId xmlns="" xmlns:a16="http://schemas.microsoft.com/office/drawing/2014/main" val="3721100454"/>
                   </a:ext>
                 </a:extLst>
               </a:tr>
@@ -28098,7 +28285,7 @@
           <p:cNvPr id="23" name="표 10">
             <a:extLst>
               <a:ext uri="{FF2B5EF4-FFF2-40B4-BE49-F238E27FC236}">
-                <a16:creationId xmlns:a16="http://schemas.microsoft.com/office/drawing/2014/main" xmlns="" id="{84543BB0-7F9F-4C9F-A8CB-668C3481069C}"/>
+                <a16:creationId xmlns="" xmlns:a16="http://schemas.microsoft.com/office/drawing/2014/main" id="{84543BB0-7F9F-4C9F-A8CB-668C3481069C}"/>
               </a:ext>
             </a:extLst>
           </p:cNvPr>
@@ -28127,21 +28314,21 @@
                 <a:gridCol w="172658">
                   <a:extLst>
                     <a:ext uri="{9D8B030D-6E8A-4147-A177-3AD203B41FA5}">
-                      <a16:colId xmlns:a16="http://schemas.microsoft.com/office/drawing/2014/main" xmlns="" val="1237496162"/>
+                      <a16:colId xmlns="" xmlns:a16="http://schemas.microsoft.com/office/drawing/2014/main" val="1237496162"/>
                     </a:ext>
                   </a:extLst>
                 </a:gridCol>
                 <a:gridCol w="584942">
                   <a:extLst>
                     <a:ext uri="{9D8B030D-6E8A-4147-A177-3AD203B41FA5}">
-                      <a16:colId xmlns:a16="http://schemas.microsoft.com/office/drawing/2014/main" xmlns="" val="3186598357"/>
+                      <a16:colId xmlns="" xmlns:a16="http://schemas.microsoft.com/office/drawing/2014/main" val="3186598357"/>
                     </a:ext>
                   </a:extLst>
                 </a:gridCol>
                 <a:gridCol w="172658">
                   <a:extLst>
                     <a:ext uri="{9D8B030D-6E8A-4147-A177-3AD203B41FA5}">
-                      <a16:colId xmlns:a16="http://schemas.microsoft.com/office/drawing/2014/main" xmlns="" val="2799200606"/>
+                      <a16:colId xmlns="" xmlns:a16="http://schemas.microsoft.com/office/drawing/2014/main" val="2799200606"/>
                     </a:ext>
                   </a:extLst>
                 </a:gridCol>
@@ -28217,7 +28404,7 @@
                 </a:tc>
                 <a:extLst>
                   <a:ext uri="{0D108BD9-81ED-4DB2-BD59-A6C34878D82A}">
-                    <a16:rowId xmlns:a16="http://schemas.microsoft.com/office/drawing/2014/main" xmlns="" val="3721100454"/>
+                    <a16:rowId xmlns="" xmlns:a16="http://schemas.microsoft.com/office/drawing/2014/main" val="3721100454"/>
                   </a:ext>
                 </a:extLst>
               </a:tr>
@@ -28230,7 +28417,7 @@
           <p:cNvPr id="24" name="표 10">
             <a:extLst>
               <a:ext uri="{FF2B5EF4-FFF2-40B4-BE49-F238E27FC236}">
-                <a16:creationId xmlns:a16="http://schemas.microsoft.com/office/drawing/2014/main" xmlns="" id="{D60CA312-30D0-4688-A936-8763DD844C0C}"/>
+                <a16:creationId xmlns="" xmlns:a16="http://schemas.microsoft.com/office/drawing/2014/main" id="{D60CA312-30D0-4688-A936-8763DD844C0C}"/>
               </a:ext>
             </a:extLst>
           </p:cNvPr>
@@ -28259,21 +28446,21 @@
                 <a:gridCol w="172658">
                   <a:extLst>
                     <a:ext uri="{9D8B030D-6E8A-4147-A177-3AD203B41FA5}">
-                      <a16:colId xmlns:a16="http://schemas.microsoft.com/office/drawing/2014/main" xmlns="" val="1237496162"/>
+                      <a16:colId xmlns="" xmlns:a16="http://schemas.microsoft.com/office/drawing/2014/main" val="1237496162"/>
                     </a:ext>
                   </a:extLst>
                 </a:gridCol>
                 <a:gridCol w="584942">
                   <a:extLst>
                     <a:ext uri="{9D8B030D-6E8A-4147-A177-3AD203B41FA5}">
-                      <a16:colId xmlns:a16="http://schemas.microsoft.com/office/drawing/2014/main" xmlns="" val="3186598357"/>
+                      <a16:colId xmlns="" xmlns:a16="http://schemas.microsoft.com/office/drawing/2014/main" val="3186598357"/>
                     </a:ext>
                   </a:extLst>
                 </a:gridCol>
                 <a:gridCol w="172658">
                   <a:extLst>
                     <a:ext uri="{9D8B030D-6E8A-4147-A177-3AD203B41FA5}">
-                      <a16:colId xmlns:a16="http://schemas.microsoft.com/office/drawing/2014/main" xmlns="" val="2799200606"/>
+                      <a16:colId xmlns="" xmlns:a16="http://schemas.microsoft.com/office/drawing/2014/main" val="2799200606"/>
                     </a:ext>
                   </a:extLst>
                 </a:gridCol>
@@ -28349,7 +28536,7 @@
                 </a:tc>
                 <a:extLst>
                   <a:ext uri="{0D108BD9-81ED-4DB2-BD59-A6C34878D82A}">
-                    <a16:rowId xmlns:a16="http://schemas.microsoft.com/office/drawing/2014/main" xmlns="" val="3721100454"/>
+                    <a16:rowId xmlns="" xmlns:a16="http://schemas.microsoft.com/office/drawing/2014/main" val="3721100454"/>
                   </a:ext>
                 </a:extLst>
               </a:tr>
@@ -28362,7 +28549,7 @@
           <p:cNvPr id="25" name="표 10">
             <a:extLst>
               <a:ext uri="{FF2B5EF4-FFF2-40B4-BE49-F238E27FC236}">
-                <a16:creationId xmlns:a16="http://schemas.microsoft.com/office/drawing/2014/main" xmlns="" id="{538D1CA8-8974-4376-81CA-1672A30D847B}"/>
+                <a16:creationId xmlns="" xmlns:a16="http://schemas.microsoft.com/office/drawing/2014/main" id="{538D1CA8-8974-4376-81CA-1672A30D847B}"/>
               </a:ext>
             </a:extLst>
           </p:cNvPr>
@@ -28391,21 +28578,21 @@
                 <a:gridCol w="172658">
                   <a:extLst>
                     <a:ext uri="{9D8B030D-6E8A-4147-A177-3AD203B41FA5}">
-                      <a16:colId xmlns:a16="http://schemas.microsoft.com/office/drawing/2014/main" xmlns="" val="1237496162"/>
+                      <a16:colId xmlns="" xmlns:a16="http://schemas.microsoft.com/office/drawing/2014/main" val="1237496162"/>
                     </a:ext>
                   </a:extLst>
                 </a:gridCol>
                 <a:gridCol w="584942">
                   <a:extLst>
                     <a:ext uri="{9D8B030D-6E8A-4147-A177-3AD203B41FA5}">
-                      <a16:colId xmlns:a16="http://schemas.microsoft.com/office/drawing/2014/main" xmlns="" val="3186598357"/>
+                      <a16:colId xmlns="" xmlns:a16="http://schemas.microsoft.com/office/drawing/2014/main" val="3186598357"/>
                     </a:ext>
                   </a:extLst>
                 </a:gridCol>
                 <a:gridCol w="172658">
                   <a:extLst>
                     <a:ext uri="{9D8B030D-6E8A-4147-A177-3AD203B41FA5}">
-                      <a16:colId xmlns:a16="http://schemas.microsoft.com/office/drawing/2014/main" xmlns="" val="2799200606"/>
+                      <a16:colId xmlns="" xmlns:a16="http://schemas.microsoft.com/office/drawing/2014/main" val="2799200606"/>
                     </a:ext>
                   </a:extLst>
                 </a:gridCol>
@@ -28481,7 +28668,7 @@
                 </a:tc>
                 <a:extLst>
                   <a:ext uri="{0D108BD9-81ED-4DB2-BD59-A6C34878D82A}">
-                    <a16:rowId xmlns:a16="http://schemas.microsoft.com/office/drawing/2014/main" xmlns="" val="3721100454"/>
+                    <a16:rowId xmlns="" xmlns:a16="http://schemas.microsoft.com/office/drawing/2014/main" val="3721100454"/>
                   </a:ext>
                 </a:extLst>
               </a:tr>
@@ -28494,7 +28681,7 @@
           <p:cNvPr id="45" name="말풍선: 모서리가 둥근 사각형 44">
             <a:extLst>
               <a:ext uri="{FF2B5EF4-FFF2-40B4-BE49-F238E27FC236}">
-                <a16:creationId xmlns:a16="http://schemas.microsoft.com/office/drawing/2014/main" xmlns="" id="{21845E86-FAC2-4961-9E5F-05815E30F222}"/>
+                <a16:creationId xmlns="" xmlns:a16="http://schemas.microsoft.com/office/drawing/2014/main" id="{21845E86-FAC2-4961-9E5F-05815E30F222}"/>
               </a:ext>
             </a:extLst>
           </p:cNvPr>
@@ -28568,7 +28755,7 @@
           <p:cNvPr id="43" name="말풍선: 모서리가 둥근 사각형 42">
             <a:extLst>
               <a:ext uri="{FF2B5EF4-FFF2-40B4-BE49-F238E27FC236}">
-                <a16:creationId xmlns:a16="http://schemas.microsoft.com/office/drawing/2014/main" xmlns="" id="{44DDA311-1B94-4ABC-95AA-2CFCE0B21B8F}"/>
+                <a16:creationId xmlns="" xmlns:a16="http://schemas.microsoft.com/office/drawing/2014/main" id="{44DDA311-1B94-4ABC-95AA-2CFCE0B21B8F}"/>
               </a:ext>
             </a:extLst>
           </p:cNvPr>
@@ -28642,7 +28829,7 @@
           <p:cNvPr id="29" name="말풍선: 모서리가 둥근 사각형 28">
             <a:extLst>
               <a:ext uri="{FF2B5EF4-FFF2-40B4-BE49-F238E27FC236}">
-                <a16:creationId xmlns:a16="http://schemas.microsoft.com/office/drawing/2014/main" xmlns="" id="{2981359F-C1A0-4756-89E3-357D37EE60D9}"/>
+                <a16:creationId xmlns="" xmlns:a16="http://schemas.microsoft.com/office/drawing/2014/main" id="{2981359F-C1A0-4756-89E3-357D37EE60D9}"/>
               </a:ext>
             </a:extLst>
           </p:cNvPr>
@@ -28716,7 +28903,7 @@
           <p:cNvPr id="30" name="표 10">
             <a:extLst>
               <a:ext uri="{FF2B5EF4-FFF2-40B4-BE49-F238E27FC236}">
-                <a16:creationId xmlns:a16="http://schemas.microsoft.com/office/drawing/2014/main" xmlns="" id="{8AAE0DCD-03B2-4A83-8CBB-2C5A8D39048C}"/>
+                <a16:creationId xmlns="" xmlns:a16="http://schemas.microsoft.com/office/drawing/2014/main" id="{8AAE0DCD-03B2-4A83-8CBB-2C5A8D39048C}"/>
               </a:ext>
             </a:extLst>
           </p:cNvPr>
@@ -28745,21 +28932,21 @@
                 <a:gridCol w="172658">
                   <a:extLst>
                     <a:ext uri="{9D8B030D-6E8A-4147-A177-3AD203B41FA5}">
-                      <a16:colId xmlns:a16="http://schemas.microsoft.com/office/drawing/2014/main" xmlns="" val="1237496162"/>
+                      <a16:colId xmlns="" xmlns:a16="http://schemas.microsoft.com/office/drawing/2014/main" val="1237496162"/>
                     </a:ext>
                   </a:extLst>
                 </a:gridCol>
                 <a:gridCol w="584942">
                   <a:extLst>
                     <a:ext uri="{9D8B030D-6E8A-4147-A177-3AD203B41FA5}">
-                      <a16:colId xmlns:a16="http://schemas.microsoft.com/office/drawing/2014/main" xmlns="" val="3186598357"/>
+                      <a16:colId xmlns="" xmlns:a16="http://schemas.microsoft.com/office/drawing/2014/main" val="3186598357"/>
                     </a:ext>
                   </a:extLst>
                 </a:gridCol>
                 <a:gridCol w="172658">
                   <a:extLst>
                     <a:ext uri="{9D8B030D-6E8A-4147-A177-3AD203B41FA5}">
-                      <a16:colId xmlns:a16="http://schemas.microsoft.com/office/drawing/2014/main" xmlns="" val="2799200606"/>
+                      <a16:colId xmlns="" xmlns:a16="http://schemas.microsoft.com/office/drawing/2014/main" val="2799200606"/>
                     </a:ext>
                   </a:extLst>
                 </a:gridCol>
@@ -28835,7 +29022,7 @@
                 </a:tc>
                 <a:extLst>
                   <a:ext uri="{0D108BD9-81ED-4DB2-BD59-A6C34878D82A}">
-                    <a16:rowId xmlns:a16="http://schemas.microsoft.com/office/drawing/2014/main" xmlns="" val="3721100454"/>
+                    <a16:rowId xmlns="" xmlns:a16="http://schemas.microsoft.com/office/drawing/2014/main" val="3721100454"/>
                   </a:ext>
                 </a:extLst>
               </a:tr>
@@ -28848,7 +29035,7 @@
           <p:cNvPr id="31" name="표 10">
             <a:extLst>
               <a:ext uri="{FF2B5EF4-FFF2-40B4-BE49-F238E27FC236}">
-                <a16:creationId xmlns:a16="http://schemas.microsoft.com/office/drawing/2014/main" xmlns="" id="{793EA780-0403-40D6-8557-2ADA82CBF197}"/>
+                <a16:creationId xmlns="" xmlns:a16="http://schemas.microsoft.com/office/drawing/2014/main" id="{793EA780-0403-40D6-8557-2ADA82CBF197}"/>
               </a:ext>
             </a:extLst>
           </p:cNvPr>
@@ -28877,21 +29064,21 @@
                 <a:gridCol w="172658">
                   <a:extLst>
                     <a:ext uri="{9D8B030D-6E8A-4147-A177-3AD203B41FA5}">
-                      <a16:colId xmlns:a16="http://schemas.microsoft.com/office/drawing/2014/main" xmlns="" val="1237496162"/>
+                      <a16:colId xmlns="" xmlns:a16="http://schemas.microsoft.com/office/drawing/2014/main" val="1237496162"/>
                     </a:ext>
                   </a:extLst>
                 </a:gridCol>
                 <a:gridCol w="584942">
                   <a:extLst>
                     <a:ext uri="{9D8B030D-6E8A-4147-A177-3AD203B41FA5}">
-                      <a16:colId xmlns:a16="http://schemas.microsoft.com/office/drawing/2014/main" xmlns="" val="3186598357"/>
+                      <a16:colId xmlns="" xmlns:a16="http://schemas.microsoft.com/office/drawing/2014/main" val="3186598357"/>
                     </a:ext>
                   </a:extLst>
                 </a:gridCol>
                 <a:gridCol w="172658">
                   <a:extLst>
                     <a:ext uri="{9D8B030D-6E8A-4147-A177-3AD203B41FA5}">
-                      <a16:colId xmlns:a16="http://schemas.microsoft.com/office/drawing/2014/main" xmlns="" val="2799200606"/>
+                      <a16:colId xmlns="" xmlns:a16="http://schemas.microsoft.com/office/drawing/2014/main" val="2799200606"/>
                     </a:ext>
                   </a:extLst>
                 </a:gridCol>
@@ -28967,7 +29154,7 @@
                 </a:tc>
                 <a:extLst>
                   <a:ext uri="{0D108BD9-81ED-4DB2-BD59-A6C34878D82A}">
-                    <a16:rowId xmlns:a16="http://schemas.microsoft.com/office/drawing/2014/main" xmlns="" val="3721100454"/>
+                    <a16:rowId xmlns="" xmlns:a16="http://schemas.microsoft.com/office/drawing/2014/main" val="3721100454"/>
                   </a:ext>
                 </a:extLst>
               </a:tr>
@@ -28980,7 +29167,7 @@
           <p:cNvPr id="32" name="표 10">
             <a:extLst>
               <a:ext uri="{FF2B5EF4-FFF2-40B4-BE49-F238E27FC236}">
-                <a16:creationId xmlns:a16="http://schemas.microsoft.com/office/drawing/2014/main" xmlns="" id="{538FDE81-E220-4E0A-8528-C3FAEA7D2BF0}"/>
+                <a16:creationId xmlns="" xmlns:a16="http://schemas.microsoft.com/office/drawing/2014/main" id="{538FDE81-E220-4E0A-8528-C3FAEA7D2BF0}"/>
               </a:ext>
             </a:extLst>
           </p:cNvPr>
@@ -29009,21 +29196,21 @@
                 <a:gridCol w="172658">
                   <a:extLst>
                     <a:ext uri="{9D8B030D-6E8A-4147-A177-3AD203B41FA5}">
-                      <a16:colId xmlns:a16="http://schemas.microsoft.com/office/drawing/2014/main" xmlns="" val="1237496162"/>
+                      <a16:colId xmlns="" xmlns:a16="http://schemas.microsoft.com/office/drawing/2014/main" val="1237496162"/>
                     </a:ext>
                   </a:extLst>
                 </a:gridCol>
                 <a:gridCol w="584942">
                   <a:extLst>
                     <a:ext uri="{9D8B030D-6E8A-4147-A177-3AD203B41FA5}">
-                      <a16:colId xmlns:a16="http://schemas.microsoft.com/office/drawing/2014/main" xmlns="" val="3186598357"/>
+                      <a16:colId xmlns="" xmlns:a16="http://schemas.microsoft.com/office/drawing/2014/main" val="3186598357"/>
                     </a:ext>
                   </a:extLst>
                 </a:gridCol>
                 <a:gridCol w="172658">
                   <a:extLst>
                     <a:ext uri="{9D8B030D-6E8A-4147-A177-3AD203B41FA5}">
-                      <a16:colId xmlns:a16="http://schemas.microsoft.com/office/drawing/2014/main" xmlns="" val="2799200606"/>
+                      <a16:colId xmlns="" xmlns:a16="http://schemas.microsoft.com/office/drawing/2014/main" val="2799200606"/>
                     </a:ext>
                   </a:extLst>
                 </a:gridCol>
@@ -29099,7 +29286,7 @@
                 </a:tc>
                 <a:extLst>
                   <a:ext uri="{0D108BD9-81ED-4DB2-BD59-A6C34878D82A}">
-                    <a16:rowId xmlns:a16="http://schemas.microsoft.com/office/drawing/2014/main" xmlns="" val="3721100454"/>
+                    <a16:rowId xmlns="" xmlns:a16="http://schemas.microsoft.com/office/drawing/2014/main" val="3721100454"/>
                   </a:ext>
                 </a:extLst>
               </a:tr>
@@ -29142,7 +29329,7 @@
           <p:cNvPr id="2" name="제목 1">
             <a:extLst>
               <a:ext uri="{FF2B5EF4-FFF2-40B4-BE49-F238E27FC236}">
-                <a16:creationId xmlns:a16="http://schemas.microsoft.com/office/drawing/2014/main" xmlns="" id="{36E46BD5-9BF8-4A36-B399-C907B8D17343}"/>
+                <a16:creationId xmlns="" xmlns:a16="http://schemas.microsoft.com/office/drawing/2014/main" id="{36E46BD5-9BF8-4A36-B399-C907B8D17343}"/>
               </a:ext>
             </a:extLst>
           </p:cNvPr>
@@ -29182,7 +29369,7 @@
           <p:cNvPr id="12" name="내용 개체 틀 2">
             <a:extLst>
               <a:ext uri="{FF2B5EF4-FFF2-40B4-BE49-F238E27FC236}">
-                <a16:creationId xmlns:a16="http://schemas.microsoft.com/office/drawing/2014/main" xmlns="" id="{135DF031-1573-492B-A38B-1FB524DF4CD3}"/>
+                <a16:creationId xmlns="" xmlns:a16="http://schemas.microsoft.com/office/drawing/2014/main" id="{135DF031-1573-492B-A38B-1FB524DF4CD3}"/>
               </a:ext>
             </a:extLst>
           </p:cNvPr>
@@ -29233,7 +29420,7 @@
           <p:cNvPr id="33" name="TextBox 32">
             <a:extLst>
               <a:ext uri="{FF2B5EF4-FFF2-40B4-BE49-F238E27FC236}">
-                <a16:creationId xmlns:a16="http://schemas.microsoft.com/office/drawing/2014/main" xmlns="" id="{814F800B-9B1A-4561-8FEE-E6438369C215}"/>
+                <a16:creationId xmlns="" xmlns:a16="http://schemas.microsoft.com/office/drawing/2014/main" id="{814F800B-9B1A-4561-8FEE-E6438369C215}"/>
               </a:ext>
             </a:extLst>
           </p:cNvPr>
@@ -29276,7 +29463,7 @@
           <p:cNvPr id="34" name="표 7">
             <a:extLst>
               <a:ext uri="{FF2B5EF4-FFF2-40B4-BE49-F238E27FC236}">
-                <a16:creationId xmlns:a16="http://schemas.microsoft.com/office/drawing/2014/main" xmlns="" id="{F5DEFE4D-6BB4-4DAC-8BF2-8B2D17530214}"/>
+                <a16:creationId xmlns="" xmlns:a16="http://schemas.microsoft.com/office/drawing/2014/main" id="{F5DEFE4D-6BB4-4DAC-8BF2-8B2D17530214}"/>
               </a:ext>
             </a:extLst>
           </p:cNvPr>
@@ -29305,28 +29492,28 @@
                 <a:gridCol w="1561254">
                   <a:extLst>
                     <a:ext uri="{9D8B030D-6E8A-4147-A177-3AD203B41FA5}">
-                      <a16:colId xmlns:a16="http://schemas.microsoft.com/office/drawing/2014/main" xmlns="" val="107667662"/>
+                      <a16:colId xmlns="" xmlns:a16="http://schemas.microsoft.com/office/drawing/2014/main" val="107667662"/>
                     </a:ext>
                   </a:extLst>
                 </a:gridCol>
                 <a:gridCol w="780628">
                   <a:extLst>
                     <a:ext uri="{9D8B030D-6E8A-4147-A177-3AD203B41FA5}">
-                      <a16:colId xmlns:a16="http://schemas.microsoft.com/office/drawing/2014/main" xmlns="" val="3419335263"/>
+                      <a16:colId xmlns="" xmlns:a16="http://schemas.microsoft.com/office/drawing/2014/main" val="3419335263"/>
                     </a:ext>
                   </a:extLst>
                 </a:gridCol>
                 <a:gridCol w="780627">
                   <a:extLst>
                     <a:ext uri="{9D8B030D-6E8A-4147-A177-3AD203B41FA5}">
-                      <a16:colId xmlns:a16="http://schemas.microsoft.com/office/drawing/2014/main" xmlns="" val="1487680637"/>
+                      <a16:colId xmlns="" xmlns:a16="http://schemas.microsoft.com/office/drawing/2014/main" val="1487680637"/>
                     </a:ext>
                   </a:extLst>
                 </a:gridCol>
                 <a:gridCol w="1561254">
                   <a:extLst>
                     <a:ext uri="{9D8B030D-6E8A-4147-A177-3AD203B41FA5}">
-                      <a16:colId xmlns:a16="http://schemas.microsoft.com/office/drawing/2014/main" xmlns="" val="1993010660"/>
+                      <a16:colId xmlns="" xmlns:a16="http://schemas.microsoft.com/office/drawing/2014/main" val="1993010660"/>
                     </a:ext>
                   </a:extLst>
                 </a:gridCol>
@@ -29481,7 +29668,7 @@
                 </a:tc>
                 <a:extLst>
                   <a:ext uri="{0D108BD9-81ED-4DB2-BD59-A6C34878D82A}">
-                    <a16:rowId xmlns:a16="http://schemas.microsoft.com/office/drawing/2014/main" xmlns="" val="1720057414"/>
+                    <a16:rowId xmlns="" xmlns:a16="http://schemas.microsoft.com/office/drawing/2014/main" val="1720057414"/>
                   </a:ext>
                 </a:extLst>
               </a:tr>
@@ -29630,7 +29817,7 @@
                 </a:tc>
                 <a:extLst>
                   <a:ext uri="{0D108BD9-81ED-4DB2-BD59-A6C34878D82A}">
-                    <a16:rowId xmlns:a16="http://schemas.microsoft.com/office/drawing/2014/main" xmlns="" val="36251073"/>
+                    <a16:rowId xmlns="" xmlns:a16="http://schemas.microsoft.com/office/drawing/2014/main" val="36251073"/>
                   </a:ext>
                 </a:extLst>
               </a:tr>
@@ -29773,7 +29960,7 @@
                 </a:tc>
                 <a:extLst>
                   <a:ext uri="{0D108BD9-81ED-4DB2-BD59-A6C34878D82A}">
-                    <a16:rowId xmlns:a16="http://schemas.microsoft.com/office/drawing/2014/main" xmlns="" val="1903726510"/>
+                    <a16:rowId xmlns="" xmlns:a16="http://schemas.microsoft.com/office/drawing/2014/main" val="1903726510"/>
                   </a:ext>
                 </a:extLst>
               </a:tr>
@@ -29916,7 +30103,7 @@
                 </a:tc>
                 <a:extLst>
                   <a:ext uri="{0D108BD9-81ED-4DB2-BD59-A6C34878D82A}">
-                    <a16:rowId xmlns:a16="http://schemas.microsoft.com/office/drawing/2014/main" xmlns="" val="187047202"/>
+                    <a16:rowId xmlns="" xmlns:a16="http://schemas.microsoft.com/office/drawing/2014/main" val="187047202"/>
                   </a:ext>
                 </a:extLst>
               </a:tr>
@@ -30157,7 +30344,7 @@
                 </a:tc>
                 <a:extLst>
                   <a:ext uri="{0D108BD9-81ED-4DB2-BD59-A6C34878D82A}">
-                    <a16:rowId xmlns:a16="http://schemas.microsoft.com/office/drawing/2014/main" xmlns="" val="338824605"/>
+                    <a16:rowId xmlns="" xmlns:a16="http://schemas.microsoft.com/office/drawing/2014/main" val="338824605"/>
                   </a:ext>
                 </a:extLst>
               </a:tr>
@@ -30343,7 +30530,7 @@
                 </a:tc>
                 <a:extLst>
                   <a:ext uri="{0D108BD9-81ED-4DB2-BD59-A6C34878D82A}">
-                    <a16:rowId xmlns:a16="http://schemas.microsoft.com/office/drawing/2014/main" xmlns="" val="1452823299"/>
+                    <a16:rowId xmlns="" xmlns:a16="http://schemas.microsoft.com/office/drawing/2014/main" val="1452823299"/>
                   </a:ext>
                 </a:extLst>
               </a:tr>
@@ -30548,7 +30735,7 @@
                 </a:tc>
                 <a:extLst>
                   <a:ext uri="{0D108BD9-81ED-4DB2-BD59-A6C34878D82A}">
-                    <a16:rowId xmlns:a16="http://schemas.microsoft.com/office/drawing/2014/main" xmlns="" val="1060021636"/>
+                    <a16:rowId xmlns="" xmlns:a16="http://schemas.microsoft.com/office/drawing/2014/main" val="1060021636"/>
                   </a:ext>
                 </a:extLst>
               </a:tr>
@@ -30691,7 +30878,7 @@
                 </a:tc>
                 <a:extLst>
                   <a:ext uri="{0D108BD9-81ED-4DB2-BD59-A6C34878D82A}">
-                    <a16:rowId xmlns:a16="http://schemas.microsoft.com/office/drawing/2014/main" xmlns="" val="2024704978"/>
+                    <a16:rowId xmlns="" xmlns:a16="http://schemas.microsoft.com/office/drawing/2014/main" val="2024704978"/>
                   </a:ext>
                 </a:extLst>
               </a:tr>
@@ -30992,7 +31179,7 @@
                 </a:tc>
                 <a:extLst>
                   <a:ext uri="{0D108BD9-81ED-4DB2-BD59-A6C34878D82A}">
-                    <a16:rowId xmlns:a16="http://schemas.microsoft.com/office/drawing/2014/main" xmlns="" val="795156824"/>
+                    <a16:rowId xmlns="" xmlns:a16="http://schemas.microsoft.com/office/drawing/2014/main" val="795156824"/>
                   </a:ext>
                 </a:extLst>
               </a:tr>
@@ -31233,7 +31420,7 @@
                 </a:tc>
                 <a:extLst>
                   <a:ext uri="{0D108BD9-81ED-4DB2-BD59-A6C34878D82A}">
-                    <a16:rowId xmlns:a16="http://schemas.microsoft.com/office/drawing/2014/main" xmlns="" val="2601327631"/>
+                    <a16:rowId xmlns="" xmlns:a16="http://schemas.microsoft.com/office/drawing/2014/main" val="2601327631"/>
                   </a:ext>
                 </a:extLst>
               </a:tr>
@@ -31432,7 +31619,7 @@
                 </a:tc>
                 <a:extLst>
                   <a:ext uri="{0D108BD9-81ED-4DB2-BD59-A6C34878D82A}">
-                    <a16:rowId xmlns:a16="http://schemas.microsoft.com/office/drawing/2014/main" xmlns="" val="1493729404"/>
+                    <a16:rowId xmlns="" xmlns:a16="http://schemas.microsoft.com/office/drawing/2014/main" val="1493729404"/>
                   </a:ext>
                 </a:extLst>
               </a:tr>
@@ -31551,7 +31738,7 @@
                 </a:tc>
                 <a:extLst>
                   <a:ext uri="{0D108BD9-81ED-4DB2-BD59-A6C34878D82A}">
-                    <a16:rowId xmlns:a16="http://schemas.microsoft.com/office/drawing/2014/main" xmlns="" val="814545869"/>
+                    <a16:rowId xmlns="" xmlns:a16="http://schemas.microsoft.com/office/drawing/2014/main" val="814545869"/>
                   </a:ext>
                 </a:extLst>
               </a:tr>
@@ -31564,7 +31751,7 @@
           <p:cNvPr id="35" name="그림 34">
             <a:extLst>
               <a:ext uri="{FF2B5EF4-FFF2-40B4-BE49-F238E27FC236}">
-                <a16:creationId xmlns:a16="http://schemas.microsoft.com/office/drawing/2014/main" xmlns="" id="{641BAEF2-D946-40FF-938A-26928EA7B3BD}"/>
+                <a16:creationId xmlns="" xmlns:a16="http://schemas.microsoft.com/office/drawing/2014/main" id="{641BAEF2-D946-40FF-938A-26928EA7B3BD}"/>
               </a:ext>
             </a:extLst>
           </p:cNvPr>
@@ -31594,7 +31781,7 @@
           <p:cNvPr id="36" name="직사각형 35">
             <a:extLst>
               <a:ext uri="{FF2B5EF4-FFF2-40B4-BE49-F238E27FC236}">
-                <a16:creationId xmlns:a16="http://schemas.microsoft.com/office/drawing/2014/main" xmlns="" id="{5A7B0BD0-A163-425F-8E81-067759156729}"/>
+                <a16:creationId xmlns="" xmlns:a16="http://schemas.microsoft.com/office/drawing/2014/main" id="{5A7B0BD0-A163-425F-8E81-067759156729}"/>
               </a:ext>
             </a:extLst>
           </p:cNvPr>
@@ -31646,7 +31833,7 @@
           <p:cNvPr id="37" name="직사각형 36">
             <a:extLst>
               <a:ext uri="{FF2B5EF4-FFF2-40B4-BE49-F238E27FC236}">
-                <a16:creationId xmlns:a16="http://schemas.microsoft.com/office/drawing/2014/main" xmlns="" id="{BF289825-58D5-4B8E-B868-642688F005C8}"/>
+                <a16:creationId xmlns="" xmlns:a16="http://schemas.microsoft.com/office/drawing/2014/main" id="{BF289825-58D5-4B8E-B868-642688F005C8}"/>
               </a:ext>
             </a:extLst>
           </p:cNvPr>
@@ -31712,7 +31899,7 @@
           <p:cNvPr id="38" name="직사각형 37">
             <a:extLst>
               <a:ext uri="{FF2B5EF4-FFF2-40B4-BE49-F238E27FC236}">
-                <a16:creationId xmlns:a16="http://schemas.microsoft.com/office/drawing/2014/main" xmlns="" id="{3CF3BF1B-F81A-4D94-8503-8A9E0F0C60E2}"/>
+                <a16:creationId xmlns="" xmlns:a16="http://schemas.microsoft.com/office/drawing/2014/main" id="{3CF3BF1B-F81A-4D94-8503-8A9E0F0C60E2}"/>
               </a:ext>
             </a:extLst>
           </p:cNvPr>
@@ -31773,7 +31960,7 @@
           <p:cNvPr id="39" name="직사각형 38">
             <a:extLst>
               <a:ext uri="{FF2B5EF4-FFF2-40B4-BE49-F238E27FC236}">
-                <a16:creationId xmlns:a16="http://schemas.microsoft.com/office/drawing/2014/main" xmlns="" id="{B1AEEE36-37F5-49A9-8084-44C7C665980C}"/>
+                <a16:creationId xmlns="" xmlns:a16="http://schemas.microsoft.com/office/drawing/2014/main" id="{B1AEEE36-37F5-49A9-8084-44C7C665980C}"/>
               </a:ext>
             </a:extLst>
           </p:cNvPr>
@@ -31834,7 +32021,7 @@
           <p:cNvPr id="40" name="표 10">
             <a:extLst>
               <a:ext uri="{FF2B5EF4-FFF2-40B4-BE49-F238E27FC236}">
-                <a16:creationId xmlns:a16="http://schemas.microsoft.com/office/drawing/2014/main" xmlns="" id="{3ACF9867-768A-4FB4-9F26-E2925A0828F3}"/>
+                <a16:creationId xmlns="" xmlns:a16="http://schemas.microsoft.com/office/drawing/2014/main" id="{3ACF9867-768A-4FB4-9F26-E2925A0828F3}"/>
               </a:ext>
             </a:extLst>
           </p:cNvPr>
@@ -31863,14 +32050,14 @@
                 <a:gridCol w="668220">
                   <a:extLst>
                     <a:ext uri="{9D8B030D-6E8A-4147-A177-3AD203B41FA5}">
-                      <a16:colId xmlns:a16="http://schemas.microsoft.com/office/drawing/2014/main" xmlns="" val="1237496162"/>
+                      <a16:colId xmlns="" xmlns:a16="http://schemas.microsoft.com/office/drawing/2014/main" val="1237496162"/>
                     </a:ext>
                   </a:extLst>
                 </a:gridCol>
                 <a:gridCol w="252143">
                   <a:extLst>
                     <a:ext uri="{9D8B030D-6E8A-4147-A177-3AD203B41FA5}">
-                      <a16:colId xmlns:a16="http://schemas.microsoft.com/office/drawing/2014/main" xmlns="" val="2799200606"/>
+                      <a16:colId xmlns="" xmlns:a16="http://schemas.microsoft.com/office/drawing/2014/main" val="2799200606"/>
                     </a:ext>
                   </a:extLst>
                 </a:gridCol>
@@ -31911,7 +32098,7 @@
                 </a:tc>
                 <a:extLst>
                   <a:ext uri="{0D108BD9-81ED-4DB2-BD59-A6C34878D82A}">
-                    <a16:rowId xmlns:a16="http://schemas.microsoft.com/office/drawing/2014/main" xmlns="" val="3721100454"/>
+                    <a16:rowId xmlns="" xmlns:a16="http://schemas.microsoft.com/office/drawing/2014/main" val="3721100454"/>
                   </a:ext>
                 </a:extLst>
               </a:tr>
@@ -31924,7 +32111,7 @@
           <p:cNvPr id="41" name="표 10">
             <a:extLst>
               <a:ext uri="{FF2B5EF4-FFF2-40B4-BE49-F238E27FC236}">
-                <a16:creationId xmlns:a16="http://schemas.microsoft.com/office/drawing/2014/main" xmlns="" id="{FB5C0159-01B3-41D5-9AB2-87CFD21FBBE4}"/>
+                <a16:creationId xmlns="" xmlns:a16="http://schemas.microsoft.com/office/drawing/2014/main" id="{FB5C0159-01B3-41D5-9AB2-87CFD21FBBE4}"/>
               </a:ext>
             </a:extLst>
           </p:cNvPr>
@@ -31953,14 +32140,14 @@
                 <a:gridCol w="668220">
                   <a:extLst>
                     <a:ext uri="{9D8B030D-6E8A-4147-A177-3AD203B41FA5}">
-                      <a16:colId xmlns:a16="http://schemas.microsoft.com/office/drawing/2014/main" xmlns="" val="1237496162"/>
+                      <a16:colId xmlns="" xmlns:a16="http://schemas.microsoft.com/office/drawing/2014/main" val="1237496162"/>
                     </a:ext>
                   </a:extLst>
                 </a:gridCol>
                 <a:gridCol w="252143">
                   <a:extLst>
                     <a:ext uri="{9D8B030D-6E8A-4147-A177-3AD203B41FA5}">
-                      <a16:colId xmlns:a16="http://schemas.microsoft.com/office/drawing/2014/main" xmlns="" val="2799200606"/>
+                      <a16:colId xmlns="" xmlns:a16="http://schemas.microsoft.com/office/drawing/2014/main" val="2799200606"/>
                     </a:ext>
                   </a:extLst>
                 </a:gridCol>
@@ -32001,7 +32188,7 @@
                 </a:tc>
                 <a:extLst>
                   <a:ext uri="{0D108BD9-81ED-4DB2-BD59-A6C34878D82A}">
-                    <a16:rowId xmlns:a16="http://schemas.microsoft.com/office/drawing/2014/main" xmlns="" val="3721100454"/>
+                    <a16:rowId xmlns="" xmlns:a16="http://schemas.microsoft.com/office/drawing/2014/main" val="3721100454"/>
                   </a:ext>
                 </a:extLst>
               </a:tr>
@@ -32014,7 +32201,7 @@
           <p:cNvPr id="42" name="표 10">
             <a:extLst>
               <a:ext uri="{FF2B5EF4-FFF2-40B4-BE49-F238E27FC236}">
-                <a16:creationId xmlns:a16="http://schemas.microsoft.com/office/drawing/2014/main" xmlns="" id="{21647DE2-70E7-41E2-97C0-7BA8F6F7AD94}"/>
+                <a16:creationId xmlns="" xmlns:a16="http://schemas.microsoft.com/office/drawing/2014/main" id="{21647DE2-70E7-41E2-97C0-7BA8F6F7AD94}"/>
               </a:ext>
             </a:extLst>
           </p:cNvPr>
@@ -32043,21 +32230,21 @@
                 <a:gridCol w="172658">
                   <a:extLst>
                     <a:ext uri="{9D8B030D-6E8A-4147-A177-3AD203B41FA5}">
-                      <a16:colId xmlns:a16="http://schemas.microsoft.com/office/drawing/2014/main" xmlns="" val="1237496162"/>
+                      <a16:colId xmlns="" xmlns:a16="http://schemas.microsoft.com/office/drawing/2014/main" val="1237496162"/>
                     </a:ext>
                   </a:extLst>
                 </a:gridCol>
                 <a:gridCol w="584942">
                   <a:extLst>
                     <a:ext uri="{9D8B030D-6E8A-4147-A177-3AD203B41FA5}">
-                      <a16:colId xmlns:a16="http://schemas.microsoft.com/office/drawing/2014/main" xmlns="" val="3186598357"/>
+                      <a16:colId xmlns="" xmlns:a16="http://schemas.microsoft.com/office/drawing/2014/main" val="3186598357"/>
                     </a:ext>
                   </a:extLst>
                 </a:gridCol>
                 <a:gridCol w="172658">
                   <a:extLst>
                     <a:ext uri="{9D8B030D-6E8A-4147-A177-3AD203B41FA5}">
-                      <a16:colId xmlns:a16="http://schemas.microsoft.com/office/drawing/2014/main" xmlns="" val="2799200606"/>
+                      <a16:colId xmlns="" xmlns:a16="http://schemas.microsoft.com/office/drawing/2014/main" val="2799200606"/>
                     </a:ext>
                   </a:extLst>
                 </a:gridCol>
@@ -32133,7 +32320,7 @@
                 </a:tc>
                 <a:extLst>
                   <a:ext uri="{0D108BD9-81ED-4DB2-BD59-A6C34878D82A}">
-                    <a16:rowId xmlns:a16="http://schemas.microsoft.com/office/drawing/2014/main" xmlns="" val="3721100454"/>
+                    <a16:rowId xmlns="" xmlns:a16="http://schemas.microsoft.com/office/drawing/2014/main" val="3721100454"/>
                   </a:ext>
                 </a:extLst>
               </a:tr>
@@ -32146,7 +32333,7 @@
           <p:cNvPr id="44" name="표 10">
             <a:extLst>
               <a:ext uri="{FF2B5EF4-FFF2-40B4-BE49-F238E27FC236}">
-                <a16:creationId xmlns:a16="http://schemas.microsoft.com/office/drawing/2014/main" xmlns="" id="{A30E746A-8A00-480B-BA05-23CFC0A238EC}"/>
+                <a16:creationId xmlns="" xmlns:a16="http://schemas.microsoft.com/office/drawing/2014/main" id="{A30E746A-8A00-480B-BA05-23CFC0A238EC}"/>
               </a:ext>
             </a:extLst>
           </p:cNvPr>
@@ -32175,21 +32362,21 @@
                 <a:gridCol w="172658">
                   <a:extLst>
                     <a:ext uri="{9D8B030D-6E8A-4147-A177-3AD203B41FA5}">
-                      <a16:colId xmlns:a16="http://schemas.microsoft.com/office/drawing/2014/main" xmlns="" val="1237496162"/>
+                      <a16:colId xmlns="" xmlns:a16="http://schemas.microsoft.com/office/drawing/2014/main" val="1237496162"/>
                     </a:ext>
                   </a:extLst>
                 </a:gridCol>
                 <a:gridCol w="584942">
                   <a:extLst>
                     <a:ext uri="{9D8B030D-6E8A-4147-A177-3AD203B41FA5}">
-                      <a16:colId xmlns:a16="http://schemas.microsoft.com/office/drawing/2014/main" xmlns="" val="3186598357"/>
+                      <a16:colId xmlns="" xmlns:a16="http://schemas.microsoft.com/office/drawing/2014/main" val="3186598357"/>
                     </a:ext>
                   </a:extLst>
                 </a:gridCol>
                 <a:gridCol w="172658">
                   <a:extLst>
                     <a:ext uri="{9D8B030D-6E8A-4147-A177-3AD203B41FA5}">
-                      <a16:colId xmlns:a16="http://schemas.microsoft.com/office/drawing/2014/main" xmlns="" val="2799200606"/>
+                      <a16:colId xmlns="" xmlns:a16="http://schemas.microsoft.com/office/drawing/2014/main" val="2799200606"/>
                     </a:ext>
                   </a:extLst>
                 </a:gridCol>
@@ -32265,7 +32452,7 @@
                 </a:tc>
                 <a:extLst>
                   <a:ext uri="{0D108BD9-81ED-4DB2-BD59-A6C34878D82A}">
-                    <a16:rowId xmlns:a16="http://schemas.microsoft.com/office/drawing/2014/main" xmlns="" val="3721100454"/>
+                    <a16:rowId xmlns="" xmlns:a16="http://schemas.microsoft.com/office/drawing/2014/main" val="3721100454"/>
                   </a:ext>
                 </a:extLst>
               </a:tr>
@@ -32278,7 +32465,7 @@
           <p:cNvPr id="46" name="표 10">
             <a:extLst>
               <a:ext uri="{FF2B5EF4-FFF2-40B4-BE49-F238E27FC236}">
-                <a16:creationId xmlns:a16="http://schemas.microsoft.com/office/drawing/2014/main" xmlns="" id="{E0B66952-0165-410D-9CBC-2BDAC783A867}"/>
+                <a16:creationId xmlns="" xmlns:a16="http://schemas.microsoft.com/office/drawing/2014/main" id="{E0B66952-0165-410D-9CBC-2BDAC783A867}"/>
               </a:ext>
             </a:extLst>
           </p:cNvPr>
@@ -32307,21 +32494,21 @@
                 <a:gridCol w="172658">
                   <a:extLst>
                     <a:ext uri="{9D8B030D-6E8A-4147-A177-3AD203B41FA5}">
-                      <a16:colId xmlns:a16="http://schemas.microsoft.com/office/drawing/2014/main" xmlns="" val="1237496162"/>
+                      <a16:colId xmlns="" xmlns:a16="http://schemas.microsoft.com/office/drawing/2014/main" val="1237496162"/>
                     </a:ext>
                   </a:extLst>
                 </a:gridCol>
                 <a:gridCol w="584942">
                   <a:extLst>
                     <a:ext uri="{9D8B030D-6E8A-4147-A177-3AD203B41FA5}">
-                      <a16:colId xmlns:a16="http://schemas.microsoft.com/office/drawing/2014/main" xmlns="" val="3186598357"/>
+                      <a16:colId xmlns="" xmlns:a16="http://schemas.microsoft.com/office/drawing/2014/main" val="3186598357"/>
                     </a:ext>
                   </a:extLst>
                 </a:gridCol>
                 <a:gridCol w="172658">
                   <a:extLst>
                     <a:ext uri="{9D8B030D-6E8A-4147-A177-3AD203B41FA5}">
-                      <a16:colId xmlns:a16="http://schemas.microsoft.com/office/drawing/2014/main" xmlns="" val="2799200606"/>
+                      <a16:colId xmlns="" xmlns:a16="http://schemas.microsoft.com/office/drawing/2014/main" val="2799200606"/>
                     </a:ext>
                   </a:extLst>
                 </a:gridCol>
@@ -32397,7 +32584,7 @@
                 </a:tc>
                 <a:extLst>
                   <a:ext uri="{0D108BD9-81ED-4DB2-BD59-A6C34878D82A}">
-                    <a16:rowId xmlns:a16="http://schemas.microsoft.com/office/drawing/2014/main" xmlns="" val="3721100454"/>
+                    <a16:rowId xmlns="" xmlns:a16="http://schemas.microsoft.com/office/drawing/2014/main" val="3721100454"/>
                   </a:ext>
                 </a:extLst>
               </a:tr>
@@ -32410,7 +32597,7 @@
           <p:cNvPr id="47" name="표 10">
             <a:extLst>
               <a:ext uri="{FF2B5EF4-FFF2-40B4-BE49-F238E27FC236}">
-                <a16:creationId xmlns:a16="http://schemas.microsoft.com/office/drawing/2014/main" xmlns="" id="{BAB5B3F2-5ED1-43DA-8285-942919943C1E}"/>
+                <a16:creationId xmlns="" xmlns:a16="http://schemas.microsoft.com/office/drawing/2014/main" id="{BAB5B3F2-5ED1-43DA-8285-942919943C1E}"/>
               </a:ext>
             </a:extLst>
           </p:cNvPr>
@@ -32439,21 +32626,21 @@
                 <a:gridCol w="178104">
                   <a:extLst>
                     <a:ext uri="{9D8B030D-6E8A-4147-A177-3AD203B41FA5}">
-                      <a16:colId xmlns:a16="http://schemas.microsoft.com/office/drawing/2014/main" xmlns="" val="1237496162"/>
+                      <a16:colId xmlns="" xmlns:a16="http://schemas.microsoft.com/office/drawing/2014/main" val="1237496162"/>
                     </a:ext>
                   </a:extLst>
                 </a:gridCol>
                 <a:gridCol w="606577">
                   <a:extLst>
                     <a:ext uri="{9D8B030D-6E8A-4147-A177-3AD203B41FA5}">
-                      <a16:colId xmlns:a16="http://schemas.microsoft.com/office/drawing/2014/main" xmlns="" val="3186598357"/>
+                      <a16:colId xmlns="" xmlns:a16="http://schemas.microsoft.com/office/drawing/2014/main" val="3186598357"/>
                     </a:ext>
                   </a:extLst>
                 </a:gridCol>
                 <a:gridCol w="178104">
                   <a:extLst>
                     <a:ext uri="{9D8B030D-6E8A-4147-A177-3AD203B41FA5}">
-                      <a16:colId xmlns:a16="http://schemas.microsoft.com/office/drawing/2014/main" xmlns="" val="2799200606"/>
+                      <a16:colId xmlns="" xmlns:a16="http://schemas.microsoft.com/office/drawing/2014/main" val="2799200606"/>
                     </a:ext>
                   </a:extLst>
                 </a:gridCol>
@@ -32529,7 +32716,7 @@
                 </a:tc>
                 <a:extLst>
                   <a:ext uri="{0D108BD9-81ED-4DB2-BD59-A6C34878D82A}">
-                    <a16:rowId xmlns:a16="http://schemas.microsoft.com/office/drawing/2014/main" xmlns="" val="3721100454"/>
+                    <a16:rowId xmlns="" xmlns:a16="http://schemas.microsoft.com/office/drawing/2014/main" val="3721100454"/>
                   </a:ext>
                 </a:extLst>
               </a:tr>
@@ -32542,7 +32729,7 @@
           <p:cNvPr id="48" name="표 10">
             <a:extLst>
               <a:ext uri="{FF2B5EF4-FFF2-40B4-BE49-F238E27FC236}">
-                <a16:creationId xmlns:a16="http://schemas.microsoft.com/office/drawing/2014/main" xmlns="" id="{6631249D-648A-4BDA-ACFF-841ECFFE2330}"/>
+                <a16:creationId xmlns="" xmlns:a16="http://schemas.microsoft.com/office/drawing/2014/main" id="{6631249D-648A-4BDA-ACFF-841ECFFE2330}"/>
               </a:ext>
             </a:extLst>
           </p:cNvPr>
@@ -32571,21 +32758,21 @@
                 <a:gridCol w="178104">
                   <a:extLst>
                     <a:ext uri="{9D8B030D-6E8A-4147-A177-3AD203B41FA5}">
-                      <a16:colId xmlns:a16="http://schemas.microsoft.com/office/drawing/2014/main" xmlns="" val="1237496162"/>
+                      <a16:colId xmlns="" xmlns:a16="http://schemas.microsoft.com/office/drawing/2014/main" val="1237496162"/>
                     </a:ext>
                   </a:extLst>
                 </a:gridCol>
                 <a:gridCol w="606577">
                   <a:extLst>
                     <a:ext uri="{9D8B030D-6E8A-4147-A177-3AD203B41FA5}">
-                      <a16:colId xmlns:a16="http://schemas.microsoft.com/office/drawing/2014/main" xmlns="" val="3186598357"/>
+                      <a16:colId xmlns="" xmlns:a16="http://schemas.microsoft.com/office/drawing/2014/main" val="3186598357"/>
                     </a:ext>
                   </a:extLst>
                 </a:gridCol>
                 <a:gridCol w="178104">
                   <a:extLst>
                     <a:ext uri="{9D8B030D-6E8A-4147-A177-3AD203B41FA5}">
-                      <a16:colId xmlns:a16="http://schemas.microsoft.com/office/drawing/2014/main" xmlns="" val="2799200606"/>
+                      <a16:colId xmlns="" xmlns:a16="http://schemas.microsoft.com/office/drawing/2014/main" val="2799200606"/>
                     </a:ext>
                   </a:extLst>
                 </a:gridCol>
@@ -32661,7 +32848,7 @@
                 </a:tc>
                 <a:extLst>
                   <a:ext uri="{0D108BD9-81ED-4DB2-BD59-A6C34878D82A}">
-                    <a16:rowId xmlns:a16="http://schemas.microsoft.com/office/drawing/2014/main" xmlns="" val="3721100454"/>
+                    <a16:rowId xmlns="" xmlns:a16="http://schemas.microsoft.com/office/drawing/2014/main" val="3721100454"/>
                   </a:ext>
                 </a:extLst>
               </a:tr>
@@ -32674,7 +32861,7 @@
           <p:cNvPr id="49" name="표 10">
             <a:extLst>
               <a:ext uri="{FF2B5EF4-FFF2-40B4-BE49-F238E27FC236}">
-                <a16:creationId xmlns:a16="http://schemas.microsoft.com/office/drawing/2014/main" xmlns="" id="{13378D49-D4B9-4C17-9CCF-E4DD0AC239F4}"/>
+                <a16:creationId xmlns="" xmlns:a16="http://schemas.microsoft.com/office/drawing/2014/main" id="{13378D49-D4B9-4C17-9CCF-E4DD0AC239F4}"/>
               </a:ext>
             </a:extLst>
           </p:cNvPr>
@@ -32703,21 +32890,21 @@
                 <a:gridCol w="178104">
                   <a:extLst>
                     <a:ext uri="{9D8B030D-6E8A-4147-A177-3AD203B41FA5}">
-                      <a16:colId xmlns:a16="http://schemas.microsoft.com/office/drawing/2014/main" xmlns="" val="1237496162"/>
+                      <a16:colId xmlns="" xmlns:a16="http://schemas.microsoft.com/office/drawing/2014/main" val="1237496162"/>
                     </a:ext>
                   </a:extLst>
                 </a:gridCol>
                 <a:gridCol w="606577">
                   <a:extLst>
                     <a:ext uri="{9D8B030D-6E8A-4147-A177-3AD203B41FA5}">
-                      <a16:colId xmlns:a16="http://schemas.microsoft.com/office/drawing/2014/main" xmlns="" val="3186598357"/>
+                      <a16:colId xmlns="" xmlns:a16="http://schemas.microsoft.com/office/drawing/2014/main" val="3186598357"/>
                     </a:ext>
                   </a:extLst>
                 </a:gridCol>
                 <a:gridCol w="178104">
                   <a:extLst>
                     <a:ext uri="{9D8B030D-6E8A-4147-A177-3AD203B41FA5}">
-                      <a16:colId xmlns:a16="http://schemas.microsoft.com/office/drawing/2014/main" xmlns="" val="2799200606"/>
+                      <a16:colId xmlns="" xmlns:a16="http://schemas.microsoft.com/office/drawing/2014/main" val="2799200606"/>
                     </a:ext>
                   </a:extLst>
                 </a:gridCol>
@@ -32793,7 +32980,7 @@
                 </a:tc>
                 <a:extLst>
                   <a:ext uri="{0D108BD9-81ED-4DB2-BD59-A6C34878D82A}">
-                    <a16:rowId xmlns:a16="http://schemas.microsoft.com/office/drawing/2014/main" xmlns="" val="3721100454"/>
+                    <a16:rowId xmlns="" xmlns:a16="http://schemas.microsoft.com/office/drawing/2014/main" val="3721100454"/>
                   </a:ext>
                 </a:extLst>
               </a:tr>
@@ -32806,7 +32993,7 @@
           <p:cNvPr id="50" name="표 10">
             <a:extLst>
               <a:ext uri="{FF2B5EF4-FFF2-40B4-BE49-F238E27FC236}">
-                <a16:creationId xmlns:a16="http://schemas.microsoft.com/office/drawing/2014/main" xmlns="" id="{267C4538-A12C-4DFE-BBA2-6363936D1223}"/>
+                <a16:creationId xmlns="" xmlns:a16="http://schemas.microsoft.com/office/drawing/2014/main" id="{267C4538-A12C-4DFE-BBA2-6363936D1223}"/>
               </a:ext>
             </a:extLst>
           </p:cNvPr>
@@ -32835,21 +33022,21 @@
                 <a:gridCol w="172658">
                   <a:extLst>
                     <a:ext uri="{9D8B030D-6E8A-4147-A177-3AD203B41FA5}">
-                      <a16:colId xmlns:a16="http://schemas.microsoft.com/office/drawing/2014/main" xmlns="" val="1237496162"/>
+                      <a16:colId xmlns="" xmlns:a16="http://schemas.microsoft.com/office/drawing/2014/main" val="1237496162"/>
                     </a:ext>
                   </a:extLst>
                 </a:gridCol>
                 <a:gridCol w="584942">
                   <a:extLst>
                     <a:ext uri="{9D8B030D-6E8A-4147-A177-3AD203B41FA5}">
-                      <a16:colId xmlns:a16="http://schemas.microsoft.com/office/drawing/2014/main" xmlns="" val="3186598357"/>
+                      <a16:colId xmlns="" xmlns:a16="http://schemas.microsoft.com/office/drawing/2014/main" val="3186598357"/>
                     </a:ext>
                   </a:extLst>
                 </a:gridCol>
                 <a:gridCol w="172658">
                   <a:extLst>
                     <a:ext uri="{9D8B030D-6E8A-4147-A177-3AD203B41FA5}">
-                      <a16:colId xmlns:a16="http://schemas.microsoft.com/office/drawing/2014/main" xmlns="" val="2799200606"/>
+                      <a16:colId xmlns="" xmlns:a16="http://schemas.microsoft.com/office/drawing/2014/main" val="2799200606"/>
                     </a:ext>
                   </a:extLst>
                 </a:gridCol>
@@ -32925,7 +33112,7 @@
                 </a:tc>
                 <a:extLst>
                   <a:ext uri="{0D108BD9-81ED-4DB2-BD59-A6C34878D82A}">
-                    <a16:rowId xmlns:a16="http://schemas.microsoft.com/office/drawing/2014/main" xmlns="" val="3721100454"/>
+                    <a16:rowId xmlns="" xmlns:a16="http://schemas.microsoft.com/office/drawing/2014/main" val="3721100454"/>
                   </a:ext>
                 </a:extLst>
               </a:tr>
@@ -32938,7 +33125,7 @@
           <p:cNvPr id="51" name="표 10">
             <a:extLst>
               <a:ext uri="{FF2B5EF4-FFF2-40B4-BE49-F238E27FC236}">
-                <a16:creationId xmlns:a16="http://schemas.microsoft.com/office/drawing/2014/main" xmlns="" id="{86262A20-599F-4247-B42E-C60C593E9AEB}"/>
+                <a16:creationId xmlns="" xmlns:a16="http://schemas.microsoft.com/office/drawing/2014/main" id="{86262A20-599F-4247-B42E-C60C593E9AEB}"/>
               </a:ext>
             </a:extLst>
           </p:cNvPr>
@@ -32967,21 +33154,21 @@
                 <a:gridCol w="172658">
                   <a:extLst>
                     <a:ext uri="{9D8B030D-6E8A-4147-A177-3AD203B41FA5}">
-                      <a16:colId xmlns:a16="http://schemas.microsoft.com/office/drawing/2014/main" xmlns="" val="1237496162"/>
+                      <a16:colId xmlns="" xmlns:a16="http://schemas.microsoft.com/office/drawing/2014/main" val="1237496162"/>
                     </a:ext>
                   </a:extLst>
                 </a:gridCol>
                 <a:gridCol w="584942">
                   <a:extLst>
                     <a:ext uri="{9D8B030D-6E8A-4147-A177-3AD203B41FA5}">
-                      <a16:colId xmlns:a16="http://schemas.microsoft.com/office/drawing/2014/main" xmlns="" val="3186598357"/>
+                      <a16:colId xmlns="" xmlns:a16="http://schemas.microsoft.com/office/drawing/2014/main" val="3186598357"/>
                     </a:ext>
                   </a:extLst>
                 </a:gridCol>
                 <a:gridCol w="172658">
                   <a:extLst>
                     <a:ext uri="{9D8B030D-6E8A-4147-A177-3AD203B41FA5}">
-                      <a16:colId xmlns:a16="http://schemas.microsoft.com/office/drawing/2014/main" xmlns="" val="2799200606"/>
+                      <a16:colId xmlns="" xmlns:a16="http://schemas.microsoft.com/office/drawing/2014/main" val="2799200606"/>
                     </a:ext>
                   </a:extLst>
                 </a:gridCol>
@@ -33057,7 +33244,7 @@
                 </a:tc>
                 <a:extLst>
                   <a:ext uri="{0D108BD9-81ED-4DB2-BD59-A6C34878D82A}">
-                    <a16:rowId xmlns:a16="http://schemas.microsoft.com/office/drawing/2014/main" xmlns="" val="3721100454"/>
+                    <a16:rowId xmlns="" xmlns:a16="http://schemas.microsoft.com/office/drawing/2014/main" val="3721100454"/>
                   </a:ext>
                 </a:extLst>
               </a:tr>
@@ -33070,7 +33257,7 @@
           <p:cNvPr id="52" name="표 10">
             <a:extLst>
               <a:ext uri="{FF2B5EF4-FFF2-40B4-BE49-F238E27FC236}">
-                <a16:creationId xmlns:a16="http://schemas.microsoft.com/office/drawing/2014/main" xmlns="" id="{EA3D89A7-6AC0-4A1D-97E1-57B24A647C9B}"/>
+                <a16:creationId xmlns="" xmlns:a16="http://schemas.microsoft.com/office/drawing/2014/main" id="{EA3D89A7-6AC0-4A1D-97E1-57B24A647C9B}"/>
               </a:ext>
             </a:extLst>
           </p:cNvPr>
@@ -33099,21 +33286,21 @@
                 <a:gridCol w="172658">
                   <a:extLst>
                     <a:ext uri="{9D8B030D-6E8A-4147-A177-3AD203B41FA5}">
-                      <a16:colId xmlns:a16="http://schemas.microsoft.com/office/drawing/2014/main" xmlns="" val="1237496162"/>
+                      <a16:colId xmlns="" xmlns:a16="http://schemas.microsoft.com/office/drawing/2014/main" val="1237496162"/>
                     </a:ext>
                   </a:extLst>
                 </a:gridCol>
                 <a:gridCol w="584942">
                   <a:extLst>
                     <a:ext uri="{9D8B030D-6E8A-4147-A177-3AD203B41FA5}">
-                      <a16:colId xmlns:a16="http://schemas.microsoft.com/office/drawing/2014/main" xmlns="" val="3186598357"/>
+                      <a16:colId xmlns="" xmlns:a16="http://schemas.microsoft.com/office/drawing/2014/main" val="3186598357"/>
                     </a:ext>
                   </a:extLst>
                 </a:gridCol>
                 <a:gridCol w="172658">
                   <a:extLst>
                     <a:ext uri="{9D8B030D-6E8A-4147-A177-3AD203B41FA5}">
-                      <a16:colId xmlns:a16="http://schemas.microsoft.com/office/drawing/2014/main" xmlns="" val="2799200606"/>
+                      <a16:colId xmlns="" xmlns:a16="http://schemas.microsoft.com/office/drawing/2014/main" val="2799200606"/>
                     </a:ext>
                   </a:extLst>
                 </a:gridCol>
@@ -33189,7 +33376,7 @@
                 </a:tc>
                 <a:extLst>
                   <a:ext uri="{0D108BD9-81ED-4DB2-BD59-A6C34878D82A}">
-                    <a16:rowId xmlns:a16="http://schemas.microsoft.com/office/drawing/2014/main" xmlns="" val="3721100454"/>
+                    <a16:rowId xmlns="" xmlns:a16="http://schemas.microsoft.com/office/drawing/2014/main" val="3721100454"/>
                   </a:ext>
                 </a:extLst>
               </a:tr>
@@ -33474,7 +33661,7 @@
   <a:extraClrSchemeLst/>
   <a:extLst>
     <a:ext uri="{05A4C25C-085E-4340-85A3-A5531E510DB2}">
-      <thm15:themeFamily xmlns:thm15="http://schemas.microsoft.com/office/thememl/2012/main" xmlns="" name="Vapor Trail" id="{4FDF2955-7D9C-493C-B9F9-C205151B46CD}" vid="{FE1EB5C7-81A8-4CBA-AE6E-B3BF73DC3895}"/>
+      <thm15:themeFamily xmlns="" xmlns:thm15="http://schemas.microsoft.com/office/thememl/2012/main" name="Vapor Trail" id="{4FDF2955-7D9C-493C-B9F9-C205151B46CD}" vid="{FE1EB5C7-81A8-4CBA-AE6E-B3BF73DC3895}"/>
     </a:ext>
   </a:extLst>
 </a:theme>

</xml_diff>